<commit_message>
updating 2d and map slides
</commit_message>
<xml_diff>
--- a/ClassMaterials/2DArraysAndMaps/Slides/Part1-Help-and-Academic-Integrity.pptx
+++ b/ClassMaterials/2DArraysAndMaps/Slides/Part1-Help-and-Academic-Integrity.pptx
@@ -5,10 +5,10 @@
     <p:sldMasterId id="2147483927" r:id="rId4"/>
   </p:sldMasterIdLst>
   <p:notesMasterIdLst>
-    <p:notesMasterId r:id="rId27"/>
+    <p:notesMasterId r:id="rId28"/>
   </p:notesMasterIdLst>
   <p:handoutMasterIdLst>
-    <p:handoutMasterId r:id="rId28"/>
+    <p:handoutMasterId r:id="rId29"/>
   </p:handoutMasterIdLst>
   <p:sldIdLst>
     <p:sldId id="300" r:id="rId5"/>
@@ -27,12 +27,13 @@
     <p:sldId id="379" r:id="rId18"/>
     <p:sldId id="380" r:id="rId19"/>
     <p:sldId id="378" r:id="rId20"/>
-    <p:sldId id="381" r:id="rId21"/>
-    <p:sldId id="384" r:id="rId22"/>
-    <p:sldId id="270" r:id="rId23"/>
-    <p:sldId id="271" r:id="rId24"/>
-    <p:sldId id="272" r:id="rId25"/>
-    <p:sldId id="273" r:id="rId26"/>
+    <p:sldId id="385" r:id="rId21"/>
+    <p:sldId id="381" r:id="rId22"/>
+    <p:sldId id="384" r:id="rId23"/>
+    <p:sldId id="270" r:id="rId24"/>
+    <p:sldId id="271" r:id="rId25"/>
+    <p:sldId id="272" r:id="rId26"/>
+    <p:sldId id="273" r:id="rId27"/>
   </p:sldIdLst>
   <p:sldSz cx="9144000" cy="6858000" type="screen4x3"/>
   <p:notesSz cx="7010400" cy="9296400"/>
@@ -320,7 +321,7 @@
               <a:pPr>
                 <a:defRPr/>
               </a:pPr>
-              <a:t>11/22/2022</a:t>
+              <a:t>11/30/2022</a:t>
             </a:fld>
             <a:endParaRPr lang="en-US"/>
           </a:p>
@@ -555,7 +556,7 @@
               <a:pPr>
                 <a:defRPr/>
               </a:pPr>
-              <a:t>11/22/2022</a:t>
+              <a:t>11/30/2022</a:t>
             </a:fld>
             <a:endParaRPr lang="en-US"/>
           </a:p>
@@ -1862,7 +1863,7 @@
               <a:pPr>
                 <a:defRPr/>
               </a:pPr>
-              <a:t>18</a:t>
+              <a:t>19</a:t>
             </a:fld>
             <a:endParaRPr lang="en-US"/>
           </a:p>
@@ -1951,7 +1952,7 @@
               <a:defRPr sz="1800"/>
             </a:pPr>
             <a:r>
-              <a:rPr sz="1200">
+              <a:rPr sz="1200" dirty="0">
                 <a:latin typeface="Calibri"/>
                 <a:ea typeface="Calibri"/>
                 <a:cs typeface="Calibri"/>
@@ -1971,43 +1972,25 @@
               <a:defRPr sz="1800"/>
             </a:pPr>
             <a:r>
-              <a:rPr sz="1200">
+              <a:rPr sz="1200" dirty="0">
                 <a:latin typeface="Calibri"/>
                 <a:ea typeface="Calibri"/>
                 <a:cs typeface="Calibri"/>
                 <a:sym typeface="Calibri"/>
               </a:rPr>
-              <a:t>Like python’s “for </a:t>
-            </a:r>
-            <a:r>
-              <a:rPr sz="1200" err="1">
+              <a:t>Like python’s “for num in </a:t>
+            </a:r>
+            <a:r>
+              <a:rPr sz="1200" dirty="0" err="1">
                 <a:latin typeface="Calibri"/>
                 <a:ea typeface="Calibri"/>
                 <a:cs typeface="Calibri"/>
                 <a:sym typeface="Calibri"/>
               </a:rPr>
-              <a:t>num</a:t>
-            </a:r>
-            <a:r>
-              <a:rPr sz="1200">
-                <a:latin typeface="Calibri"/>
-                <a:ea typeface="Calibri"/>
-                <a:cs typeface="Calibri"/>
-                <a:sym typeface="Calibri"/>
-              </a:rPr>
-              <a:t> in </a:t>
-            </a:r>
-            <a:r>
-              <a:rPr sz="1200" err="1">
-                <a:latin typeface="Calibri"/>
-                <a:ea typeface="Calibri"/>
-                <a:cs typeface="Calibri"/>
-                <a:sym typeface="Calibri"/>
-              </a:rPr>
               <a:t>nums</a:t>
             </a:r>
             <a:r>
-              <a:rPr sz="1200">
+              <a:rPr sz="1200" dirty="0">
                 <a:latin typeface="Calibri"/>
                 <a:ea typeface="Calibri"/>
                 <a:cs typeface="Calibri"/>
@@ -2027,7 +2010,7 @@
               <a:defRPr sz="1800"/>
             </a:pPr>
             <a:r>
-              <a:rPr sz="1200">
+              <a:rPr sz="1200" dirty="0">
                 <a:latin typeface="Calibri"/>
                 <a:ea typeface="Calibri"/>
                 <a:cs typeface="Calibri"/>
@@ -2047,7 +2030,7 @@
               <a:defRPr sz="1800"/>
             </a:pPr>
             <a:r>
-              <a:rPr sz="1200">
+              <a:rPr sz="1200" dirty="0">
                 <a:latin typeface="Calibri"/>
                 <a:ea typeface="Calibri"/>
                 <a:cs typeface="Calibri"/>
@@ -2067,7 +2050,7 @@
               <a:defRPr sz="1800"/>
             </a:pPr>
             <a:r>
-              <a:rPr sz="1200">
+              <a:rPr sz="1200" dirty="0">
                 <a:latin typeface="Calibri"/>
                 <a:ea typeface="Calibri"/>
                 <a:cs typeface="Calibri"/>
@@ -2087,7 +2070,7 @@
               <a:defRPr sz="1800"/>
             </a:pPr>
             <a:r>
-              <a:rPr sz="1200">
+              <a:rPr sz="1200" dirty="0">
                 <a:latin typeface="Calibri"/>
                 <a:ea typeface="Calibri"/>
                 <a:cs typeface="Calibri"/>
@@ -2096,7 +2079,7 @@
               <a:t>We CAN’T MODIFY the element and stick it back in the array.</a:t>
             </a:r>
             <a:r>
-              <a:rPr lang="en-US" sz="1200">
+              <a:rPr lang="en-US" sz="1200" dirty="0">
                 <a:latin typeface="Calibri"/>
                 <a:ea typeface="Calibri"/>
                 <a:cs typeface="Calibri"/>
@@ -2105,7 +2088,7 @@
               <a:t>  CONCURRENT</a:t>
             </a:r>
             <a:r>
-              <a:rPr lang="en-US" sz="1200" baseline="0">
+              <a:rPr lang="en-US" sz="1200" baseline="0" dirty="0">
                 <a:latin typeface="Calibri"/>
                 <a:ea typeface="Calibri"/>
                 <a:cs typeface="Calibri"/>
@@ -2113,7 +2096,7 @@
               </a:rPr>
               <a:t> MODIFICATION EXCEPTION!</a:t>
             </a:r>
-            <a:endParaRPr sz="1200">
+            <a:endParaRPr sz="1200" dirty="0">
               <a:latin typeface="Calibri"/>
               <a:ea typeface="Calibri"/>
               <a:cs typeface="Calibri"/>
@@ -2320,7 +2303,7 @@
               <a:pPr>
                 <a:defRPr/>
               </a:pPr>
-              <a:t>Tuesday, November 22, 2022</a:t>
+              <a:t>Wednesday, November 30, 2022</a:t>
             </a:fld>
             <a:endParaRPr lang="en-US"/>
           </a:p>
@@ -2503,7 +2486,7 @@
               <a:pPr>
                 <a:defRPr/>
               </a:pPr>
-              <a:t>Tuesday, November 22, 2022</a:t>
+              <a:t>Wednesday, November 30, 2022</a:t>
             </a:fld>
             <a:endParaRPr lang="en-US"/>
           </a:p>
@@ -2696,7 +2679,7 @@
               <a:pPr>
                 <a:defRPr/>
               </a:pPr>
-              <a:t>Tuesday, November 22, 2022</a:t>
+              <a:t>Wednesday, November 30, 2022</a:t>
             </a:fld>
             <a:endParaRPr lang="en-US"/>
           </a:p>
@@ -2879,7 +2862,7 @@
               <a:pPr>
                 <a:defRPr/>
               </a:pPr>
-              <a:t>Tuesday, November 22, 2022</a:t>
+              <a:t>Wednesday, November 30, 2022</a:t>
             </a:fld>
             <a:endParaRPr lang="en-US"/>
           </a:p>
@@ -3139,7 +3122,7 @@
               <a:pPr>
                 <a:defRPr/>
               </a:pPr>
-              <a:t>Tuesday, November 22, 2022</a:t>
+              <a:t>Wednesday, November 30, 2022</a:t>
             </a:fld>
             <a:endParaRPr lang="en-US"/>
           </a:p>
@@ -3439,7 +3422,7 @@
               <a:pPr>
                 <a:defRPr/>
               </a:pPr>
-              <a:t>Tuesday, November 22, 2022</a:t>
+              <a:t>Wednesday, November 30, 2022</a:t>
             </a:fld>
             <a:endParaRPr lang="en-US"/>
           </a:p>
@@ -3873,7 +3856,7 @@
               <a:pPr>
                 <a:defRPr/>
               </a:pPr>
-              <a:t>Tuesday, November 22, 2022</a:t>
+              <a:t>Wednesday, November 30, 2022</a:t>
             </a:fld>
             <a:endParaRPr lang="en-US"/>
           </a:p>
@@ -4005,7 +3988,7 @@
               <a:pPr>
                 <a:defRPr/>
               </a:pPr>
-              <a:t>Tuesday, November 22, 2022</a:t>
+              <a:t>Wednesday, November 30, 2022</a:t>
             </a:fld>
             <a:endParaRPr lang="en-US"/>
           </a:p>
@@ -4115,7 +4098,7 @@
               <a:pPr>
                 <a:defRPr/>
               </a:pPr>
-              <a:t>Tuesday, November 22, 2022</a:t>
+              <a:t>Wednesday, November 30, 2022</a:t>
             </a:fld>
             <a:endParaRPr lang="en-US"/>
           </a:p>
@@ -4405,7 +4388,7 @@
               <a:pPr>
                 <a:defRPr/>
               </a:pPr>
-              <a:t>Tuesday, November 22, 2022</a:t>
+              <a:t>Wednesday, November 30, 2022</a:t>
             </a:fld>
             <a:endParaRPr lang="en-US"/>
           </a:p>
@@ -4672,7 +4655,7 @@
               <a:pPr>
                 <a:defRPr/>
               </a:pPr>
-              <a:t>Tuesday, November 22, 2022</a:t>
+              <a:t>Wednesday, November 30, 2022</a:t>
             </a:fld>
             <a:endParaRPr lang="en-US"/>
           </a:p>
@@ -4898,7 +4881,7 @@
               <a:pPr>
                 <a:defRPr/>
               </a:pPr>
-              <a:t>Tuesday, November 22, 2022</a:t>
+              <a:t>Wednesday, November 30, 2022</a:t>
             </a:fld>
             <a:endParaRPr lang="en-US"/>
           </a:p>
@@ -6183,12 +6166,14 @@
         </p:nvSpPr>
         <p:spPr/>
         <p:txBody>
-          <a:bodyPr/>
+          <a:bodyPr>
+            <a:normAutofit/>
+          </a:bodyPr>
           <a:lstStyle/>
           <a:p>
             <a:r>
               <a:rPr lang="en-US" dirty="0"/>
-              <a:t>Questions from Today</a:t>
+              <a:t>Academic Integrity Annotation</a:t>
             </a:r>
           </a:p>
         </p:txBody>
@@ -6217,27 +6202,7 @@
           <a:p>
             <a:r>
               <a:rPr lang="en-US" sz="2800" dirty="0"/>
-              <a:t>Post ANY questions to Piazza </a:t>
-            </a:r>
-            <a:r>
-              <a:rPr lang="en-US" sz="2800" b="1" i="1" u="sng" dirty="0"/>
-              <a:t>even including code </a:t>
-            </a:r>
-            <a:r>
-              <a:rPr lang="en-US" sz="2800" dirty="0"/>
-              <a:t>since this is purely collaborative exercise and the solution code is available to you</a:t>
-            </a:r>
-          </a:p>
-          <a:p>
-            <a:r>
-              <a:rPr lang="en-US" sz="2800" dirty="0"/>
-              <a:t>Please help! Post answers to questions posted by other students</a:t>
-            </a:r>
-          </a:p>
-          <a:p>
-            <a:r>
-              <a:rPr lang="en-US" sz="2800" dirty="0"/>
-              <a:t>Before next class make at least one annotation on the Academic Integrity Guidelines:</a:t>
+              <a:t>Before next class make at least one annotation on the Academic Integrity Guidelines</a:t>
             </a:r>
           </a:p>
           <a:p>
@@ -6267,7 +6232,7 @@
         </p:blipFill>
         <p:spPr>
           <a:xfrm>
-            <a:off x="368834" y="5025359"/>
+            <a:off x="457200" y="2973039"/>
             <a:ext cx="8029815" cy="1702206"/>
           </a:xfrm>
           <a:prstGeom prst="rect">
@@ -6278,7 +6243,7 @@
     </p:spTree>
     <p:extLst>
       <p:ext uri="{BB962C8B-B14F-4D97-AF65-F5344CB8AC3E}">
-        <p14:creationId xmlns:p14="http://schemas.microsoft.com/office/powerpoint/2010/main" val="1401686825"/>
+        <p14:creationId xmlns:p14="http://schemas.microsoft.com/office/powerpoint/2010/main" val="1132888000"/>
       </p:ext>
     </p:extLst>
   </p:cSld>
@@ -6321,8 +6286,8 @@
           <a:lstStyle/>
           <a:p>
             <a:r>
-              <a:rPr lang="en-US"/>
-              <a:t>Today’s Agenda</a:t>
+              <a:rPr lang="en-US" dirty="0"/>
+              <a:t>Questions from Today</a:t>
             </a:r>
           </a:p>
         </p:txBody>
@@ -6337,68 +6302,80 @@
             <p:ph idx="1"/>
           </p:nvPr>
         </p:nvSpPr>
-        <p:spPr/>
+        <p:spPr>
+          <a:xfrm>
+            <a:off x="457200" y="1600200"/>
+            <a:ext cx="8229600" cy="4983162"/>
+          </a:xfrm>
+        </p:spPr>
         <p:txBody>
           <a:bodyPr>
-            <a:normAutofit lnSpcReduction="10000"/>
+            <a:normAutofit/>
           </a:bodyPr>
           <a:lstStyle/>
           <a:p>
-            <a:r>
-              <a:rPr lang="en-US" strike="sngStrike" dirty="0"/>
-              <a:t>Help: Piazza, TA Help Hours, Panopto Videos</a:t>
-            </a:r>
-          </a:p>
-          <a:p>
-            <a:r>
-              <a:rPr lang="en-US" strike="sngStrike" dirty="0"/>
-              <a:t>Quizzes</a:t>
-            </a:r>
-          </a:p>
-          <a:p>
-            <a:r>
-              <a:rPr lang="en-US" strike="sngStrike" dirty="0"/>
-              <a:t>Academic Integrity</a:t>
-            </a:r>
-          </a:p>
-          <a:p>
-            <a:r>
-              <a:rPr lang="en-US" dirty="0"/>
-              <a:t>Review:</a:t>
-            </a:r>
-          </a:p>
-          <a:p>
-            <a:pPr lvl="1"/>
-            <a:r>
-              <a:rPr lang="en-US" dirty="0"/>
-              <a:t>Coding Gotchas</a:t>
-            </a:r>
-          </a:p>
-          <a:p>
-            <a:pPr lvl="1"/>
-            <a:r>
-              <a:rPr lang="en-US" dirty="0"/>
-              <a:t>Enhanced for loops</a:t>
-            </a:r>
-          </a:p>
-          <a:p>
-            <a:r>
-              <a:rPr lang="en-US" dirty="0"/>
-              <a:t>2D Arrays</a:t>
-            </a:r>
-          </a:p>
-          <a:p>
-            <a:r>
-              <a:rPr lang="en-US" dirty="0"/>
-              <a:t>Maps</a:t>
-            </a:r>
+            <a:pPr marL="0" indent="0">
+              <a:buNone/>
+            </a:pPr>
+            <a:r>
+              <a:rPr lang="en-US" sz="2800" b="1" dirty="0"/>
+              <a:t>Collaborative Exercises</a:t>
+            </a:r>
+          </a:p>
+          <a:p>
+            <a:r>
+              <a:rPr lang="en-US" sz="2800" i="1" dirty="0"/>
+              <a:t>Practice2DArraysAndMaps</a:t>
+            </a:r>
+          </a:p>
+          <a:p>
+            <a:r>
+              <a:rPr lang="en-US" sz="2800" i="1" dirty="0"/>
+              <a:t>2DArraysAndMapsQuiz</a:t>
+            </a:r>
+          </a:p>
+          <a:p>
+            <a:endParaRPr lang="en-US" sz="2800" dirty="0"/>
+          </a:p>
+          <a:p>
+            <a:pPr marL="0" indent="0">
+              <a:buNone/>
+            </a:pPr>
+            <a:r>
+              <a:rPr lang="en-US" sz="2800" dirty="0"/>
+              <a:t>Post ANY questions to Piazza </a:t>
+            </a:r>
+            <a:r>
+              <a:rPr lang="en-US" sz="2800" b="1" i="1" u="sng" dirty="0"/>
+              <a:t>even including code </a:t>
+            </a:r>
+            <a:r>
+              <a:rPr lang="en-US" sz="2800" dirty="0"/>
+              <a:t>since this is purely collaborative exercise and the solution code is available to you</a:t>
+            </a:r>
+          </a:p>
+          <a:p>
+            <a:r>
+              <a:rPr lang="en-US" sz="2800" dirty="0"/>
+              <a:t>Please help! Post answers to questions posted by other students. Helping other students can earn you Incentive points (see syllabus) or a future TA job </a:t>
+            </a:r>
+            <a:r>
+              <a:rPr lang="en-US" sz="2800" dirty="0">
+                <a:sym typeface="Wingdings" panose="05000000000000000000" pitchFamily="2" charset="2"/>
+              </a:rPr>
+              <a:t></a:t>
+            </a:r>
+            <a:endParaRPr lang="en-US" sz="2800" dirty="0"/>
+          </a:p>
+          <a:p>
+            <a:endParaRPr lang="en-US" sz="2800" dirty="0"/>
           </a:p>
         </p:txBody>
       </p:sp>
     </p:spTree>
     <p:extLst>
       <p:ext uri="{BB962C8B-B14F-4D97-AF65-F5344CB8AC3E}">
-        <p14:creationId xmlns:p14="http://schemas.microsoft.com/office/powerpoint/2010/main" val="3075912542"/>
+        <p14:creationId xmlns:p14="http://schemas.microsoft.com/office/powerpoint/2010/main" val="1401686825"/>
       </p:ext>
     </p:extLst>
   </p:cSld>
@@ -6442,15 +6419,7 @@
           <a:p>
             <a:r>
               <a:rPr lang="en-US"/>
-              <a:t>Coding Gotchas – the </a:t>
-            </a:r>
-            <a:r>
-              <a:rPr lang="en-US" i="1"/>
-              <a:t>size</a:t>
-            </a:r>
-            <a:r>
-              <a:rPr lang="en-US"/>
-              <a:t> of things</a:t>
+              <a:t>Today’s Agenda</a:t>
             </a:r>
           </a:p>
         </p:txBody>
@@ -6465,314 +6434,68 @@
             <p:ph idx="1"/>
           </p:nvPr>
         </p:nvSpPr>
-        <p:spPr>
-          <a:xfrm>
-            <a:off x="457200" y="1417638"/>
-            <a:ext cx="8382000" cy="4525963"/>
-          </a:xfrm>
-        </p:spPr>
+        <p:spPr/>
         <p:txBody>
           <a:bodyPr>
-            <a:normAutofit/>
+            <a:normAutofit lnSpcReduction="10000"/>
           </a:bodyPr>
           <a:lstStyle/>
           <a:p>
-            <a:pPr marL="0" indent="0">
-              <a:buNone/>
-            </a:pPr>
-            <a:r>
-              <a:rPr lang="en-US" sz="2000" err="1">
-                <a:latin typeface="Courier New" panose="02070309020205020404" pitchFamily="49" charset="0"/>
-                <a:cs typeface="Courier New" panose="02070309020205020404" pitchFamily="49" charset="0"/>
-              </a:rPr>
-              <a:t>int</a:t>
-            </a:r>
-            <a:r>
-              <a:rPr lang="en-US" sz="2000">
-                <a:latin typeface="Courier New" panose="02070309020205020404" pitchFamily="49" charset="0"/>
-                <a:cs typeface="Courier New" panose="02070309020205020404" pitchFamily="49" charset="0"/>
-              </a:rPr>
-              <a:t>[] numbers = { 2, 4, 8, 16};</a:t>
-            </a:r>
-          </a:p>
-          <a:p>
-            <a:pPr marL="0" indent="0">
-              <a:buNone/>
-            </a:pPr>
-            <a:r>
-              <a:rPr lang="en-US" sz="2000">
-                <a:latin typeface="Courier New" panose="02070309020205020404" pitchFamily="49" charset="0"/>
-                <a:cs typeface="Courier New" panose="02070309020205020404" pitchFamily="49" charset="0"/>
-              </a:rPr>
-              <a:t>int </a:t>
-            </a:r>
-            <a:r>
-              <a:rPr lang="en-US" sz="2000" err="1">
-                <a:latin typeface="Courier New" panose="02070309020205020404" pitchFamily="49" charset="0"/>
-                <a:cs typeface="Courier New" panose="02070309020205020404" pitchFamily="49" charset="0"/>
-              </a:rPr>
-              <a:t>numbersCount</a:t>
-            </a:r>
-            <a:r>
-              <a:rPr lang="en-US" sz="2000">
-                <a:latin typeface="Courier New" panose="02070309020205020404" pitchFamily="49" charset="0"/>
-                <a:cs typeface="Courier New" panose="02070309020205020404" pitchFamily="49" charset="0"/>
-              </a:rPr>
-              <a:t> = </a:t>
-            </a:r>
-            <a:r>
-              <a:rPr lang="en-US" sz="2000" err="1">
-                <a:latin typeface="Courier New" panose="02070309020205020404" pitchFamily="49" charset="0"/>
-                <a:cs typeface="Courier New" panose="02070309020205020404" pitchFamily="49" charset="0"/>
-              </a:rPr>
-              <a:t>numbers.length</a:t>
-            </a:r>
-            <a:r>
-              <a:rPr lang="en-US" sz="2000">
-                <a:latin typeface="Courier New" panose="02070309020205020404" pitchFamily="49" charset="0"/>
-                <a:cs typeface="Courier New" panose="02070309020205020404" pitchFamily="49" charset="0"/>
-              </a:rPr>
-              <a:t>;</a:t>
-            </a:r>
-          </a:p>
-          <a:p>
-            <a:pPr marL="0" indent="0">
-              <a:buNone/>
-            </a:pPr>
-            <a:r>
-              <a:rPr lang="en-US" sz="2000">
-                <a:latin typeface="Courier New" panose="02070309020205020404" pitchFamily="49" charset="0"/>
-                <a:cs typeface="Courier New" panose="02070309020205020404" pitchFamily="49" charset="0"/>
-              </a:rPr>
-              <a:t>// Java array uses 'length'</a:t>
-            </a:r>
-          </a:p>
-          <a:p>
-            <a:pPr marL="0" indent="0">
-              <a:buNone/>
-            </a:pPr>
-            <a:endParaRPr lang="en-US" sz="2000">
-              <a:latin typeface="Courier New" panose="02070309020205020404" pitchFamily="49" charset="0"/>
-              <a:cs typeface="Courier New" panose="02070309020205020404" pitchFamily="49" charset="0"/>
-            </a:endParaRPr>
-          </a:p>
-          <a:p>
-            <a:pPr marL="0" indent="0">
-              <a:buNone/>
-            </a:pPr>
-            <a:r>
-              <a:rPr lang="en-US" sz="2000" err="1">
-                <a:latin typeface="Courier New" panose="02070309020205020404" pitchFamily="49" charset="0"/>
-                <a:cs typeface="Courier New" panose="02070309020205020404" pitchFamily="49" charset="0"/>
-              </a:rPr>
-              <a:t>ArrayList</a:t>
-            </a:r>
-            <a:r>
-              <a:rPr lang="en-US" sz="2000">
-                <a:latin typeface="Courier New" panose="02070309020205020404" pitchFamily="49" charset="0"/>
-                <a:cs typeface="Courier New" panose="02070309020205020404" pitchFamily="49" charset="0"/>
-              </a:rPr>
-              <a:t>&lt;String&gt; words = </a:t>
-            </a:r>
-            <a:r>
-              <a:rPr lang="en-US" sz="2000" b="1">
-                <a:latin typeface="Courier New" panose="02070309020205020404" pitchFamily="49" charset="0"/>
-                <a:cs typeface="Courier New" panose="02070309020205020404" pitchFamily="49" charset="0"/>
-              </a:rPr>
-              <a:t>new</a:t>
-            </a:r>
-            <a:r>
-              <a:rPr lang="en-US" sz="2000">
-                <a:latin typeface="Courier New" panose="02070309020205020404" pitchFamily="49" charset="0"/>
-                <a:cs typeface="Courier New" panose="02070309020205020404" pitchFamily="49" charset="0"/>
-              </a:rPr>
-              <a:t> </a:t>
-            </a:r>
-            <a:r>
-              <a:rPr lang="en-US" sz="2000" err="1">
-                <a:latin typeface="Courier New" panose="02070309020205020404" pitchFamily="49" charset="0"/>
-                <a:cs typeface="Courier New" panose="02070309020205020404" pitchFamily="49" charset="0"/>
-              </a:rPr>
-              <a:t>ArrayList</a:t>
-            </a:r>
-            <a:r>
-              <a:rPr lang="en-US" sz="2000">
-                <a:latin typeface="Courier New" panose="02070309020205020404" pitchFamily="49" charset="0"/>
-                <a:cs typeface="Courier New" panose="02070309020205020404" pitchFamily="49" charset="0"/>
-              </a:rPr>
-              <a:t>&lt;String&gt;();</a:t>
-            </a:r>
-          </a:p>
-          <a:p>
-            <a:pPr marL="0" indent="0">
-              <a:buNone/>
-            </a:pPr>
-            <a:r>
-              <a:rPr lang="en-US" sz="2000" err="1">
-                <a:latin typeface="Courier New" panose="02070309020205020404" pitchFamily="49" charset="0"/>
-                <a:cs typeface="Courier New" panose="02070309020205020404" pitchFamily="49" charset="0"/>
-              </a:rPr>
-              <a:t>words.add</a:t>
-            </a:r>
-            <a:r>
-              <a:rPr lang="en-US" sz="2000">
-                <a:latin typeface="Courier New" panose="02070309020205020404" pitchFamily="49" charset="0"/>
-                <a:cs typeface="Courier New" panose="02070309020205020404" pitchFamily="49" charset="0"/>
-              </a:rPr>
-              <a:t>("Hello!");</a:t>
-            </a:r>
-          </a:p>
-          <a:p>
-            <a:pPr marL="0" indent="0">
-              <a:buNone/>
-            </a:pPr>
-            <a:r>
-              <a:rPr lang="en-US" sz="2000">
-                <a:latin typeface="Courier New" panose="02070309020205020404" pitchFamily="49" charset="0"/>
-                <a:cs typeface="Courier New" panose="02070309020205020404" pitchFamily="49" charset="0"/>
-              </a:rPr>
-              <a:t>int </a:t>
-            </a:r>
-            <a:r>
-              <a:rPr lang="en-US" sz="2000" err="1">
-                <a:latin typeface="Courier New" panose="02070309020205020404" pitchFamily="49" charset="0"/>
-                <a:cs typeface="Courier New" panose="02070309020205020404" pitchFamily="49" charset="0"/>
-              </a:rPr>
-              <a:t>wordsCount</a:t>
-            </a:r>
-            <a:r>
-              <a:rPr lang="en-US" sz="2000">
-                <a:latin typeface="Courier New" panose="02070309020205020404" pitchFamily="49" charset="0"/>
-                <a:cs typeface="Courier New" panose="02070309020205020404" pitchFamily="49" charset="0"/>
-              </a:rPr>
-              <a:t> = </a:t>
-            </a:r>
-            <a:r>
-              <a:rPr lang="en-US" sz="2000" err="1">
-                <a:latin typeface="Courier New" panose="02070309020205020404" pitchFamily="49" charset="0"/>
-                <a:cs typeface="Courier New" panose="02070309020205020404" pitchFamily="49" charset="0"/>
-              </a:rPr>
-              <a:t>words.size</a:t>
-            </a:r>
-            <a:r>
-              <a:rPr lang="en-US" sz="2000">
-                <a:latin typeface="Courier New" panose="02070309020205020404" pitchFamily="49" charset="0"/>
-                <a:cs typeface="Courier New" panose="02070309020205020404" pitchFamily="49" charset="0"/>
-              </a:rPr>
-              <a:t>();</a:t>
-            </a:r>
-          </a:p>
-          <a:p>
-            <a:pPr marL="0" indent="0">
-              <a:buNone/>
-            </a:pPr>
-            <a:r>
-              <a:rPr lang="en-US" sz="2000">
-                <a:latin typeface="Courier New" panose="02070309020205020404" pitchFamily="49" charset="0"/>
-                <a:cs typeface="Courier New" panose="02070309020205020404" pitchFamily="49" charset="0"/>
-              </a:rPr>
-              <a:t>// </a:t>
-            </a:r>
-            <a:r>
-              <a:rPr lang="en-US" sz="2000" err="1">
-                <a:latin typeface="Courier New" panose="02070309020205020404" pitchFamily="49" charset="0"/>
-                <a:cs typeface="Courier New" panose="02070309020205020404" pitchFamily="49" charset="0"/>
-              </a:rPr>
-              <a:t>ArrayList</a:t>
-            </a:r>
-            <a:r>
-              <a:rPr lang="en-US" sz="2000">
-                <a:latin typeface="Courier New" panose="02070309020205020404" pitchFamily="49" charset="0"/>
-                <a:cs typeface="Courier New" panose="02070309020205020404" pitchFamily="49" charset="0"/>
-              </a:rPr>
-              <a:t> uses 'size()'</a:t>
-            </a:r>
-          </a:p>
-          <a:p>
-            <a:pPr marL="0" indent="0">
-              <a:buNone/>
-            </a:pPr>
-            <a:endParaRPr lang="en-US" sz="2000">
-              <a:latin typeface="Courier New" panose="02070309020205020404" pitchFamily="49" charset="0"/>
-              <a:cs typeface="Courier New" panose="02070309020205020404" pitchFamily="49" charset="0"/>
-            </a:endParaRPr>
-          </a:p>
-          <a:p>
-            <a:pPr marL="0" indent="0">
-              <a:buNone/>
-            </a:pPr>
-            <a:r>
-              <a:rPr lang="en-US" sz="2000">
-                <a:latin typeface="Courier New" panose="02070309020205020404" pitchFamily="49" charset="0"/>
-                <a:cs typeface="Courier New" panose="02070309020205020404" pitchFamily="49" charset="0"/>
-              </a:rPr>
-              <a:t>String word = "Hello";</a:t>
-            </a:r>
-          </a:p>
-          <a:p>
-            <a:pPr marL="0" indent="0">
-              <a:buNone/>
-            </a:pPr>
-            <a:r>
-              <a:rPr lang="en-US" sz="2000">
-                <a:latin typeface="Courier New" panose="02070309020205020404" pitchFamily="49" charset="0"/>
-                <a:cs typeface="Courier New" panose="02070309020205020404" pitchFamily="49" charset="0"/>
-              </a:rPr>
-              <a:t>int </a:t>
-            </a:r>
-            <a:r>
-              <a:rPr lang="en-US" sz="2000" err="1">
-                <a:latin typeface="Courier New" panose="02070309020205020404" pitchFamily="49" charset="0"/>
-                <a:cs typeface="Courier New" panose="02070309020205020404" pitchFamily="49" charset="0"/>
-              </a:rPr>
-              <a:t>characterCount</a:t>
-            </a:r>
-            <a:r>
-              <a:rPr lang="en-US" sz="2000">
-                <a:latin typeface="Courier New" panose="02070309020205020404" pitchFamily="49" charset="0"/>
-                <a:cs typeface="Courier New" panose="02070309020205020404" pitchFamily="49" charset="0"/>
-              </a:rPr>
-              <a:t> = </a:t>
-            </a:r>
-            <a:r>
-              <a:rPr lang="en-US" sz="2000" err="1">
-                <a:latin typeface="Courier New" panose="02070309020205020404" pitchFamily="49" charset="0"/>
-                <a:cs typeface="Courier New" panose="02070309020205020404" pitchFamily="49" charset="0"/>
-              </a:rPr>
-              <a:t>word.length</a:t>
-            </a:r>
-            <a:r>
-              <a:rPr lang="en-US" sz="2000">
-                <a:latin typeface="Courier New" panose="02070309020205020404" pitchFamily="49" charset="0"/>
-                <a:cs typeface="Courier New" panose="02070309020205020404" pitchFamily="49" charset="0"/>
-              </a:rPr>
-              <a:t>();</a:t>
-            </a:r>
-          </a:p>
-          <a:p>
-            <a:pPr marL="0" indent="0">
-              <a:buNone/>
-            </a:pPr>
-            <a:r>
-              <a:rPr lang="en-US" sz="2000">
-                <a:latin typeface="Courier New" panose="02070309020205020404" pitchFamily="49" charset="0"/>
-                <a:cs typeface="Courier New" panose="02070309020205020404" pitchFamily="49" charset="0"/>
-              </a:rPr>
-              <a:t>// String uses length()</a:t>
-            </a:r>
-          </a:p>
-          <a:p>
-            <a:pPr marL="0" indent="0">
-              <a:buNone/>
-            </a:pPr>
-            <a:endParaRPr lang="en-US" sz="2000"/>
+            <a:r>
+              <a:rPr lang="en-US" strike="sngStrike" dirty="0"/>
+              <a:t>Help: Piazza, TA Help Hours, Panopto Videos</a:t>
+            </a:r>
+          </a:p>
+          <a:p>
+            <a:r>
+              <a:rPr lang="en-US" strike="sngStrike" dirty="0"/>
+              <a:t>Quizzes</a:t>
+            </a:r>
+          </a:p>
+          <a:p>
+            <a:r>
+              <a:rPr lang="en-US" strike="sngStrike" dirty="0"/>
+              <a:t>Academic Integrity</a:t>
+            </a:r>
+          </a:p>
+          <a:p>
+            <a:r>
+              <a:rPr lang="en-US" dirty="0"/>
+              <a:t>Review:</a:t>
+            </a:r>
+          </a:p>
+          <a:p>
+            <a:pPr lvl="1"/>
+            <a:r>
+              <a:rPr lang="en-US" dirty="0"/>
+              <a:t>Coding Gotchas</a:t>
+            </a:r>
+          </a:p>
+          <a:p>
+            <a:pPr lvl="1"/>
+            <a:r>
+              <a:rPr lang="en-US" dirty="0"/>
+              <a:t>Enhanced for loops</a:t>
+            </a:r>
+          </a:p>
+          <a:p>
+            <a:r>
+              <a:rPr lang="en-US" dirty="0"/>
+              <a:t>2D Arrays</a:t>
+            </a:r>
+          </a:p>
+          <a:p>
+            <a:r>
+              <a:rPr lang="en-US" dirty="0"/>
+              <a:t>Maps</a:t>
+            </a:r>
           </a:p>
         </p:txBody>
       </p:sp>
     </p:spTree>
     <p:extLst>
       <p:ext uri="{BB962C8B-B14F-4D97-AF65-F5344CB8AC3E}">
-        <p14:creationId xmlns:p14="http://schemas.microsoft.com/office/powerpoint/2010/main" val="1892145613"/>
+        <p14:creationId xmlns:p14="http://schemas.microsoft.com/office/powerpoint/2010/main" val="3075912542"/>
       </p:ext>
     </p:extLst>
   </p:cSld>
@@ -6921,6 +6644,373 @@
           <a:p>
             <a:r>
               <a:rPr lang="en-US"/>
+              <a:t>Coding Gotchas – the </a:t>
+            </a:r>
+            <a:r>
+              <a:rPr lang="en-US" i="1"/>
+              <a:t>size</a:t>
+            </a:r>
+            <a:r>
+              <a:rPr lang="en-US"/>
+              <a:t> of things</a:t>
+            </a:r>
+          </a:p>
+        </p:txBody>
+      </p:sp>
+      <p:sp>
+        <p:nvSpPr>
+          <p:cNvPr id="3" name="Content Placeholder 2"/>
+          <p:cNvSpPr>
+            <a:spLocks noGrp="1"/>
+          </p:cNvSpPr>
+          <p:nvPr>
+            <p:ph idx="1"/>
+          </p:nvPr>
+        </p:nvSpPr>
+        <p:spPr>
+          <a:xfrm>
+            <a:off x="457200" y="1417638"/>
+            <a:ext cx="8382000" cy="4525963"/>
+          </a:xfrm>
+        </p:spPr>
+        <p:txBody>
+          <a:bodyPr>
+            <a:normAutofit/>
+          </a:bodyPr>
+          <a:lstStyle/>
+          <a:p>
+            <a:pPr marL="0" indent="0">
+              <a:buNone/>
+            </a:pPr>
+            <a:r>
+              <a:rPr lang="en-US" sz="2000" dirty="0">
+                <a:latin typeface="Courier New" panose="02070309020205020404" pitchFamily="49" charset="0"/>
+                <a:cs typeface="Courier New" panose="02070309020205020404" pitchFamily="49" charset="0"/>
+              </a:rPr>
+              <a:t>int[] numbers = { 2, 4, 8, 16};</a:t>
+            </a:r>
+          </a:p>
+          <a:p>
+            <a:pPr marL="0" indent="0">
+              <a:buNone/>
+            </a:pPr>
+            <a:r>
+              <a:rPr lang="en-US" sz="2000" dirty="0">
+                <a:latin typeface="Courier New" panose="02070309020205020404" pitchFamily="49" charset="0"/>
+                <a:cs typeface="Courier New" panose="02070309020205020404" pitchFamily="49" charset="0"/>
+              </a:rPr>
+              <a:t>int </a:t>
+            </a:r>
+            <a:r>
+              <a:rPr lang="en-US" sz="2000" dirty="0" err="1">
+                <a:latin typeface="Courier New" panose="02070309020205020404" pitchFamily="49" charset="0"/>
+                <a:cs typeface="Courier New" panose="02070309020205020404" pitchFamily="49" charset="0"/>
+              </a:rPr>
+              <a:t>numbersCount</a:t>
+            </a:r>
+            <a:r>
+              <a:rPr lang="en-US" sz="2000" dirty="0">
+                <a:latin typeface="Courier New" panose="02070309020205020404" pitchFamily="49" charset="0"/>
+                <a:cs typeface="Courier New" panose="02070309020205020404" pitchFamily="49" charset="0"/>
+              </a:rPr>
+              <a:t> = </a:t>
+            </a:r>
+            <a:r>
+              <a:rPr lang="en-US" sz="2000" dirty="0" err="1">
+                <a:latin typeface="Courier New" panose="02070309020205020404" pitchFamily="49" charset="0"/>
+                <a:cs typeface="Courier New" panose="02070309020205020404" pitchFamily="49" charset="0"/>
+              </a:rPr>
+              <a:t>numbers.length</a:t>
+            </a:r>
+            <a:r>
+              <a:rPr lang="en-US" sz="2000" dirty="0">
+                <a:latin typeface="Courier New" panose="02070309020205020404" pitchFamily="49" charset="0"/>
+                <a:cs typeface="Courier New" panose="02070309020205020404" pitchFamily="49" charset="0"/>
+              </a:rPr>
+              <a:t>;</a:t>
+            </a:r>
+          </a:p>
+          <a:p>
+            <a:pPr marL="0" indent="0">
+              <a:buNone/>
+            </a:pPr>
+            <a:r>
+              <a:rPr lang="en-US" sz="2000" dirty="0">
+                <a:latin typeface="Courier New" panose="02070309020205020404" pitchFamily="49" charset="0"/>
+                <a:cs typeface="Courier New" panose="02070309020205020404" pitchFamily="49" charset="0"/>
+              </a:rPr>
+              <a:t>// Java array uses 'length'</a:t>
+            </a:r>
+          </a:p>
+          <a:p>
+            <a:pPr marL="0" indent="0">
+              <a:buNone/>
+            </a:pPr>
+            <a:endParaRPr lang="en-US" sz="2000" dirty="0">
+              <a:latin typeface="Courier New" panose="02070309020205020404" pitchFamily="49" charset="0"/>
+              <a:cs typeface="Courier New" panose="02070309020205020404" pitchFamily="49" charset="0"/>
+            </a:endParaRPr>
+          </a:p>
+          <a:p>
+            <a:pPr marL="0" indent="0">
+              <a:buNone/>
+            </a:pPr>
+            <a:r>
+              <a:rPr lang="en-US" sz="2000" dirty="0" err="1">
+                <a:latin typeface="Courier New" panose="02070309020205020404" pitchFamily="49" charset="0"/>
+                <a:cs typeface="Courier New" panose="02070309020205020404" pitchFamily="49" charset="0"/>
+              </a:rPr>
+              <a:t>ArrayList</a:t>
+            </a:r>
+            <a:r>
+              <a:rPr lang="en-US" sz="2000" dirty="0">
+                <a:latin typeface="Courier New" panose="02070309020205020404" pitchFamily="49" charset="0"/>
+                <a:cs typeface="Courier New" panose="02070309020205020404" pitchFamily="49" charset="0"/>
+              </a:rPr>
+              <a:t>&lt;String&gt; words = </a:t>
+            </a:r>
+            <a:r>
+              <a:rPr lang="en-US" sz="2000" b="1" dirty="0">
+                <a:latin typeface="Courier New" panose="02070309020205020404" pitchFamily="49" charset="0"/>
+                <a:cs typeface="Courier New" panose="02070309020205020404" pitchFamily="49" charset="0"/>
+              </a:rPr>
+              <a:t>new</a:t>
+            </a:r>
+            <a:r>
+              <a:rPr lang="en-US" sz="2000" dirty="0">
+                <a:latin typeface="Courier New" panose="02070309020205020404" pitchFamily="49" charset="0"/>
+                <a:cs typeface="Courier New" panose="02070309020205020404" pitchFamily="49" charset="0"/>
+              </a:rPr>
+              <a:t> </a:t>
+            </a:r>
+            <a:r>
+              <a:rPr lang="en-US" sz="2000" dirty="0" err="1">
+                <a:latin typeface="Courier New" panose="02070309020205020404" pitchFamily="49" charset="0"/>
+                <a:cs typeface="Courier New" panose="02070309020205020404" pitchFamily="49" charset="0"/>
+              </a:rPr>
+              <a:t>ArrayList</a:t>
+            </a:r>
+            <a:r>
+              <a:rPr lang="en-US" sz="2000" dirty="0">
+                <a:latin typeface="Courier New" panose="02070309020205020404" pitchFamily="49" charset="0"/>
+                <a:cs typeface="Courier New" panose="02070309020205020404" pitchFamily="49" charset="0"/>
+              </a:rPr>
+              <a:t>&lt;String&gt;();</a:t>
+            </a:r>
+          </a:p>
+          <a:p>
+            <a:pPr marL="0" indent="0">
+              <a:buNone/>
+            </a:pPr>
+            <a:r>
+              <a:rPr lang="en-US" sz="2000" dirty="0" err="1">
+                <a:latin typeface="Courier New" panose="02070309020205020404" pitchFamily="49" charset="0"/>
+                <a:cs typeface="Courier New" panose="02070309020205020404" pitchFamily="49" charset="0"/>
+              </a:rPr>
+              <a:t>words.add</a:t>
+            </a:r>
+            <a:r>
+              <a:rPr lang="en-US" sz="2000" dirty="0">
+                <a:latin typeface="Courier New" panose="02070309020205020404" pitchFamily="49" charset="0"/>
+                <a:cs typeface="Courier New" panose="02070309020205020404" pitchFamily="49" charset="0"/>
+              </a:rPr>
+              <a:t>("Hello!");</a:t>
+            </a:r>
+          </a:p>
+          <a:p>
+            <a:pPr marL="0" indent="0">
+              <a:buNone/>
+            </a:pPr>
+            <a:r>
+              <a:rPr lang="en-US" sz="2000" dirty="0">
+                <a:latin typeface="Courier New" panose="02070309020205020404" pitchFamily="49" charset="0"/>
+                <a:cs typeface="Courier New" panose="02070309020205020404" pitchFamily="49" charset="0"/>
+              </a:rPr>
+              <a:t>int </a:t>
+            </a:r>
+            <a:r>
+              <a:rPr lang="en-US" sz="2000" dirty="0" err="1">
+                <a:latin typeface="Courier New" panose="02070309020205020404" pitchFamily="49" charset="0"/>
+                <a:cs typeface="Courier New" panose="02070309020205020404" pitchFamily="49" charset="0"/>
+              </a:rPr>
+              <a:t>wordsCount</a:t>
+            </a:r>
+            <a:r>
+              <a:rPr lang="en-US" sz="2000" dirty="0">
+                <a:latin typeface="Courier New" panose="02070309020205020404" pitchFamily="49" charset="0"/>
+                <a:cs typeface="Courier New" panose="02070309020205020404" pitchFamily="49" charset="0"/>
+              </a:rPr>
+              <a:t> = </a:t>
+            </a:r>
+            <a:r>
+              <a:rPr lang="en-US" sz="2000" dirty="0" err="1">
+                <a:latin typeface="Courier New" panose="02070309020205020404" pitchFamily="49" charset="0"/>
+                <a:cs typeface="Courier New" panose="02070309020205020404" pitchFamily="49" charset="0"/>
+              </a:rPr>
+              <a:t>words.size</a:t>
+            </a:r>
+            <a:r>
+              <a:rPr lang="en-US" sz="2000" dirty="0">
+                <a:latin typeface="Courier New" panose="02070309020205020404" pitchFamily="49" charset="0"/>
+                <a:cs typeface="Courier New" panose="02070309020205020404" pitchFamily="49" charset="0"/>
+              </a:rPr>
+              <a:t>();</a:t>
+            </a:r>
+          </a:p>
+          <a:p>
+            <a:pPr marL="0" indent="0">
+              <a:buNone/>
+            </a:pPr>
+            <a:r>
+              <a:rPr lang="en-US" sz="2000" dirty="0">
+                <a:latin typeface="Courier New" panose="02070309020205020404" pitchFamily="49" charset="0"/>
+                <a:cs typeface="Courier New" panose="02070309020205020404" pitchFamily="49" charset="0"/>
+              </a:rPr>
+              <a:t>// </a:t>
+            </a:r>
+            <a:r>
+              <a:rPr lang="en-US" sz="2000" dirty="0" err="1">
+                <a:latin typeface="Courier New" panose="02070309020205020404" pitchFamily="49" charset="0"/>
+                <a:cs typeface="Courier New" panose="02070309020205020404" pitchFamily="49" charset="0"/>
+              </a:rPr>
+              <a:t>ArrayList</a:t>
+            </a:r>
+            <a:r>
+              <a:rPr lang="en-US" sz="2000" dirty="0">
+                <a:latin typeface="Courier New" panose="02070309020205020404" pitchFamily="49" charset="0"/>
+                <a:cs typeface="Courier New" panose="02070309020205020404" pitchFamily="49" charset="0"/>
+              </a:rPr>
+              <a:t> uses 'size()'</a:t>
+            </a:r>
+          </a:p>
+          <a:p>
+            <a:pPr marL="0" indent="0">
+              <a:buNone/>
+            </a:pPr>
+            <a:endParaRPr lang="en-US" sz="2000" dirty="0">
+              <a:latin typeface="Courier New" panose="02070309020205020404" pitchFamily="49" charset="0"/>
+              <a:cs typeface="Courier New" panose="02070309020205020404" pitchFamily="49" charset="0"/>
+            </a:endParaRPr>
+          </a:p>
+          <a:p>
+            <a:pPr marL="0" indent="0">
+              <a:buNone/>
+            </a:pPr>
+            <a:r>
+              <a:rPr lang="en-US" sz="2000" dirty="0">
+                <a:latin typeface="Courier New" panose="02070309020205020404" pitchFamily="49" charset="0"/>
+                <a:cs typeface="Courier New" panose="02070309020205020404" pitchFamily="49" charset="0"/>
+              </a:rPr>
+              <a:t>String word = "Hello";</a:t>
+            </a:r>
+          </a:p>
+          <a:p>
+            <a:pPr marL="0" indent="0">
+              <a:buNone/>
+            </a:pPr>
+            <a:r>
+              <a:rPr lang="en-US" sz="2000" dirty="0">
+                <a:latin typeface="Courier New" panose="02070309020205020404" pitchFamily="49" charset="0"/>
+                <a:cs typeface="Courier New" panose="02070309020205020404" pitchFamily="49" charset="0"/>
+              </a:rPr>
+              <a:t>int </a:t>
+            </a:r>
+            <a:r>
+              <a:rPr lang="en-US" sz="2000" dirty="0" err="1">
+                <a:latin typeface="Courier New" panose="02070309020205020404" pitchFamily="49" charset="0"/>
+                <a:cs typeface="Courier New" panose="02070309020205020404" pitchFamily="49" charset="0"/>
+              </a:rPr>
+              <a:t>characterCount</a:t>
+            </a:r>
+            <a:r>
+              <a:rPr lang="en-US" sz="2000" dirty="0">
+                <a:latin typeface="Courier New" panose="02070309020205020404" pitchFamily="49" charset="0"/>
+                <a:cs typeface="Courier New" panose="02070309020205020404" pitchFamily="49" charset="0"/>
+              </a:rPr>
+              <a:t> = </a:t>
+            </a:r>
+            <a:r>
+              <a:rPr lang="en-US" sz="2000" dirty="0" err="1">
+                <a:latin typeface="Courier New" panose="02070309020205020404" pitchFamily="49" charset="0"/>
+                <a:cs typeface="Courier New" panose="02070309020205020404" pitchFamily="49" charset="0"/>
+              </a:rPr>
+              <a:t>word.length</a:t>
+            </a:r>
+            <a:r>
+              <a:rPr lang="en-US" sz="2000" dirty="0">
+                <a:latin typeface="Courier New" panose="02070309020205020404" pitchFamily="49" charset="0"/>
+                <a:cs typeface="Courier New" panose="02070309020205020404" pitchFamily="49" charset="0"/>
+              </a:rPr>
+              <a:t>();</a:t>
+            </a:r>
+          </a:p>
+          <a:p>
+            <a:pPr marL="0" indent="0">
+              <a:buNone/>
+            </a:pPr>
+            <a:r>
+              <a:rPr lang="en-US" sz="2000" dirty="0">
+                <a:latin typeface="Courier New" panose="02070309020205020404" pitchFamily="49" charset="0"/>
+                <a:cs typeface="Courier New" panose="02070309020205020404" pitchFamily="49" charset="0"/>
+              </a:rPr>
+              <a:t>// String uses length()</a:t>
+            </a:r>
+          </a:p>
+          <a:p>
+            <a:pPr marL="0" indent="0">
+              <a:buNone/>
+            </a:pPr>
+            <a:endParaRPr lang="en-US" sz="2000" dirty="0"/>
+          </a:p>
+        </p:txBody>
+      </p:sp>
+    </p:spTree>
+    <p:extLst>
+      <p:ext uri="{BB962C8B-B14F-4D97-AF65-F5344CB8AC3E}">
+        <p14:creationId xmlns:p14="http://schemas.microsoft.com/office/powerpoint/2010/main" val="1892145613"/>
+      </p:ext>
+    </p:extLst>
+  </p:cSld>
+  <p:clrMapOvr>
+    <a:masterClrMapping/>
+  </p:clrMapOvr>
+</p:sld>
+</file>
+
+<file path=ppt/slides/slide21.xml><?xml version="1.0" encoding="utf-8"?>
+<p:sld xmlns:a="http://schemas.openxmlformats.org/drawingml/2006/main" xmlns:r="http://schemas.openxmlformats.org/officeDocument/2006/relationships" xmlns:p="http://schemas.openxmlformats.org/presentationml/2006/main">
+  <p:cSld>
+    <p:spTree>
+      <p:nvGrpSpPr>
+        <p:cNvPr id="1" name=""/>
+        <p:cNvGrpSpPr/>
+        <p:nvPr/>
+      </p:nvGrpSpPr>
+      <p:grpSpPr>
+        <a:xfrm>
+          <a:off x="0" y="0"/>
+          <a:ext cx="0" cy="0"/>
+          <a:chOff x="0" y="0"/>
+          <a:chExt cx="0" cy="0"/>
+        </a:xfrm>
+      </p:grpSpPr>
+      <p:sp>
+        <p:nvSpPr>
+          <p:cNvPr id="2" name="Title 1"/>
+          <p:cNvSpPr>
+            <a:spLocks noGrp="1"/>
+          </p:cNvSpPr>
+          <p:nvPr>
+            <p:ph type="title"/>
+          </p:nvPr>
+        </p:nvSpPr>
+        <p:spPr/>
+        <p:txBody>
+          <a:bodyPr/>
+          <a:lstStyle/>
+          <a:p>
+            <a:r>
+              <a:rPr lang="en-US"/>
               <a:t>Enhanced For Loops</a:t>
             </a:r>
           </a:p>
@@ -7072,7 +7162,7 @@
 </p:sld>
 </file>
 
-<file path=ppt/slides/slide21.xml><?xml version="1.0" encoding="utf-8"?>
+<file path=ppt/slides/slide22.xml><?xml version="1.0" encoding="utf-8"?>
 <p:sld xmlns:a="http://schemas.openxmlformats.org/drawingml/2006/main" xmlns:r="http://schemas.openxmlformats.org/officeDocument/2006/relationships" xmlns:p="http://schemas.openxmlformats.org/presentationml/2006/main">
   <p:cSld>
     <p:spTree>
@@ -7821,8 +7911,8 @@
           </p:nvSpPr>
           <p:spPr>
             <a:xfrm>
-              <a:off x="0" y="161175"/>
-              <a:ext cx="2590800" cy="1963650"/>
+              <a:off x="92528" y="219670"/>
+              <a:ext cx="2405743" cy="1846659"/>
             </a:xfrm>
             <a:prstGeom prst="rect">
               <a:avLst/>
@@ -7845,13 +7935,13 @@
             </a:bodyPr>
             <a:lstStyle/>
             <a:p>
-              <a:pPr marL="508000" lvl="0" indent="-508000">
+              <a:pPr marL="342900" lvl="0" indent="-342900">
                 <a:buSzPct val="100000"/>
-                <a:buFont typeface="Wingdings"/>
-                <a:buChar char="➢"/>
+                <a:buFont typeface="Arial" panose="020B0604020202020204" pitchFamily="34" charset="0"/>
+                <a:buChar char="•"/>
               </a:pPr>
               <a:r>
-                <a:rPr sz="2000">
+                <a:rPr sz="2000" dirty="0">
                   <a:solidFill>
                     <a:srgbClr val="FFFFFF"/>
                   </a:solidFill>
@@ -7859,7 +7949,7 @@
                 <a:t>No index variable </a:t>
               </a:r>
               <a:r>
-                <a:rPr sz="2000" b="1">
+                <a:rPr sz="2000" b="1" dirty="0">
                   <a:solidFill>
                     <a:srgbClr val="FFFFFF"/>
                   </a:solidFill>
@@ -7868,13 +7958,13 @@
               </a:r>
             </a:p>
             <a:p>
-              <a:pPr marL="508000" lvl="0" indent="-508000">
+              <a:pPr marL="342900" lvl="0" indent="-342900">
                 <a:buSzPct val="100000"/>
-                <a:buFont typeface="Wingdings"/>
-                <a:buChar char="➢"/>
+                <a:buFont typeface="Arial" panose="020B0604020202020204" pitchFamily="34" charset="0"/>
+                <a:buChar char="•"/>
               </a:pPr>
               <a:r>
-                <a:rPr sz="2000">
+                <a:rPr sz="2000" dirty="0">
                   <a:solidFill>
                     <a:srgbClr val="FFFFFF"/>
                   </a:solidFill>
@@ -7882,7 +7972,7 @@
                 <a:t>Gives a name (</a:t>
               </a:r>
               <a:r>
-                <a:rPr sz="2000" b="1">
+                <a:rPr sz="2000" b="1" dirty="0">
                   <a:solidFill>
                     <a:srgbClr val="FFFFFF"/>
                   </a:solidFill>
@@ -7894,7 +7984,7 @@
                 <a:t>score</a:t>
               </a:r>
               <a:r>
-                <a:rPr sz="2000">
+                <a:rPr sz="2000" dirty="0">
                   <a:solidFill>
                     <a:srgbClr val="FFFFFF"/>
                   </a:solidFill>
@@ -8227,7 +8317,7 @@
 </p:sld>
 </file>
 
-<file path=ppt/slides/slide22.xml><?xml version="1.0" encoding="utf-8"?>
+<file path=ppt/slides/slide23.xml><?xml version="1.0" encoding="utf-8"?>
 <p:sld xmlns:a="http://schemas.openxmlformats.org/drawingml/2006/main" xmlns:r="http://schemas.openxmlformats.org/officeDocument/2006/relationships" xmlns:p="http://schemas.openxmlformats.org/presentationml/2006/main">
   <p:cSld>
     <p:spTree>
@@ -9530,7 +9620,15 @@
           <a:p>
             <a:r>
               <a:rPr lang="en-US" dirty="0"/>
-              <a:t>You can post questions relating to quizzes on Piazza even sharing your code</a:t>
+              <a:t>You can post questions relating to </a:t>
+            </a:r>
+            <a:r>
+              <a:rPr lang="en-US" u="sng" dirty="0"/>
+              <a:t>quizzes</a:t>
+            </a:r>
+            <a:r>
+              <a:rPr lang="en-US" dirty="0"/>
+              <a:t> on Piazza even sharing your code</a:t>
             </a:r>
           </a:p>
         </p:txBody>
@@ -9581,8 +9679,8 @@
           <a:lstStyle/>
           <a:p>
             <a:r>
-              <a:rPr lang="en-US"/>
-              <a:t>An aside: academic honesty in CS</a:t>
+              <a:rPr lang="en-US" dirty="0"/>
+              <a:t>Academic Integrity in CS</a:t>
             </a:r>
           </a:p>
         </p:txBody>
@@ -9608,7 +9706,7 @@
           <a:lstStyle/>
           <a:p>
             <a:r>
-              <a:rPr lang="en-US"/>
+              <a:rPr lang="en-US" dirty="0"/>
               <a:t>Please do not collaborate on homework assignments beyond what is allowed</a:t>
             </a:r>
           </a:p>

</xml_diff>

<commit_message>
Add ChatGPT section to Academic Integrity slides.
</commit_message>
<xml_diff>
--- a/ClassMaterials/2DArraysAndMaps/Slides/Part1-Help-and-Academic-Integrity.pptx
+++ b/ClassMaterials/2DArraysAndMaps/Slides/Part1-Help-and-Academic-Integrity.pptx
@@ -321,7 +321,7 @@
               <a:pPr>
                 <a:defRPr/>
               </a:pPr>
-              <a:t>11/30/2022</a:t>
+              <a:t>9/1/2023</a:t>
             </a:fld>
             <a:endParaRPr lang="en-US"/>
           </a:p>
@@ -556,7 +556,7 @@
               <a:pPr>
                 <a:defRPr/>
               </a:pPr>
-              <a:t>11/30/2022</a:t>
+              <a:t>9/1/2023</a:t>
             </a:fld>
             <a:endParaRPr lang="en-US"/>
           </a:p>
@@ -2303,7 +2303,7 @@
               <a:pPr>
                 <a:defRPr/>
               </a:pPr>
-              <a:t>Wednesday, November 30, 2022</a:t>
+              <a:t>Friday, September 1, 2023</a:t>
             </a:fld>
             <a:endParaRPr lang="en-US"/>
           </a:p>
@@ -2486,7 +2486,7 @@
               <a:pPr>
                 <a:defRPr/>
               </a:pPr>
-              <a:t>Wednesday, November 30, 2022</a:t>
+              <a:t>Friday, September 1, 2023</a:t>
             </a:fld>
             <a:endParaRPr lang="en-US"/>
           </a:p>
@@ -2679,7 +2679,7 @@
               <a:pPr>
                 <a:defRPr/>
               </a:pPr>
-              <a:t>Wednesday, November 30, 2022</a:t>
+              <a:t>Friday, September 1, 2023</a:t>
             </a:fld>
             <a:endParaRPr lang="en-US"/>
           </a:p>
@@ -2862,7 +2862,7 @@
               <a:pPr>
                 <a:defRPr/>
               </a:pPr>
-              <a:t>Wednesday, November 30, 2022</a:t>
+              <a:t>Friday, September 1, 2023</a:t>
             </a:fld>
             <a:endParaRPr lang="en-US"/>
           </a:p>
@@ -3122,7 +3122,7 @@
               <a:pPr>
                 <a:defRPr/>
               </a:pPr>
-              <a:t>Wednesday, November 30, 2022</a:t>
+              <a:t>Friday, September 1, 2023</a:t>
             </a:fld>
             <a:endParaRPr lang="en-US"/>
           </a:p>
@@ -3422,7 +3422,7 @@
               <a:pPr>
                 <a:defRPr/>
               </a:pPr>
-              <a:t>Wednesday, November 30, 2022</a:t>
+              <a:t>Friday, September 1, 2023</a:t>
             </a:fld>
             <a:endParaRPr lang="en-US"/>
           </a:p>
@@ -3856,7 +3856,7 @@
               <a:pPr>
                 <a:defRPr/>
               </a:pPr>
-              <a:t>Wednesday, November 30, 2022</a:t>
+              <a:t>Friday, September 1, 2023</a:t>
             </a:fld>
             <a:endParaRPr lang="en-US"/>
           </a:p>
@@ -3988,7 +3988,7 @@
               <a:pPr>
                 <a:defRPr/>
               </a:pPr>
-              <a:t>Wednesday, November 30, 2022</a:t>
+              <a:t>Friday, September 1, 2023</a:t>
             </a:fld>
             <a:endParaRPr lang="en-US"/>
           </a:p>
@@ -4098,7 +4098,7 @@
               <a:pPr>
                 <a:defRPr/>
               </a:pPr>
-              <a:t>Wednesday, November 30, 2022</a:t>
+              <a:t>Friday, September 1, 2023</a:t>
             </a:fld>
             <a:endParaRPr lang="en-US"/>
           </a:p>
@@ -4388,7 +4388,7 @@
               <a:pPr>
                 <a:defRPr/>
               </a:pPr>
-              <a:t>Wednesday, November 30, 2022</a:t>
+              <a:t>Friday, September 1, 2023</a:t>
             </a:fld>
             <a:endParaRPr lang="en-US"/>
           </a:p>
@@ -4655,7 +4655,7 @@
               <a:pPr>
                 <a:defRPr/>
               </a:pPr>
-              <a:t>Wednesday, November 30, 2022</a:t>
+              <a:t>Friday, September 1, 2023</a:t>
             </a:fld>
             <a:endParaRPr lang="en-US"/>
           </a:p>
@@ -4881,7 +4881,7 @@
               <a:pPr>
                 <a:defRPr/>
               </a:pPr>
-              <a:t>Wednesday, November 30, 2022</a:t>
+              <a:t>Friday, September 1, 2023</a:t>
             </a:fld>
             <a:endParaRPr lang="en-US"/>
           </a:p>
@@ -5346,14 +5346,14 @@
           <a:p>
             <a:pPr algn="ctr"/>
             <a:r>
-              <a:rPr lang="en-US" sz="2400"/>
-              <a:t>Check out Practice2DArraysAndMaps from </a:t>
-            </a:r>
-            <a:r>
-              <a:rPr lang="en-US" sz="2400" err="1"/>
-              <a:t>Git</a:t>
-            </a:r>
-            <a:endParaRPr lang="en-US" sz="2400"/>
+              <a:rPr lang="en-US" sz="2400" dirty="0"/>
+              <a:t>Today’s Eclipse project: </a:t>
+            </a:r>
+            <a:r>
+              <a:rPr lang="en-US" sz="2400" i="1" dirty="0"/>
+              <a:t>Practice2DArraysAndMaps</a:t>
+            </a:r>
+            <a:endParaRPr lang="en-US" sz="2400" dirty="0"/>
           </a:p>
         </p:txBody>
       </p:sp>
@@ -6069,7 +6069,7 @@
         </p:nvSpPr>
         <p:spPr>
           <a:xfrm>
-            <a:off x="496901" y="3890395"/>
+            <a:off x="590782" y="5846786"/>
             <a:ext cx="7962436" cy="523220"/>
           </a:xfrm>
           <a:prstGeom prst="rect">
@@ -6118,6 +6118,36 @@
           <a:xfrm>
             <a:off x="346957" y="314641"/>
             <a:ext cx="8450086" cy="3404431"/>
+          </a:xfrm>
+          <a:prstGeom prst="rect">
+            <a:avLst/>
+          </a:prstGeom>
+        </p:spPr>
+      </p:pic>
+      <p:pic>
+        <p:nvPicPr>
+          <p:cNvPr id="4" name="Picture 3">
+            <a:extLst>
+              <a:ext uri="{FF2B5EF4-FFF2-40B4-BE49-F238E27FC236}">
+                <a16:creationId xmlns:a16="http://schemas.microsoft.com/office/drawing/2014/main" id="{E2CE9531-AEA4-A4F9-D07A-88FEE0054988}"/>
+              </a:ext>
+            </a:extLst>
+          </p:cNvPr>
+          <p:cNvPicPr>
+            <a:picLocks noChangeAspect="1"/>
+          </p:cNvPicPr>
+          <p:nvPr/>
+        </p:nvPicPr>
+        <p:blipFill>
+          <a:blip r:embed="rId3"/>
+          <a:stretch>
+            <a:fillRect/>
+          </a:stretch>
+        </p:blipFill>
+        <p:spPr>
+          <a:xfrm>
+            <a:off x="173478" y="3719072"/>
+            <a:ext cx="8797043" cy="1404638"/>
           </a:xfrm>
           <a:prstGeom prst="rect">
             <a:avLst/>
@@ -7925,7 +7955,7 @@
             <a:effectLst/>
             <a:extLst>
               <a:ext uri="{C572A759-6A51-4108-AA02-DFA0A04FC94B}">
-                <ma14:wrappingTextBoxFlag xmlns="" xmlns:ma14="http://schemas.microsoft.com/office/mac/drawingml/2011/main" val="1"/>
+                <ma14:wrappingTextBoxFlag xmlns:ma14="http://schemas.microsoft.com/office/mac/drawingml/2011/main" xmlns="" val="1"/>
               </a:ext>
             </a:extLst>
           </p:spPr>
@@ -8145,7 +8175,7 @@
             <a:effectLst/>
             <a:extLst>
               <a:ext uri="{C572A759-6A51-4108-AA02-DFA0A04FC94B}">
-                <ma14:wrappingTextBoxFlag xmlns="" xmlns:ma14="http://schemas.microsoft.com/office/mac/drawingml/2011/main" val="1"/>
+                <ma14:wrappingTextBoxFlag xmlns:ma14="http://schemas.microsoft.com/office/mac/drawingml/2011/main" xmlns="" val="1"/>
               </a:ext>
             </a:extLst>
           </p:spPr>
@@ -9203,7 +9233,7 @@
           <a:p>
             <a:r>
               <a:rPr lang="en-US" dirty="0"/>
-              <a:t>Send message and the video call/screen share w/ TA</a:t>
+              <a:t>Send message, then video call/screen share w/ TA</a:t>
             </a:r>
           </a:p>
         </p:txBody>
@@ -9628,7 +9658,7 @@
             </a:r>
             <a:r>
               <a:rPr lang="en-US" dirty="0"/>
-              <a:t> on Piazza even sharing your code</a:t>
+              <a:t> on Piazza, even sharing your code</a:t>
             </a:r>
           </a:p>
         </p:txBody>
@@ -9680,7 +9710,7 @@
           <a:p>
             <a:r>
               <a:rPr lang="en-US" dirty="0"/>
-              <a:t>Academic Integrity in CS</a:t>
+              <a:t>Academic Integrity in CSSE</a:t>
             </a:r>
           </a:p>
         </p:txBody>
@@ -10077,7 +10107,7 @@
           </a:ln>
           <a:extLst>
             <a:ext uri="{C572A759-6A51-4108-AA02-DFA0A04FC94B}">
-              <ma14:wrappingTextBoxFlag xmlns="" xmlns:ma14="http://schemas.microsoft.com/office/mac/drawingml/2011/main" val="1"/>
+              <ma14:wrappingTextBoxFlag xmlns:ma14="http://schemas.microsoft.com/office/mac/drawingml/2011/main" xmlns="" val="1"/>
             </a:ext>
           </a:extLst>
         </p:spPr>
@@ -11343,18 +11373,18 @@
 </file>
 
 <file path=customXml/item1.xml><?xml version="1.0" encoding="utf-8"?>
-<p:properties xmlns:p="http://schemas.microsoft.com/office/2006/metadata/properties" xmlns:xsi="http://www.w3.org/2001/XMLSchema-instance" xmlns:pc="http://schemas.microsoft.com/office/infopath/2007/PartnerControls">
-  <documentManagement/>
-</p:properties>
-</file>
-
-<file path=customXml/item2.xml><?xml version="1.0" encoding="utf-8"?>
 <?mso-contentType ?>
 <FormTemplates xmlns="http://schemas.microsoft.com/sharepoint/v3/contenttype/forms">
   <Display>DocumentLibraryForm</Display>
   <Edit>DocumentLibraryForm</Edit>
   <New>DocumentLibraryForm</New>
 </FormTemplates>
+</file>
+
+<file path=customXml/item2.xml><?xml version="1.0" encoding="utf-8"?>
+<p:properties xmlns:p="http://schemas.microsoft.com/office/2006/metadata/properties" xmlns:xsi="http://www.w3.org/2001/XMLSchema-instance" xmlns:pc="http://schemas.microsoft.com/office/infopath/2007/PartnerControls">
+  <documentManagement/>
+</p:properties>
 </file>
 
 <file path=customXml/item3.xml><?xml version="1.0" encoding="utf-8"?>
@@ -11490,6 +11520,14 @@
 </file>
 
 <file path=customXml/itemProps1.xml><?xml version="1.0" encoding="utf-8"?>
+<ds:datastoreItem xmlns:ds="http://schemas.openxmlformats.org/officeDocument/2006/customXml" ds:itemID="{17FAF4A3-64B4-43E8-BB8B-B01EB9ECAC06}">
+  <ds:schemaRefs>
+    <ds:schemaRef ds:uri="http://schemas.microsoft.com/sharepoint/v3/contenttype/forms"/>
+  </ds:schemaRefs>
+</ds:datastoreItem>
+</file>
+
+<file path=customXml/itemProps2.xml><?xml version="1.0" encoding="utf-8"?>
 <ds:datastoreItem xmlns:ds="http://schemas.openxmlformats.org/officeDocument/2006/customXml" ds:itemID="{F4E211C1-CD9D-46C8-BE98-ADF55AECFF6A}">
   <ds:schemaRefs>
     <ds:schemaRef ds:uri="79ddb764-415a-4c38-83b7-908be6382bea"/>
@@ -11501,14 +11539,6 @@
     <ds:schemaRef ds:uri="http://schemas.microsoft.com/office/infopath/2007/PartnerControls"/>
     <ds:schemaRef ds:uri="http://schemas.openxmlformats.org/package/2006/metadata/core-properties"/>
     <ds:schemaRef ds:uri="http://www.w3.org/XML/1998/namespace"/>
-  </ds:schemaRefs>
-</ds:datastoreItem>
-</file>
-
-<file path=customXml/itemProps2.xml><?xml version="1.0" encoding="utf-8"?>
-<ds:datastoreItem xmlns:ds="http://schemas.openxmlformats.org/officeDocument/2006/customXml" ds:itemID="{17FAF4A3-64B4-43E8-BB8B-B01EB9ECAC06}">
-  <ds:schemaRefs>
-    <ds:schemaRef ds:uri="http://schemas.microsoft.com/sharepoint/v3/contenttype/forms"/>
   </ds:schemaRefs>
 </ds:datastoreItem>
 </file>

</xml_diff>

<commit_message>
adding team gradebook as dp2 makeup
</commit_message>
<xml_diff>
--- a/ClassMaterials/2DArraysAndMaps/Slides/Part1-Help-and-Academic-Integrity.pptx
+++ b/ClassMaterials/2DArraysAndMaps/Slides/Part1-Help-and-Academic-Integrity.pptx
@@ -196,12 +196,56 @@
 </p:cmAuthorLst>
 </file>
 
-<file path=ppt/revisionInfo.xml><?xml version="1.0" encoding="utf-8"?>
-<p1510:revInfo xmlns:a="http://schemas.openxmlformats.org/drawingml/2006/main" xmlns:r="http://schemas.openxmlformats.org/officeDocument/2006/relationships" xmlns:p1510="http://schemas.microsoft.com/office/powerpoint/2015/10/main">
-  <p1510:revLst>
-    <p1510:client id="{3C1CFE12-58A5-41F5-B330-9BEFD567C01A}" v="5" dt="2022-03-10T19:35:47.335"/>
-  </p1510:revLst>
-</p1510:revInfo>
+<file path=ppt/changesInfos/changesInfo1.xml><?xml version="1.0" encoding="utf-8"?>
+<pc:chgInfo xmlns:a="http://schemas.openxmlformats.org/drawingml/2006/main" xmlns:r="http://schemas.openxmlformats.org/officeDocument/2006/relationships" xmlns:ac="http://schemas.microsoft.com/office/drawing/2013/main/command" xmlns:pc="http://schemas.microsoft.com/office/powerpoint/2013/main/command">
+  <pc:docChgLst>
+    <pc:chgData name="Yoder, Jason" userId="28f4d4d8-da04-4f86-b14d-a21675737bc5" providerId="ADAL" clId="{352AC382-874F-4FF4-9603-68259DF02C25}"/>
+    <pc:docChg chg="modSld">
+      <pc:chgData name="Yoder, Jason" userId="28f4d4d8-da04-4f86-b14d-a21675737bc5" providerId="ADAL" clId="{352AC382-874F-4FF4-9603-68259DF02C25}" dt="2023-09-03T17:30:21.327" v="24" actId="20577"/>
+      <pc:docMkLst>
+        <pc:docMk/>
+      </pc:docMkLst>
+      <pc:sldChg chg="modSp mod">
+        <pc:chgData name="Yoder, Jason" userId="28f4d4d8-da04-4f86-b14d-a21675737bc5" providerId="ADAL" clId="{352AC382-874F-4FF4-9603-68259DF02C25}" dt="2023-09-03T17:30:21.327" v="24" actId="20577"/>
+        <pc:sldMkLst>
+          <pc:docMk/>
+          <pc:sldMk cId="3104463201" sldId="300"/>
+        </pc:sldMkLst>
+        <pc:spChg chg="mod">
+          <ac:chgData name="Yoder, Jason" userId="28f4d4d8-da04-4f86-b14d-a21675737bc5" providerId="ADAL" clId="{352AC382-874F-4FF4-9603-68259DF02C25}" dt="2023-09-03T17:30:21.327" v="24" actId="20577"/>
+          <ac:spMkLst>
+            <pc:docMk/>
+            <pc:sldMk cId="3104463201" sldId="300"/>
+            <ac:spMk id="6" creationId="{B7E260F8-3BD7-93F1-722A-AB733BBC9B0C}"/>
+          </ac:spMkLst>
+        </pc:spChg>
+      </pc:sldChg>
+      <pc:sldChg chg="addSp modSp mod">
+        <pc:chgData name="Yoder, Jason" userId="28f4d4d8-da04-4f86-b14d-a21675737bc5" providerId="ADAL" clId="{352AC382-874F-4FF4-9603-68259DF02C25}" dt="2023-09-03T17:24:17.370" v="21" actId="14100"/>
+        <pc:sldMkLst>
+          <pc:docMk/>
+          <pc:sldMk cId="2569689042" sldId="378"/>
+        </pc:sldMkLst>
+        <pc:spChg chg="mod">
+          <ac:chgData name="Yoder, Jason" userId="28f4d4d8-da04-4f86-b14d-a21675737bc5" providerId="ADAL" clId="{352AC382-874F-4FF4-9603-68259DF02C25}" dt="2023-09-03T17:23:30.222" v="16" actId="1076"/>
+          <ac:spMkLst>
+            <pc:docMk/>
+            <pc:sldMk cId="2569689042" sldId="378"/>
+            <ac:spMk id="6" creationId="{F1A8C8FB-2C27-4E38-AC98-8143A25236B9}"/>
+          </ac:spMkLst>
+        </pc:spChg>
+        <pc:picChg chg="add mod">
+          <ac:chgData name="Yoder, Jason" userId="28f4d4d8-da04-4f86-b14d-a21675737bc5" providerId="ADAL" clId="{352AC382-874F-4FF4-9603-68259DF02C25}" dt="2023-09-03T17:24:17.370" v="21" actId="14100"/>
+          <ac:picMkLst>
+            <pc:docMk/>
+            <pc:sldMk cId="2569689042" sldId="378"/>
+            <ac:picMk id="4" creationId="{0D0D1C8B-9A81-DA9C-4A86-B62E9A2E2EED}"/>
+          </ac:picMkLst>
+        </pc:picChg>
+      </pc:sldChg>
+    </pc:docChg>
+  </pc:docChgLst>
+</pc:chgInfo>
 </file>
 
 <file path=ppt/handoutMasters/handoutMaster1.xml><?xml version="1.0" encoding="utf-8"?>
@@ -321,7 +365,7 @@
               <a:pPr>
                 <a:defRPr/>
               </a:pPr>
-              <a:t>11/30/2022</a:t>
+              <a:t>9/3/2023</a:t>
             </a:fld>
             <a:endParaRPr lang="en-US"/>
           </a:p>
@@ -556,7 +600,7 @@
               <a:pPr>
                 <a:defRPr/>
               </a:pPr>
-              <a:t>11/30/2022</a:t>
+              <a:t>9/3/2023</a:t>
             </a:fld>
             <a:endParaRPr lang="en-US"/>
           </a:p>
@@ -2303,7 +2347,7 @@
               <a:pPr>
                 <a:defRPr/>
               </a:pPr>
-              <a:t>Wednesday, November 30, 2022</a:t>
+              <a:t>Sunday, September 3, 2023</a:t>
             </a:fld>
             <a:endParaRPr lang="en-US"/>
           </a:p>
@@ -2486,7 +2530,7 @@
               <a:pPr>
                 <a:defRPr/>
               </a:pPr>
-              <a:t>Wednesday, November 30, 2022</a:t>
+              <a:t>Sunday, September 3, 2023</a:t>
             </a:fld>
             <a:endParaRPr lang="en-US"/>
           </a:p>
@@ -2679,7 +2723,7 @@
               <a:pPr>
                 <a:defRPr/>
               </a:pPr>
-              <a:t>Wednesday, November 30, 2022</a:t>
+              <a:t>Sunday, September 3, 2023</a:t>
             </a:fld>
             <a:endParaRPr lang="en-US"/>
           </a:p>
@@ -2862,7 +2906,7 @@
               <a:pPr>
                 <a:defRPr/>
               </a:pPr>
-              <a:t>Wednesday, November 30, 2022</a:t>
+              <a:t>Sunday, September 3, 2023</a:t>
             </a:fld>
             <a:endParaRPr lang="en-US"/>
           </a:p>
@@ -3122,7 +3166,7 @@
               <a:pPr>
                 <a:defRPr/>
               </a:pPr>
-              <a:t>Wednesday, November 30, 2022</a:t>
+              <a:t>Sunday, September 3, 2023</a:t>
             </a:fld>
             <a:endParaRPr lang="en-US"/>
           </a:p>
@@ -3422,7 +3466,7 @@
               <a:pPr>
                 <a:defRPr/>
               </a:pPr>
-              <a:t>Wednesday, November 30, 2022</a:t>
+              <a:t>Sunday, September 3, 2023</a:t>
             </a:fld>
             <a:endParaRPr lang="en-US"/>
           </a:p>
@@ -3856,7 +3900,7 @@
               <a:pPr>
                 <a:defRPr/>
               </a:pPr>
-              <a:t>Wednesday, November 30, 2022</a:t>
+              <a:t>Sunday, September 3, 2023</a:t>
             </a:fld>
             <a:endParaRPr lang="en-US"/>
           </a:p>
@@ -3988,7 +4032,7 @@
               <a:pPr>
                 <a:defRPr/>
               </a:pPr>
-              <a:t>Wednesday, November 30, 2022</a:t>
+              <a:t>Sunday, September 3, 2023</a:t>
             </a:fld>
             <a:endParaRPr lang="en-US"/>
           </a:p>
@@ -4098,7 +4142,7 @@
               <a:pPr>
                 <a:defRPr/>
               </a:pPr>
-              <a:t>Wednesday, November 30, 2022</a:t>
+              <a:t>Sunday, September 3, 2023</a:t>
             </a:fld>
             <a:endParaRPr lang="en-US"/>
           </a:p>
@@ -4388,7 +4432,7 @@
               <a:pPr>
                 <a:defRPr/>
               </a:pPr>
-              <a:t>Wednesday, November 30, 2022</a:t>
+              <a:t>Sunday, September 3, 2023</a:t>
             </a:fld>
             <a:endParaRPr lang="en-US"/>
           </a:p>
@@ -4655,7 +4699,7 @@
               <a:pPr>
                 <a:defRPr/>
               </a:pPr>
-              <a:t>Wednesday, November 30, 2022</a:t>
+              <a:t>Sunday, September 3, 2023</a:t>
             </a:fld>
             <a:endParaRPr lang="en-US"/>
           </a:p>
@@ -4881,7 +4925,7 @@
               <a:pPr>
                 <a:defRPr/>
               </a:pPr>
-              <a:t>Wednesday, November 30, 2022</a:t>
+              <a:t>Sunday, September 3, 2023</a:t>
             </a:fld>
             <a:endParaRPr lang="en-US"/>
           </a:p>
@@ -5478,13 +5522,18 @@
           </a:p>
           <a:p>
             <a:r>
-              <a:rPr lang="en-US" sz="4400" dirty="0">
+              <a:rPr lang="en-US" sz="4400" dirty="0" err="1">
                 <a:highlight>
                   <a:srgbClr val="FFFF00"/>
                 </a:highlight>
               </a:rPr>
-              <a:t>__________</a:t>
-            </a:r>
+              <a:t>anarrayofarrays</a:t>
+            </a:r>
+            <a:endParaRPr lang="en-US" sz="4400" dirty="0">
+              <a:highlight>
+                <a:srgbClr val="FFFF00"/>
+              </a:highlight>
+            </a:endParaRPr>
           </a:p>
         </p:txBody>
       </p:sp>
@@ -6069,7 +6118,7 @@
         </p:nvSpPr>
         <p:spPr>
           <a:xfrm>
-            <a:off x="496901" y="3890395"/>
+            <a:off x="508053" y="6020139"/>
             <a:ext cx="7962436" cy="523220"/>
           </a:xfrm>
           <a:prstGeom prst="rect">
@@ -6118,6 +6167,36 @@
           <a:xfrm>
             <a:off x="346957" y="314641"/>
             <a:ext cx="8450086" cy="3404431"/>
+          </a:xfrm>
+          <a:prstGeom prst="rect">
+            <a:avLst/>
+          </a:prstGeom>
+        </p:spPr>
+      </p:pic>
+      <p:pic>
+        <p:nvPicPr>
+          <p:cNvPr id="4" name="Picture 3">
+            <a:extLst>
+              <a:ext uri="{FF2B5EF4-FFF2-40B4-BE49-F238E27FC236}">
+                <a16:creationId xmlns:a16="http://schemas.microsoft.com/office/drawing/2014/main" id="{0D0D1C8B-9A81-DA9C-4A86-B62E9A2E2EED}"/>
+              </a:ext>
+            </a:extLst>
+          </p:cNvPr>
+          <p:cNvPicPr>
+            <a:picLocks noChangeAspect="1"/>
+          </p:cNvPicPr>
+          <p:nvPr/>
+        </p:nvPicPr>
+        <p:blipFill>
+          <a:blip r:embed="rId3"/>
+          <a:stretch>
+            <a:fillRect/>
+          </a:stretch>
+        </p:blipFill>
+        <p:spPr>
+          <a:xfrm>
+            <a:off x="508053" y="3719072"/>
+            <a:ext cx="8130989" cy="1241235"/>
           </a:xfrm>
           <a:prstGeom prst="rect">
             <a:avLst/>
@@ -7925,7 +8004,7 @@
             <a:effectLst/>
             <a:extLst>
               <a:ext uri="{C572A759-6A51-4108-AA02-DFA0A04FC94B}">
-                <ma14:wrappingTextBoxFlag xmlns="" xmlns:ma14="http://schemas.microsoft.com/office/mac/drawingml/2011/main" val="1"/>
+                <ma14:wrappingTextBoxFlag xmlns:ma14="http://schemas.microsoft.com/office/mac/drawingml/2011/main" xmlns="" val="1"/>
               </a:ext>
             </a:extLst>
           </p:spPr>
@@ -8145,7 +8224,7 @@
             <a:effectLst/>
             <a:extLst>
               <a:ext uri="{C572A759-6A51-4108-AA02-DFA0A04FC94B}">
-                <ma14:wrappingTextBoxFlag xmlns="" xmlns:ma14="http://schemas.microsoft.com/office/mac/drawingml/2011/main" val="1"/>
+                <ma14:wrappingTextBoxFlag xmlns:ma14="http://schemas.microsoft.com/office/mac/drawingml/2011/main" xmlns="" val="1"/>
               </a:ext>
             </a:extLst>
           </p:spPr>
@@ -10077,7 +10156,7 @@
           </a:ln>
           <a:extLst>
             <a:ext uri="{C572A759-6A51-4108-AA02-DFA0A04FC94B}">
-              <ma14:wrappingTextBoxFlag xmlns="" xmlns:ma14="http://schemas.microsoft.com/office/mac/drawingml/2011/main" val="1"/>
+              <ma14:wrappingTextBoxFlag xmlns:ma14="http://schemas.microsoft.com/office/mac/drawingml/2011/main" xmlns="" val="1"/>
             </a:ext>
           </a:extLst>
         </p:spPr>
@@ -11343,18 +11422,18 @@
 </file>
 
 <file path=customXml/item1.xml><?xml version="1.0" encoding="utf-8"?>
-<p:properties xmlns:p="http://schemas.microsoft.com/office/2006/metadata/properties" xmlns:xsi="http://www.w3.org/2001/XMLSchema-instance" xmlns:pc="http://schemas.microsoft.com/office/infopath/2007/PartnerControls">
-  <documentManagement/>
-</p:properties>
-</file>
-
-<file path=customXml/item2.xml><?xml version="1.0" encoding="utf-8"?>
 <?mso-contentType ?>
 <FormTemplates xmlns="http://schemas.microsoft.com/sharepoint/v3/contenttype/forms">
   <Display>DocumentLibraryForm</Display>
   <Edit>DocumentLibraryForm</Edit>
   <New>DocumentLibraryForm</New>
 </FormTemplates>
+</file>
+
+<file path=customXml/item2.xml><?xml version="1.0" encoding="utf-8"?>
+<p:properties xmlns:p="http://schemas.microsoft.com/office/2006/metadata/properties" xmlns:xsi="http://www.w3.org/2001/XMLSchema-instance" xmlns:pc="http://schemas.microsoft.com/office/infopath/2007/PartnerControls">
+  <documentManagement/>
+</p:properties>
 </file>
 
 <file path=customXml/item3.xml><?xml version="1.0" encoding="utf-8"?>
@@ -11490,6 +11569,14 @@
 </file>
 
 <file path=customXml/itemProps1.xml><?xml version="1.0" encoding="utf-8"?>
+<ds:datastoreItem xmlns:ds="http://schemas.openxmlformats.org/officeDocument/2006/customXml" ds:itemID="{17FAF4A3-64B4-43E8-BB8B-B01EB9ECAC06}">
+  <ds:schemaRefs>
+    <ds:schemaRef ds:uri="http://schemas.microsoft.com/sharepoint/v3/contenttype/forms"/>
+  </ds:schemaRefs>
+</ds:datastoreItem>
+</file>
+
+<file path=customXml/itemProps2.xml><?xml version="1.0" encoding="utf-8"?>
 <ds:datastoreItem xmlns:ds="http://schemas.openxmlformats.org/officeDocument/2006/customXml" ds:itemID="{F4E211C1-CD9D-46C8-BE98-ADF55AECFF6A}">
   <ds:schemaRefs>
     <ds:schemaRef ds:uri="79ddb764-415a-4c38-83b7-908be6382bea"/>
@@ -11501,14 +11588,6 @@
     <ds:schemaRef ds:uri="http://schemas.microsoft.com/office/infopath/2007/PartnerControls"/>
     <ds:schemaRef ds:uri="http://schemas.openxmlformats.org/package/2006/metadata/core-properties"/>
     <ds:schemaRef ds:uri="http://www.w3.org/XML/1998/namespace"/>
-  </ds:schemaRefs>
-</ds:datastoreItem>
-</file>
-
-<file path=customXml/itemProps2.xml><?xml version="1.0" encoding="utf-8"?>
-<ds:datastoreItem xmlns:ds="http://schemas.openxmlformats.org/officeDocument/2006/customXml" ds:itemID="{17FAF4A3-64B4-43E8-BB8B-B01EB9ECAC06}">
-  <ds:schemaRefs>
-    <ds:schemaRef ds:uri="http://schemas.microsoft.com/sharepoint/v3/contenttype/forms"/>
   </ds:schemaRefs>
 </ds:datastoreItem>
 </file>

</xml_diff>

<commit_message>
Undo Jason's overwrite of class materials starter code/slides.
</commit_message>
<xml_diff>
--- a/ClassMaterials/2DArraysAndMaps/Slides/Part1-Help-and-Academic-Integrity.pptx
+++ b/ClassMaterials/2DArraysAndMaps/Slides/Part1-Help-and-Academic-Integrity.pptx
@@ -196,56 +196,12 @@
 </p:cmAuthorLst>
 </file>
 
-<file path=ppt/changesInfos/changesInfo1.xml><?xml version="1.0" encoding="utf-8"?>
-<pc:chgInfo xmlns:a="http://schemas.openxmlformats.org/drawingml/2006/main" xmlns:r="http://schemas.openxmlformats.org/officeDocument/2006/relationships" xmlns:ac="http://schemas.microsoft.com/office/drawing/2013/main/command" xmlns:pc="http://schemas.microsoft.com/office/powerpoint/2013/main/command">
-  <pc:docChgLst>
-    <pc:chgData name="Yoder, Jason" userId="28f4d4d8-da04-4f86-b14d-a21675737bc5" providerId="ADAL" clId="{352AC382-874F-4FF4-9603-68259DF02C25}"/>
-    <pc:docChg chg="modSld">
-      <pc:chgData name="Yoder, Jason" userId="28f4d4d8-da04-4f86-b14d-a21675737bc5" providerId="ADAL" clId="{352AC382-874F-4FF4-9603-68259DF02C25}" dt="2023-09-03T17:30:21.327" v="24" actId="20577"/>
-      <pc:docMkLst>
-        <pc:docMk/>
-      </pc:docMkLst>
-      <pc:sldChg chg="modSp mod">
-        <pc:chgData name="Yoder, Jason" userId="28f4d4d8-da04-4f86-b14d-a21675737bc5" providerId="ADAL" clId="{352AC382-874F-4FF4-9603-68259DF02C25}" dt="2023-09-03T17:30:21.327" v="24" actId="20577"/>
-        <pc:sldMkLst>
-          <pc:docMk/>
-          <pc:sldMk cId="3104463201" sldId="300"/>
-        </pc:sldMkLst>
-        <pc:spChg chg="mod">
-          <ac:chgData name="Yoder, Jason" userId="28f4d4d8-da04-4f86-b14d-a21675737bc5" providerId="ADAL" clId="{352AC382-874F-4FF4-9603-68259DF02C25}" dt="2023-09-03T17:30:21.327" v="24" actId="20577"/>
-          <ac:spMkLst>
-            <pc:docMk/>
-            <pc:sldMk cId="3104463201" sldId="300"/>
-            <ac:spMk id="6" creationId="{B7E260F8-3BD7-93F1-722A-AB733BBC9B0C}"/>
-          </ac:spMkLst>
-        </pc:spChg>
-      </pc:sldChg>
-      <pc:sldChg chg="addSp modSp mod">
-        <pc:chgData name="Yoder, Jason" userId="28f4d4d8-da04-4f86-b14d-a21675737bc5" providerId="ADAL" clId="{352AC382-874F-4FF4-9603-68259DF02C25}" dt="2023-09-03T17:24:17.370" v="21" actId="14100"/>
-        <pc:sldMkLst>
-          <pc:docMk/>
-          <pc:sldMk cId="2569689042" sldId="378"/>
-        </pc:sldMkLst>
-        <pc:spChg chg="mod">
-          <ac:chgData name="Yoder, Jason" userId="28f4d4d8-da04-4f86-b14d-a21675737bc5" providerId="ADAL" clId="{352AC382-874F-4FF4-9603-68259DF02C25}" dt="2023-09-03T17:23:30.222" v="16" actId="1076"/>
-          <ac:spMkLst>
-            <pc:docMk/>
-            <pc:sldMk cId="2569689042" sldId="378"/>
-            <ac:spMk id="6" creationId="{F1A8C8FB-2C27-4E38-AC98-8143A25236B9}"/>
-          </ac:spMkLst>
-        </pc:spChg>
-        <pc:picChg chg="add mod">
-          <ac:chgData name="Yoder, Jason" userId="28f4d4d8-da04-4f86-b14d-a21675737bc5" providerId="ADAL" clId="{352AC382-874F-4FF4-9603-68259DF02C25}" dt="2023-09-03T17:24:17.370" v="21" actId="14100"/>
-          <ac:picMkLst>
-            <pc:docMk/>
-            <pc:sldMk cId="2569689042" sldId="378"/>
-            <ac:picMk id="4" creationId="{0D0D1C8B-9A81-DA9C-4A86-B62E9A2E2EED}"/>
-          </ac:picMkLst>
-        </pc:picChg>
-      </pc:sldChg>
-    </pc:docChg>
-  </pc:docChgLst>
-</pc:chgInfo>
+<file path=ppt/revisionInfo.xml><?xml version="1.0" encoding="utf-8"?>
+<p1510:revInfo xmlns:a="http://schemas.openxmlformats.org/drawingml/2006/main" xmlns:r="http://schemas.openxmlformats.org/officeDocument/2006/relationships" xmlns:p1510="http://schemas.microsoft.com/office/powerpoint/2015/10/main">
+  <p1510:revLst>
+    <p1510:client id="{3C1CFE12-58A5-41F5-B330-9BEFD567C01A}" v="5" dt="2022-03-10T19:35:47.335"/>
+  </p1510:revLst>
+</p1510:revInfo>
 </file>
 
 <file path=ppt/handoutMasters/handoutMaster1.xml><?xml version="1.0" encoding="utf-8"?>
@@ -365,7 +321,7 @@
               <a:pPr>
                 <a:defRPr/>
               </a:pPr>
-              <a:t>9/3/2023</a:t>
+              <a:t>9/1/2023</a:t>
             </a:fld>
             <a:endParaRPr lang="en-US"/>
           </a:p>
@@ -600,7 +556,7 @@
               <a:pPr>
                 <a:defRPr/>
               </a:pPr>
-              <a:t>9/3/2023</a:t>
+              <a:t>9/1/2023</a:t>
             </a:fld>
             <a:endParaRPr lang="en-US"/>
           </a:p>
@@ -2347,7 +2303,7 @@
               <a:pPr>
                 <a:defRPr/>
               </a:pPr>
-              <a:t>Sunday, September 3, 2023</a:t>
+              <a:t>Friday, September 1, 2023</a:t>
             </a:fld>
             <a:endParaRPr lang="en-US"/>
           </a:p>
@@ -2530,7 +2486,7 @@
               <a:pPr>
                 <a:defRPr/>
               </a:pPr>
-              <a:t>Sunday, September 3, 2023</a:t>
+              <a:t>Friday, September 1, 2023</a:t>
             </a:fld>
             <a:endParaRPr lang="en-US"/>
           </a:p>
@@ -2723,7 +2679,7 @@
               <a:pPr>
                 <a:defRPr/>
               </a:pPr>
-              <a:t>Sunday, September 3, 2023</a:t>
+              <a:t>Friday, September 1, 2023</a:t>
             </a:fld>
             <a:endParaRPr lang="en-US"/>
           </a:p>
@@ -2906,7 +2862,7 @@
               <a:pPr>
                 <a:defRPr/>
               </a:pPr>
-              <a:t>Sunday, September 3, 2023</a:t>
+              <a:t>Friday, September 1, 2023</a:t>
             </a:fld>
             <a:endParaRPr lang="en-US"/>
           </a:p>
@@ -3166,7 +3122,7 @@
               <a:pPr>
                 <a:defRPr/>
               </a:pPr>
-              <a:t>Sunday, September 3, 2023</a:t>
+              <a:t>Friday, September 1, 2023</a:t>
             </a:fld>
             <a:endParaRPr lang="en-US"/>
           </a:p>
@@ -3466,7 +3422,7 @@
               <a:pPr>
                 <a:defRPr/>
               </a:pPr>
-              <a:t>Sunday, September 3, 2023</a:t>
+              <a:t>Friday, September 1, 2023</a:t>
             </a:fld>
             <a:endParaRPr lang="en-US"/>
           </a:p>
@@ -3900,7 +3856,7 @@
               <a:pPr>
                 <a:defRPr/>
               </a:pPr>
-              <a:t>Sunday, September 3, 2023</a:t>
+              <a:t>Friday, September 1, 2023</a:t>
             </a:fld>
             <a:endParaRPr lang="en-US"/>
           </a:p>
@@ -4032,7 +3988,7 @@
               <a:pPr>
                 <a:defRPr/>
               </a:pPr>
-              <a:t>Sunday, September 3, 2023</a:t>
+              <a:t>Friday, September 1, 2023</a:t>
             </a:fld>
             <a:endParaRPr lang="en-US"/>
           </a:p>
@@ -4142,7 +4098,7 @@
               <a:pPr>
                 <a:defRPr/>
               </a:pPr>
-              <a:t>Sunday, September 3, 2023</a:t>
+              <a:t>Friday, September 1, 2023</a:t>
             </a:fld>
             <a:endParaRPr lang="en-US"/>
           </a:p>
@@ -4432,7 +4388,7 @@
               <a:pPr>
                 <a:defRPr/>
               </a:pPr>
-              <a:t>Sunday, September 3, 2023</a:t>
+              <a:t>Friday, September 1, 2023</a:t>
             </a:fld>
             <a:endParaRPr lang="en-US"/>
           </a:p>
@@ -4699,7 +4655,7 @@
               <a:pPr>
                 <a:defRPr/>
               </a:pPr>
-              <a:t>Sunday, September 3, 2023</a:t>
+              <a:t>Friday, September 1, 2023</a:t>
             </a:fld>
             <a:endParaRPr lang="en-US"/>
           </a:p>
@@ -4925,7 +4881,7 @@
               <a:pPr>
                 <a:defRPr/>
               </a:pPr>
-              <a:t>Sunday, September 3, 2023</a:t>
+              <a:t>Friday, September 1, 2023</a:t>
             </a:fld>
             <a:endParaRPr lang="en-US"/>
           </a:p>
@@ -5390,14 +5346,14 @@
           <a:p>
             <a:pPr algn="ctr"/>
             <a:r>
-              <a:rPr lang="en-US" sz="2400"/>
-              <a:t>Check out Practice2DArraysAndMaps from </a:t>
-            </a:r>
-            <a:r>
-              <a:rPr lang="en-US" sz="2400" err="1"/>
-              <a:t>Git</a:t>
-            </a:r>
-            <a:endParaRPr lang="en-US" sz="2400"/>
+              <a:rPr lang="en-US" sz="2400" dirty="0"/>
+              <a:t>Today’s Eclipse project: </a:t>
+            </a:r>
+            <a:r>
+              <a:rPr lang="en-US" sz="2400" i="1" dirty="0"/>
+              <a:t>Practice2DArraysAndMaps</a:t>
+            </a:r>
+            <a:endParaRPr lang="en-US" sz="2400" dirty="0"/>
           </a:p>
         </p:txBody>
       </p:sp>
@@ -5522,18 +5478,13 @@
           </a:p>
           <a:p>
             <a:r>
-              <a:rPr lang="en-US" sz="4400" dirty="0" err="1">
+              <a:rPr lang="en-US" sz="4400" dirty="0">
                 <a:highlight>
                   <a:srgbClr val="FFFF00"/>
                 </a:highlight>
               </a:rPr>
-              <a:t>anarrayofarrays</a:t>
-            </a:r>
-            <a:endParaRPr lang="en-US" sz="4400" dirty="0">
-              <a:highlight>
-                <a:srgbClr val="FFFF00"/>
-              </a:highlight>
-            </a:endParaRPr>
+              <a:t>__________</a:t>
+            </a:r>
           </a:p>
         </p:txBody>
       </p:sp>
@@ -6118,7 +6069,7 @@
         </p:nvSpPr>
         <p:spPr>
           <a:xfrm>
-            <a:off x="508053" y="6020139"/>
+            <a:off x="590782" y="5846786"/>
             <a:ext cx="7962436" cy="523220"/>
           </a:xfrm>
           <a:prstGeom prst="rect">
@@ -6178,7 +6129,7 @@
           <p:cNvPr id="4" name="Picture 3">
             <a:extLst>
               <a:ext uri="{FF2B5EF4-FFF2-40B4-BE49-F238E27FC236}">
-                <a16:creationId xmlns:a16="http://schemas.microsoft.com/office/drawing/2014/main" id="{0D0D1C8B-9A81-DA9C-4A86-B62E9A2E2EED}"/>
+                <a16:creationId xmlns:a16="http://schemas.microsoft.com/office/drawing/2014/main" id="{E2CE9531-AEA4-A4F9-D07A-88FEE0054988}"/>
               </a:ext>
             </a:extLst>
           </p:cNvPr>
@@ -6195,8 +6146,8 @@
         </p:blipFill>
         <p:spPr>
           <a:xfrm>
-            <a:off x="508053" y="3719072"/>
-            <a:ext cx="8130989" cy="1241235"/>
+            <a:off x="173478" y="3719072"/>
+            <a:ext cx="8797043" cy="1404638"/>
           </a:xfrm>
           <a:prstGeom prst="rect">
             <a:avLst/>
@@ -9282,7 +9233,7 @@
           <a:p>
             <a:r>
               <a:rPr lang="en-US" dirty="0"/>
-              <a:t>Send message and the video call/screen share w/ TA</a:t>
+              <a:t>Send message, then video call/screen share w/ TA</a:t>
             </a:r>
           </a:p>
         </p:txBody>
@@ -9707,7 +9658,7 @@
             </a:r>
             <a:r>
               <a:rPr lang="en-US" dirty="0"/>
-              <a:t> on Piazza even sharing your code</a:t>
+              <a:t> on Piazza, even sharing your code</a:t>
             </a:r>
           </a:p>
         </p:txBody>
@@ -9759,7 +9710,7 @@
           <a:p>
             <a:r>
               <a:rPr lang="en-US" dirty="0"/>
-              <a:t>Academic Integrity in CS</a:t>
+              <a:t>Academic Integrity in CSSE</a:t>
             </a:r>
           </a:p>
         </p:txBody>

</xml_diff>

<commit_message>
fixing a few slides
</commit_message>
<xml_diff>
--- a/ClassMaterials/2DArraysAndMaps/Slides/Part1-Help-and-Academic-Integrity.pptx
+++ b/ClassMaterials/2DArraysAndMaps/Slides/Part1-Help-and-Academic-Integrity.pptx
@@ -5,10 +5,10 @@
     <p:sldMasterId id="2147483927" r:id="rId4"/>
   </p:sldMasterIdLst>
   <p:notesMasterIdLst>
-    <p:notesMasterId r:id="rId28"/>
+    <p:notesMasterId r:id="rId29"/>
   </p:notesMasterIdLst>
   <p:handoutMasterIdLst>
-    <p:handoutMasterId r:id="rId29"/>
+    <p:handoutMasterId r:id="rId30"/>
   </p:handoutMasterIdLst>
   <p:sldIdLst>
     <p:sldId id="300" r:id="rId5"/>
@@ -29,11 +29,12 @@
     <p:sldId id="378" r:id="rId20"/>
     <p:sldId id="385" r:id="rId21"/>
     <p:sldId id="381" r:id="rId22"/>
-    <p:sldId id="384" r:id="rId23"/>
-    <p:sldId id="270" r:id="rId24"/>
-    <p:sldId id="271" r:id="rId25"/>
-    <p:sldId id="272" r:id="rId26"/>
-    <p:sldId id="273" r:id="rId27"/>
+    <p:sldId id="258" r:id="rId23"/>
+    <p:sldId id="384" r:id="rId24"/>
+    <p:sldId id="270" r:id="rId25"/>
+    <p:sldId id="271" r:id="rId26"/>
+    <p:sldId id="272" r:id="rId27"/>
+    <p:sldId id="273" r:id="rId28"/>
   </p:sldIdLst>
   <p:sldSz cx="9144000" cy="6858000" type="screen4x3"/>
   <p:notesSz cx="7010400" cy="9296400"/>
@@ -199,9 +200,131 @@
 <file path=ppt/revisionInfo.xml><?xml version="1.0" encoding="utf-8"?>
 <p1510:revInfo xmlns:a="http://schemas.openxmlformats.org/drawingml/2006/main" xmlns:r="http://schemas.openxmlformats.org/officeDocument/2006/relationships" xmlns:p1510="http://schemas.microsoft.com/office/powerpoint/2015/10/main">
   <p1510:revLst>
-    <p1510:client id="{3C1CFE12-58A5-41F5-B330-9BEFD567C01A}" v="5" dt="2022-03-10T19:35:47.335"/>
+    <p1510:client id="{03E6DCEC-30A4-4794-8141-6430DCF0A265}" v="3" dt="2023-11-21T15:39:48.257"/>
   </p1510:revLst>
 </p1510:revInfo>
+</file>
+
+<file path=ppt/changesInfos/changesInfo1.xml><?xml version="1.0" encoding="utf-8"?>
+<pc:chgInfo xmlns:a="http://schemas.openxmlformats.org/drawingml/2006/main" xmlns:r="http://schemas.openxmlformats.org/officeDocument/2006/relationships" xmlns:ac="http://schemas.microsoft.com/office/drawing/2013/main/command" xmlns:pc="http://schemas.microsoft.com/office/powerpoint/2013/main/command">
+  <pc:docChgLst>
+    <pc:chgData name="Yoder, Jason" userId="28f4d4d8-da04-4f86-b14d-a21675737bc5" providerId="ADAL" clId="{03E6DCEC-30A4-4794-8141-6430DCF0A265}"/>
+    <pc:docChg chg="undo custSel addSld modSld">
+      <pc:chgData name="Yoder, Jason" userId="28f4d4d8-da04-4f86-b14d-a21675737bc5" providerId="ADAL" clId="{03E6DCEC-30A4-4794-8141-6430DCF0A265}" dt="2023-11-21T15:46:31.032" v="276" actId="20577"/>
+      <pc:docMkLst>
+        <pc:docMk/>
+      </pc:docMkLst>
+      <pc:sldChg chg="addSp modSp add mod modNotesTx">
+        <pc:chgData name="Yoder, Jason" userId="28f4d4d8-da04-4f86-b14d-a21675737bc5" providerId="ADAL" clId="{03E6DCEC-30A4-4794-8141-6430DCF0A265}" dt="2023-11-21T15:46:31.032" v="276" actId="20577"/>
+        <pc:sldMkLst>
+          <pc:docMk/>
+          <pc:sldMk cId="3490648585" sldId="258"/>
+        </pc:sldMkLst>
+        <pc:spChg chg="mod">
+          <ac:chgData name="Yoder, Jason" userId="28f4d4d8-da04-4f86-b14d-a21675737bc5" providerId="ADAL" clId="{03E6DCEC-30A4-4794-8141-6430DCF0A265}" dt="2023-11-21T15:45:24.787" v="221" actId="1076"/>
+          <ac:spMkLst>
+            <pc:docMk/>
+            <pc:sldMk cId="3490648585" sldId="258"/>
+            <ac:spMk id="2" creationId="{00000000-0000-0000-0000-000000000000}"/>
+          </ac:spMkLst>
+        </pc:spChg>
+        <pc:spChg chg="mod">
+          <ac:chgData name="Yoder, Jason" userId="28f4d4d8-da04-4f86-b14d-a21675737bc5" providerId="ADAL" clId="{03E6DCEC-30A4-4794-8141-6430DCF0A265}" dt="2023-11-21T15:46:31.032" v="276" actId="20577"/>
+          <ac:spMkLst>
+            <pc:docMk/>
+            <pc:sldMk cId="3490648585" sldId="258"/>
+            <ac:spMk id="3" creationId="{00000000-0000-0000-0000-000000000000}"/>
+          </ac:spMkLst>
+        </pc:spChg>
+        <pc:spChg chg="add mod">
+          <ac:chgData name="Yoder, Jason" userId="28f4d4d8-da04-4f86-b14d-a21675737bc5" providerId="ADAL" clId="{03E6DCEC-30A4-4794-8141-6430DCF0A265}" dt="2023-11-21T15:44:46.644" v="217" actId="20577"/>
+          <ac:spMkLst>
+            <pc:docMk/>
+            <pc:sldMk cId="3490648585" sldId="258"/>
+            <ac:spMk id="5" creationId="{B38A22DE-EAA2-2A6E-6B36-6CB57326C225}"/>
+          </ac:spMkLst>
+        </pc:spChg>
+        <pc:picChg chg="mod">
+          <ac:chgData name="Yoder, Jason" userId="28f4d4d8-da04-4f86-b14d-a21675737bc5" providerId="ADAL" clId="{03E6DCEC-30A4-4794-8141-6430DCF0A265}" dt="2023-11-21T15:45:26.906" v="222" actId="1076"/>
+          <ac:picMkLst>
+            <pc:docMk/>
+            <pc:sldMk cId="3490648585" sldId="258"/>
+            <ac:picMk id="4" creationId="{8EAB44CF-A3F6-4B4C-BC3A-0AA56C34627F}"/>
+          </ac:picMkLst>
+        </pc:picChg>
+      </pc:sldChg>
+      <pc:sldChg chg="addSp delSp modSp mod modNotesTx">
+        <pc:chgData name="Yoder, Jason" userId="28f4d4d8-da04-4f86-b14d-a21675737bc5" providerId="ADAL" clId="{03E6DCEC-30A4-4794-8141-6430DCF0A265}" dt="2023-11-21T15:31:21.972" v="48" actId="1076"/>
+        <pc:sldMkLst>
+          <pc:docMk/>
+          <pc:sldMk cId="3104463201" sldId="300"/>
+        </pc:sldMkLst>
+        <pc:spChg chg="del mod">
+          <ac:chgData name="Yoder, Jason" userId="28f4d4d8-da04-4f86-b14d-a21675737bc5" providerId="ADAL" clId="{03E6DCEC-30A4-4794-8141-6430DCF0A265}" dt="2023-11-21T15:31:18.859" v="47" actId="478"/>
+          <ac:spMkLst>
+            <pc:docMk/>
+            <pc:sldMk cId="3104463201" sldId="300"/>
+            <ac:spMk id="3" creationId="{00000000-0000-0000-0000-000000000000}"/>
+          </ac:spMkLst>
+        </pc:spChg>
+        <pc:spChg chg="add mod">
+          <ac:chgData name="Yoder, Jason" userId="28f4d4d8-da04-4f86-b14d-a21675737bc5" providerId="ADAL" clId="{03E6DCEC-30A4-4794-8141-6430DCF0A265}" dt="2023-11-21T15:31:21.972" v="48" actId="1076"/>
+          <ac:spMkLst>
+            <pc:docMk/>
+            <pc:sldMk cId="3104463201" sldId="300"/>
+            <ac:spMk id="8" creationId="{55D4AF07-6744-AF07-4C40-5F09BC75DD40}"/>
+          </ac:spMkLst>
+        </pc:spChg>
+      </pc:sldChg>
+      <pc:sldChg chg="addSp modSp mod">
+        <pc:chgData name="Yoder, Jason" userId="28f4d4d8-da04-4f86-b14d-a21675737bc5" providerId="ADAL" clId="{03E6DCEC-30A4-4794-8141-6430DCF0A265}" dt="2023-11-21T15:34:23.740" v="61" actId="1076"/>
+        <pc:sldMkLst>
+          <pc:docMk/>
+          <pc:sldMk cId="232014179" sldId="382"/>
+        </pc:sldMkLst>
+        <pc:picChg chg="add mod">
+          <ac:chgData name="Yoder, Jason" userId="28f4d4d8-da04-4f86-b14d-a21675737bc5" providerId="ADAL" clId="{03E6DCEC-30A4-4794-8141-6430DCF0A265}" dt="2023-11-21T15:34:23.740" v="61" actId="1076"/>
+          <ac:picMkLst>
+            <pc:docMk/>
+            <pc:sldMk cId="232014179" sldId="382"/>
+            <ac:picMk id="4" creationId="{44633198-4935-3084-822F-ABFCAB84F476}"/>
+          </ac:picMkLst>
+        </pc:picChg>
+      </pc:sldChg>
+      <pc:sldChg chg="addSp modSp mod">
+        <pc:chgData name="Yoder, Jason" userId="28f4d4d8-da04-4f86-b14d-a21675737bc5" providerId="ADAL" clId="{03E6DCEC-30A4-4794-8141-6430DCF0A265}" dt="2023-11-21T15:34:05.061" v="59" actId="1076"/>
+        <pc:sldMkLst>
+          <pc:docMk/>
+          <pc:sldMk cId="1141889518" sldId="383"/>
+        </pc:sldMkLst>
+        <pc:spChg chg="mod">
+          <ac:chgData name="Yoder, Jason" userId="28f4d4d8-da04-4f86-b14d-a21675737bc5" providerId="ADAL" clId="{03E6DCEC-30A4-4794-8141-6430DCF0A265}" dt="2023-11-21T15:34:00.084" v="55" actId="14100"/>
+          <ac:spMkLst>
+            <pc:docMk/>
+            <pc:sldMk cId="1141889518" sldId="383"/>
+            <ac:spMk id="2" creationId="{0EAA58DD-CAF7-2612-ED73-C6C3BC806757}"/>
+          </ac:spMkLst>
+        </pc:spChg>
+        <pc:picChg chg="add mod">
+          <ac:chgData name="Yoder, Jason" userId="28f4d4d8-da04-4f86-b14d-a21675737bc5" providerId="ADAL" clId="{03E6DCEC-30A4-4794-8141-6430DCF0A265}" dt="2023-11-21T15:34:01.028" v="56" actId="1076"/>
+          <ac:picMkLst>
+            <pc:docMk/>
+            <pc:sldMk cId="1141889518" sldId="383"/>
+            <ac:picMk id="4" creationId="{6959979C-3053-5644-2E76-565B470D1D89}"/>
+          </ac:picMkLst>
+        </pc:picChg>
+        <pc:picChg chg="add mod">
+          <ac:chgData name="Yoder, Jason" userId="28f4d4d8-da04-4f86-b14d-a21675737bc5" providerId="ADAL" clId="{03E6DCEC-30A4-4794-8141-6430DCF0A265}" dt="2023-11-21T15:34:05.061" v="59" actId="1076"/>
+          <ac:picMkLst>
+            <pc:docMk/>
+            <pc:sldMk cId="1141889518" sldId="383"/>
+            <ac:picMk id="8" creationId="{1424ACDD-4614-947A-6E98-32CB2A29D0C9}"/>
+          </ac:picMkLst>
+        </pc:picChg>
+      </pc:sldChg>
+    </pc:docChg>
+  </pc:docChgLst>
+</pc:chgInfo>
 </file>
 
 <file path=ppt/handoutMasters/handoutMaster1.xml><?xml version="1.0" encoding="utf-8"?>
@@ -321,7 +444,7 @@
               <a:pPr>
                 <a:defRPr/>
               </a:pPr>
-              <a:t>9/1/2023</a:t>
+              <a:t>11/21/2023</a:t>
             </a:fld>
             <a:endParaRPr lang="en-US"/>
           </a:p>
@@ -556,7 +679,7 @@
               <a:pPr>
                 <a:defRPr/>
               </a:pPr>
-              <a:t>9/1/2023</a:t>
+              <a:t>11/21/2023</a:t>
             </a:fld>
             <a:endParaRPr lang="en-US"/>
           </a:p>
@@ -963,14 +1086,14 @@
               </a:spcBef>
             </a:pPr>
             <a:r>
-              <a:rPr lang="en-US"/>
+              <a:rPr lang="en-US" dirty="0"/>
               <a:t>Note: You will want to use clicker for slides</a:t>
             </a:r>
             <a:r>
-              <a:rPr lang="en-US" baseline="0"/>
+              <a:rPr lang="en-US" baseline="0" dirty="0"/>
               <a:t> today!</a:t>
             </a:r>
-            <a:endParaRPr lang="en-US"/>
+            <a:endParaRPr lang="en-US" dirty="0"/>
           </a:p>
           <a:p>
             <a:pPr eaLnBrk="1" hangingPunct="1">
@@ -978,7 +1101,7 @@
                 <a:spcPct val="0"/>
               </a:spcBef>
             </a:pPr>
-            <a:endParaRPr lang="en-US"/>
+            <a:endParaRPr lang="en-US" dirty="0"/>
           </a:p>
           <a:p>
             <a:pPr eaLnBrk="1" hangingPunct="1">
@@ -987,23 +1110,12 @@
               </a:spcBef>
             </a:pPr>
             <a:r>
-              <a:rPr lang="en-US"/>
+              <a:rPr lang="en-US" dirty="0"/>
               <a:t>Bring hard copy of code from 2DArraysAndMapsS</a:t>
             </a:r>
             <a:r>
-              <a:rPr lang="en-US" baseline="0"/>
+              <a:rPr lang="en-US" baseline="0" dirty="0"/>
               <a:t>olution.</a:t>
-            </a:r>
-          </a:p>
-          <a:p>
-            <a:pPr eaLnBrk="1" hangingPunct="1">
-              <a:spcBef>
-                <a:spcPct val="0"/>
-              </a:spcBef>
-            </a:pPr>
-            <a:r>
-              <a:rPr lang="en-US" baseline="0"/>
-              <a:t>Bring copies of 2DArraysAndMapsSamples from Instructor Resources.</a:t>
             </a:r>
           </a:p>
         </p:txBody>
@@ -1038,6 +1150,242 @@
     <p:extLst>
       <p:ext uri="{BB962C8B-B14F-4D97-AF65-F5344CB8AC3E}">
         <p14:creationId xmlns:p14="http://schemas.microsoft.com/office/powerpoint/2010/main" val="1789090705"/>
+      </p:ext>
+    </p:extLst>
+  </p:cSld>
+  <p:clrMapOvr>
+    <a:masterClrMapping/>
+  </p:clrMapOvr>
+</p:notes>
+</file>
+
+<file path=ppt/notesSlides/notesSlide10.xml><?xml version="1.0" encoding="utf-8"?>
+<p:notes xmlns:a="http://schemas.openxmlformats.org/drawingml/2006/main" xmlns:r="http://schemas.openxmlformats.org/officeDocument/2006/relationships" xmlns:p="http://schemas.openxmlformats.org/presentationml/2006/main">
+  <p:cSld>
+    <p:spTree>
+      <p:nvGrpSpPr>
+        <p:cNvPr id="1" name=""/>
+        <p:cNvGrpSpPr/>
+        <p:nvPr/>
+      </p:nvGrpSpPr>
+      <p:grpSpPr>
+        <a:xfrm>
+          <a:off x="0" y="0"/>
+          <a:ext cx="0" cy="0"/>
+          <a:chOff x="0" y="0"/>
+          <a:chExt cx="0" cy="0"/>
+        </a:xfrm>
+      </p:grpSpPr>
+      <p:sp>
+        <p:nvSpPr>
+          <p:cNvPr id="168" name="Shape 168"/>
+          <p:cNvSpPr>
+            <a:spLocks noGrp="1" noRot="1" noChangeAspect="1"/>
+          </p:cNvSpPr>
+          <p:nvPr>
+            <p:ph type="sldImg"/>
+          </p:nvPr>
+        </p:nvSpPr>
+        <p:spPr>
+          <a:prstGeom prst="rect">
+            <a:avLst/>
+          </a:prstGeom>
+        </p:spPr>
+        <p:txBody>
+          <a:bodyPr/>
+          <a:lstStyle/>
+          <a:p>
+            <a:pPr lvl="0"/>
+            <a:endParaRPr/>
+          </a:p>
+        </p:txBody>
+      </p:sp>
+      <p:sp>
+        <p:nvSpPr>
+          <p:cNvPr id="169" name="Shape 169"/>
+          <p:cNvSpPr>
+            <a:spLocks noGrp="1"/>
+          </p:cNvSpPr>
+          <p:nvPr>
+            <p:ph type="body" sz="quarter" idx="1"/>
+          </p:nvPr>
+        </p:nvSpPr>
+        <p:spPr>
+          <a:prstGeom prst="rect">
+            <a:avLst/>
+          </a:prstGeom>
+        </p:spPr>
+        <p:txBody>
+          <a:bodyPr/>
+          <a:lstStyle/>
+          <a:p>
+            <a:pPr lvl="0" defTabSz="914400">
+              <a:lnSpc>
+                <a:spcPct val="100000"/>
+              </a:lnSpc>
+              <a:spcBef>
+                <a:spcPts val="400"/>
+              </a:spcBef>
+              <a:defRPr sz="1800"/>
+            </a:pPr>
+            <a:r>
+              <a:rPr sz="1200" dirty="0">
+                <a:latin typeface="Calibri"/>
+                <a:ea typeface="Calibri"/>
+                <a:cs typeface="Calibri"/>
+                <a:sym typeface="Calibri"/>
+              </a:rPr>
+              <a:t>Call-outs animated</a:t>
+            </a:r>
+          </a:p>
+          <a:p>
+            <a:pPr lvl="0" defTabSz="914400">
+              <a:lnSpc>
+                <a:spcPct val="100000"/>
+              </a:lnSpc>
+              <a:spcBef>
+                <a:spcPts val="400"/>
+              </a:spcBef>
+              <a:defRPr sz="1800"/>
+            </a:pPr>
+            <a:r>
+              <a:rPr sz="1200" dirty="0">
+                <a:latin typeface="Calibri"/>
+                <a:ea typeface="Calibri"/>
+                <a:cs typeface="Calibri"/>
+                <a:sym typeface="Calibri"/>
+              </a:rPr>
+              <a:t>Like python’s “for num in </a:t>
+            </a:r>
+            <a:r>
+              <a:rPr sz="1200" dirty="0" err="1">
+                <a:latin typeface="Calibri"/>
+                <a:ea typeface="Calibri"/>
+                <a:cs typeface="Calibri"/>
+                <a:sym typeface="Calibri"/>
+              </a:rPr>
+              <a:t>nums</a:t>
+            </a:r>
+            <a:r>
+              <a:rPr sz="1200" dirty="0">
+                <a:latin typeface="Calibri"/>
+                <a:ea typeface="Calibri"/>
+                <a:cs typeface="Calibri"/>
+                <a:sym typeface="Calibri"/>
+              </a:rPr>
+              <a:t>:”</a:t>
+            </a:r>
+          </a:p>
+          <a:p>
+            <a:pPr lvl="0" defTabSz="914400">
+              <a:lnSpc>
+                <a:spcPct val="100000"/>
+              </a:lnSpc>
+              <a:spcBef>
+                <a:spcPts val="400"/>
+              </a:spcBef>
+              <a:defRPr sz="1800"/>
+            </a:pPr>
+            <a:r>
+              <a:rPr sz="1200" dirty="0">
+                <a:latin typeface="Calibri"/>
+                <a:ea typeface="Calibri"/>
+                <a:cs typeface="Calibri"/>
+                <a:sym typeface="Calibri"/>
+              </a:rPr>
+              <a:t>Convenient when we just need to iterate over the objects.</a:t>
+            </a:r>
+          </a:p>
+          <a:p>
+            <a:pPr lvl="0" defTabSz="914400">
+              <a:lnSpc>
+                <a:spcPct val="100000"/>
+              </a:lnSpc>
+              <a:spcBef>
+                <a:spcPts val="400"/>
+              </a:spcBef>
+              <a:defRPr sz="1800"/>
+            </a:pPr>
+            <a:r>
+              <a:rPr sz="1200" dirty="0">
+                <a:latin typeface="Calibri"/>
+                <a:ea typeface="Calibri"/>
+                <a:cs typeface="Calibri"/>
+                <a:sym typeface="Calibri"/>
+              </a:rPr>
+              <a:t>The two limitations: </a:t>
+            </a:r>
+          </a:p>
+          <a:p>
+            <a:pPr lvl="0" defTabSz="914400">
+              <a:lnSpc>
+                <a:spcPct val="100000"/>
+              </a:lnSpc>
+              <a:spcBef>
+                <a:spcPts val="400"/>
+              </a:spcBef>
+              <a:defRPr sz="1800"/>
+            </a:pPr>
+            <a:r>
+              <a:rPr sz="1200" dirty="0">
+                <a:latin typeface="Calibri"/>
+                <a:ea typeface="Calibri"/>
+                <a:cs typeface="Calibri"/>
+                <a:sym typeface="Calibri"/>
+              </a:rPr>
+              <a:t>We CAN’T USE the indices. </a:t>
+            </a:r>
+          </a:p>
+          <a:p>
+            <a:pPr lvl="0" defTabSz="914400">
+              <a:lnSpc>
+                <a:spcPct val="100000"/>
+              </a:lnSpc>
+              <a:spcBef>
+                <a:spcPts val="400"/>
+              </a:spcBef>
+              <a:defRPr sz="1800"/>
+            </a:pPr>
+            <a:r>
+              <a:rPr sz="1200" dirty="0">
+                <a:latin typeface="Calibri"/>
+                <a:ea typeface="Calibri"/>
+                <a:cs typeface="Calibri"/>
+                <a:sym typeface="Calibri"/>
+              </a:rPr>
+              <a:t>We CAN’T MODIFY the element and stick it back in the array.</a:t>
+            </a:r>
+            <a:r>
+              <a:rPr lang="en-US" sz="1200" dirty="0">
+                <a:latin typeface="Calibri"/>
+                <a:ea typeface="Calibri"/>
+                <a:cs typeface="Calibri"/>
+                <a:sym typeface="Calibri"/>
+              </a:rPr>
+              <a:t>  CONCURRENT</a:t>
+            </a:r>
+            <a:r>
+              <a:rPr lang="en-US" sz="1200" baseline="0" dirty="0">
+                <a:latin typeface="Calibri"/>
+                <a:ea typeface="Calibri"/>
+                <a:cs typeface="Calibri"/>
+                <a:sym typeface="Calibri"/>
+              </a:rPr>
+              <a:t> MODIFICATION EXCEPTION!</a:t>
+            </a:r>
+            <a:endParaRPr sz="1200" dirty="0">
+              <a:latin typeface="Calibri"/>
+              <a:ea typeface="Calibri"/>
+              <a:cs typeface="Calibri"/>
+              <a:sym typeface="Calibri"/>
+            </a:endParaRPr>
+          </a:p>
+        </p:txBody>
+      </p:sp>
+    </p:spTree>
+    <p:extLst>
+      <p:ext uri="{BB962C8B-B14F-4D97-AF65-F5344CB8AC3E}">
+        <p14:creationId xmlns:p14="http://schemas.microsoft.com/office/powerpoint/2010/main" val="1299462370"/>
       </p:ext>
     </p:extLst>
   </p:cSld>
@@ -1834,8 +2182,8 @@
           <a:lstStyle/>
           <a:p>
             <a:r>
-              <a:rPr lang="en-US"/>
-              <a:t>Most time will be spent on the last two items</a:t>
+              <a:rPr lang="en-US" dirty="0"/>
+              <a:t>TAs can handle this with a form or something else if they prefer</a:t>
             </a:r>
           </a:p>
         </p:txBody>
@@ -1858,7 +2206,7 @@
             <a:pPr>
               <a:defRPr/>
             </a:pPr>
-            <a:fld id="{41BB943A-C3B9-42AE-8B54-C2335812312E}" type="slidenum">
+            <a:fld id="{F3BF035C-C190-4FBE-9474-8535FCFBFED8}" type="slidenum">
               <a:rPr lang="en-US" smtClean="0"/>
               <a:pPr>
                 <a:defRPr/>
@@ -1872,7 +2220,7 @@
     </p:spTree>
     <p:extLst>
       <p:ext uri="{BB962C8B-B14F-4D97-AF65-F5344CB8AC3E}">
-        <p14:creationId xmlns:p14="http://schemas.microsoft.com/office/powerpoint/2010/main" val="1517640992"/>
+        <p14:creationId xmlns:p14="http://schemas.microsoft.com/office/powerpoint/2010/main" val="1339247438"/>
       </p:ext>
     </p:extLst>
   </p:cSld>
@@ -1901,7 +2249,7 @@
       </p:grpSpPr>
       <p:sp>
         <p:nvSpPr>
-          <p:cNvPr id="168" name="Shape 168"/>
+          <p:cNvPr id="2" name="Slide Image Placeholder 1"/>
           <p:cNvSpPr>
             <a:spLocks noGrp="1" noRot="1" noChangeAspect="1"/>
           </p:cNvSpPr>
@@ -1909,206 +2257,63 @@
             <p:ph type="sldImg"/>
           </p:nvPr>
         </p:nvSpPr>
-        <p:spPr>
-          <a:prstGeom prst="rect">
-            <a:avLst/>
-          </a:prstGeom>
-        </p:spPr>
+        <p:spPr/>
+      </p:sp>
+      <p:sp>
+        <p:nvSpPr>
+          <p:cNvPr id="3" name="Notes Placeholder 2"/>
+          <p:cNvSpPr>
+            <a:spLocks noGrp="1"/>
+          </p:cNvSpPr>
+          <p:nvPr>
+            <p:ph type="body" idx="1"/>
+          </p:nvPr>
+        </p:nvSpPr>
+        <p:spPr/>
         <p:txBody>
           <a:bodyPr/>
           <a:lstStyle/>
           <a:p>
-            <a:pPr lvl="0"/>
-            <a:endParaRPr/>
-          </a:p>
-        </p:txBody>
-      </p:sp>
-      <p:sp>
-        <p:nvSpPr>
-          <p:cNvPr id="169" name="Shape 169"/>
-          <p:cNvSpPr>
-            <a:spLocks noGrp="1"/>
-          </p:cNvSpPr>
-          <p:nvPr>
-            <p:ph type="body" sz="quarter" idx="1"/>
-          </p:nvPr>
-        </p:nvSpPr>
-        <p:spPr>
-          <a:prstGeom prst="rect">
-            <a:avLst/>
-          </a:prstGeom>
-        </p:spPr>
+            <a:r>
+              <a:rPr lang="en-US"/>
+              <a:t>Most time will be spent on the last two items</a:t>
+            </a:r>
+          </a:p>
+        </p:txBody>
+      </p:sp>
+      <p:sp>
+        <p:nvSpPr>
+          <p:cNvPr id="4" name="Slide Number Placeholder 3"/>
+          <p:cNvSpPr>
+            <a:spLocks noGrp="1"/>
+          </p:cNvSpPr>
+          <p:nvPr>
+            <p:ph type="sldNum" sz="quarter" idx="10"/>
+          </p:nvPr>
+        </p:nvSpPr>
+        <p:spPr/>
         <p:txBody>
           <a:bodyPr/>
           <a:lstStyle/>
           <a:p>
-            <a:pPr lvl="0" defTabSz="914400">
-              <a:lnSpc>
-                <a:spcPct val="100000"/>
-              </a:lnSpc>
-              <a:spcBef>
-                <a:spcPts val="400"/>
-              </a:spcBef>
-              <a:defRPr sz="1800"/>
+            <a:pPr>
+              <a:defRPr/>
             </a:pPr>
-            <a:r>
-              <a:rPr sz="1200" dirty="0">
-                <a:latin typeface="Calibri"/>
-                <a:ea typeface="Calibri"/>
-                <a:cs typeface="Calibri"/>
-                <a:sym typeface="Calibri"/>
-              </a:rPr>
-              <a:t>Call-outs animated</a:t>
-            </a:r>
-          </a:p>
-          <a:p>
-            <a:pPr lvl="0" defTabSz="914400">
-              <a:lnSpc>
-                <a:spcPct val="100000"/>
-              </a:lnSpc>
-              <a:spcBef>
-                <a:spcPts val="400"/>
-              </a:spcBef>
-              <a:defRPr sz="1800"/>
-            </a:pPr>
-            <a:r>
-              <a:rPr sz="1200" dirty="0">
-                <a:latin typeface="Calibri"/>
-                <a:ea typeface="Calibri"/>
-                <a:cs typeface="Calibri"/>
-                <a:sym typeface="Calibri"/>
-              </a:rPr>
-              <a:t>Like python’s “for num in </a:t>
-            </a:r>
-            <a:r>
-              <a:rPr sz="1200" dirty="0" err="1">
-                <a:latin typeface="Calibri"/>
-                <a:ea typeface="Calibri"/>
-                <a:cs typeface="Calibri"/>
-                <a:sym typeface="Calibri"/>
-              </a:rPr>
-              <a:t>nums</a:t>
-            </a:r>
-            <a:r>
-              <a:rPr sz="1200" dirty="0">
-                <a:latin typeface="Calibri"/>
-                <a:ea typeface="Calibri"/>
-                <a:cs typeface="Calibri"/>
-                <a:sym typeface="Calibri"/>
-              </a:rPr>
-              <a:t>:”</a:t>
-            </a:r>
-          </a:p>
-          <a:p>
-            <a:pPr lvl="0" defTabSz="914400">
-              <a:lnSpc>
-                <a:spcPct val="100000"/>
-              </a:lnSpc>
-              <a:spcBef>
-                <a:spcPts val="400"/>
-              </a:spcBef>
-              <a:defRPr sz="1800"/>
-            </a:pPr>
-            <a:r>
-              <a:rPr sz="1200" dirty="0">
-                <a:latin typeface="Calibri"/>
-                <a:ea typeface="Calibri"/>
-                <a:cs typeface="Calibri"/>
-                <a:sym typeface="Calibri"/>
-              </a:rPr>
-              <a:t>Convenient when we just need to iterate over the objects.</a:t>
-            </a:r>
-          </a:p>
-          <a:p>
-            <a:pPr lvl="0" defTabSz="914400">
-              <a:lnSpc>
-                <a:spcPct val="100000"/>
-              </a:lnSpc>
-              <a:spcBef>
-                <a:spcPts val="400"/>
-              </a:spcBef>
-              <a:defRPr sz="1800"/>
-            </a:pPr>
-            <a:r>
-              <a:rPr sz="1200" dirty="0">
-                <a:latin typeface="Calibri"/>
-                <a:ea typeface="Calibri"/>
-                <a:cs typeface="Calibri"/>
-                <a:sym typeface="Calibri"/>
-              </a:rPr>
-              <a:t>The two limitations: </a:t>
-            </a:r>
-          </a:p>
-          <a:p>
-            <a:pPr lvl="0" defTabSz="914400">
-              <a:lnSpc>
-                <a:spcPct val="100000"/>
-              </a:lnSpc>
-              <a:spcBef>
-                <a:spcPts val="400"/>
-              </a:spcBef>
-              <a:defRPr sz="1800"/>
-            </a:pPr>
-            <a:r>
-              <a:rPr sz="1200" dirty="0">
-                <a:latin typeface="Calibri"/>
-                <a:ea typeface="Calibri"/>
-                <a:cs typeface="Calibri"/>
-                <a:sym typeface="Calibri"/>
-              </a:rPr>
-              <a:t>We CAN’T USE the indices. </a:t>
-            </a:r>
-          </a:p>
-          <a:p>
-            <a:pPr lvl="0" defTabSz="914400">
-              <a:lnSpc>
-                <a:spcPct val="100000"/>
-              </a:lnSpc>
-              <a:spcBef>
-                <a:spcPts val="400"/>
-              </a:spcBef>
-              <a:defRPr sz="1800"/>
-            </a:pPr>
-            <a:r>
-              <a:rPr sz="1200" dirty="0">
-                <a:latin typeface="Calibri"/>
-                <a:ea typeface="Calibri"/>
-                <a:cs typeface="Calibri"/>
-                <a:sym typeface="Calibri"/>
-              </a:rPr>
-              <a:t>We CAN’T MODIFY the element and stick it back in the array.</a:t>
-            </a:r>
-            <a:r>
-              <a:rPr lang="en-US" sz="1200" dirty="0">
-                <a:latin typeface="Calibri"/>
-                <a:ea typeface="Calibri"/>
-                <a:cs typeface="Calibri"/>
-                <a:sym typeface="Calibri"/>
-              </a:rPr>
-              <a:t>  CONCURRENT</a:t>
-            </a:r>
-            <a:r>
-              <a:rPr lang="en-US" sz="1200" baseline="0" dirty="0">
-                <a:latin typeface="Calibri"/>
-                <a:ea typeface="Calibri"/>
-                <a:cs typeface="Calibri"/>
-                <a:sym typeface="Calibri"/>
-              </a:rPr>
-              <a:t> MODIFICATION EXCEPTION!</a:t>
-            </a:r>
-            <a:endParaRPr sz="1200" dirty="0">
-              <a:latin typeface="Calibri"/>
-              <a:ea typeface="Calibri"/>
-              <a:cs typeface="Calibri"/>
-              <a:sym typeface="Calibri"/>
-            </a:endParaRPr>
+            <a:fld id="{41BB943A-C3B9-42AE-8B54-C2335812312E}" type="slidenum">
+              <a:rPr lang="en-US" smtClean="0"/>
+              <a:pPr>
+                <a:defRPr/>
+              </a:pPr>
+              <a:t>20</a:t>
+            </a:fld>
+            <a:endParaRPr lang="en-US"/>
           </a:p>
         </p:txBody>
       </p:sp>
     </p:spTree>
     <p:extLst>
       <p:ext uri="{BB962C8B-B14F-4D97-AF65-F5344CB8AC3E}">
-        <p14:creationId xmlns:p14="http://schemas.microsoft.com/office/powerpoint/2010/main" val="1299462370"/>
+        <p14:creationId xmlns:p14="http://schemas.microsoft.com/office/powerpoint/2010/main" val="1517640992"/>
       </p:ext>
     </p:extLst>
   </p:cSld>
@@ -2303,7 +2508,7 @@
               <a:pPr>
                 <a:defRPr/>
               </a:pPr>
-              <a:t>Friday, September 1, 2023</a:t>
+              <a:t>Tuesday, November 21, 2023</a:t>
             </a:fld>
             <a:endParaRPr lang="en-US"/>
           </a:p>
@@ -2486,7 +2691,7 @@
               <a:pPr>
                 <a:defRPr/>
               </a:pPr>
-              <a:t>Friday, September 1, 2023</a:t>
+              <a:t>Tuesday, November 21, 2023</a:t>
             </a:fld>
             <a:endParaRPr lang="en-US"/>
           </a:p>
@@ -2679,7 +2884,7 @@
               <a:pPr>
                 <a:defRPr/>
               </a:pPr>
-              <a:t>Friday, September 1, 2023</a:t>
+              <a:t>Tuesday, November 21, 2023</a:t>
             </a:fld>
             <a:endParaRPr lang="en-US"/>
           </a:p>
@@ -2862,7 +3067,7 @@
               <a:pPr>
                 <a:defRPr/>
               </a:pPr>
-              <a:t>Friday, September 1, 2023</a:t>
+              <a:t>Tuesday, November 21, 2023</a:t>
             </a:fld>
             <a:endParaRPr lang="en-US"/>
           </a:p>
@@ -3122,7 +3327,7 @@
               <a:pPr>
                 <a:defRPr/>
               </a:pPr>
-              <a:t>Friday, September 1, 2023</a:t>
+              <a:t>Tuesday, November 21, 2023</a:t>
             </a:fld>
             <a:endParaRPr lang="en-US"/>
           </a:p>
@@ -3422,7 +3627,7 @@
               <a:pPr>
                 <a:defRPr/>
               </a:pPr>
-              <a:t>Friday, September 1, 2023</a:t>
+              <a:t>Tuesday, November 21, 2023</a:t>
             </a:fld>
             <a:endParaRPr lang="en-US"/>
           </a:p>
@@ -3856,7 +4061,7 @@
               <a:pPr>
                 <a:defRPr/>
               </a:pPr>
-              <a:t>Friday, September 1, 2023</a:t>
+              <a:t>Tuesday, November 21, 2023</a:t>
             </a:fld>
             <a:endParaRPr lang="en-US"/>
           </a:p>
@@ -3988,7 +4193,7 @@
               <a:pPr>
                 <a:defRPr/>
               </a:pPr>
-              <a:t>Friday, September 1, 2023</a:t>
+              <a:t>Tuesday, November 21, 2023</a:t>
             </a:fld>
             <a:endParaRPr lang="en-US"/>
           </a:p>
@@ -4098,7 +4303,7 @@
               <a:pPr>
                 <a:defRPr/>
               </a:pPr>
-              <a:t>Friday, September 1, 2023</a:t>
+              <a:t>Tuesday, November 21, 2023</a:t>
             </a:fld>
             <a:endParaRPr lang="en-US"/>
           </a:p>
@@ -4388,7 +4593,7 @@
               <a:pPr>
                 <a:defRPr/>
               </a:pPr>
-              <a:t>Friday, September 1, 2023</a:t>
+              <a:t>Tuesday, November 21, 2023</a:t>
             </a:fld>
             <a:endParaRPr lang="en-US"/>
           </a:p>
@@ -4655,7 +4860,7 @@
               <a:pPr>
                 <a:defRPr/>
               </a:pPr>
-              <a:t>Friday, September 1, 2023</a:t>
+              <a:t>Tuesday, November 21, 2023</a:t>
             </a:fld>
             <a:endParaRPr lang="en-US"/>
           </a:p>
@@ -4881,7 +5086,7 @@
               <a:pPr>
                 <a:defRPr/>
               </a:pPr>
-              <a:t>Friday, September 1, 2023</a:t>
+              <a:t>Tuesday, November 21, 2023</a:t>
             </a:fld>
             <a:endParaRPr lang="en-US"/>
           </a:p>
@@ -5311,54 +5516,6 @@
       </p:sp>
       <p:sp>
         <p:nvSpPr>
-          <p:cNvPr id="3" name="Rectangle 2"/>
-          <p:cNvSpPr/>
-          <p:nvPr/>
-        </p:nvSpPr>
-        <p:spPr>
-          <a:xfrm>
-            <a:off x="228600" y="6096000"/>
-            <a:ext cx="8534400" cy="609600"/>
-          </a:xfrm>
-          <a:prstGeom prst="rect">
-            <a:avLst/>
-          </a:prstGeom>
-        </p:spPr>
-        <p:style>
-          <a:lnRef idx="2">
-            <a:schemeClr val="accent3">
-              <a:shade val="50000"/>
-            </a:schemeClr>
-          </a:lnRef>
-          <a:fillRef idx="1">
-            <a:schemeClr val="accent3"/>
-          </a:fillRef>
-          <a:effectRef idx="0">
-            <a:schemeClr val="accent3"/>
-          </a:effectRef>
-          <a:fontRef idx="minor">
-            <a:schemeClr val="lt1"/>
-          </a:fontRef>
-        </p:style>
-        <p:txBody>
-          <a:bodyPr rtlCol="0" anchor="ctr"/>
-          <a:lstStyle/>
-          <a:p>
-            <a:pPr algn="ctr"/>
-            <a:r>
-              <a:rPr lang="en-US" sz="2400" dirty="0"/>
-              <a:t>Today’s Eclipse project: </a:t>
-            </a:r>
-            <a:r>
-              <a:rPr lang="en-US" sz="2400" i="1" dirty="0"/>
-              <a:t>Practice2DArraysAndMaps</a:t>
-            </a:r>
-            <a:endParaRPr lang="en-US" sz="2400" dirty="0"/>
-          </a:p>
-        </p:txBody>
-      </p:sp>
-      <p:sp>
-        <p:nvSpPr>
           <p:cNvPr id="4" name="TextBox 3">
             <a:extLst>
               <a:ext uri="{FF2B5EF4-FFF2-40B4-BE49-F238E27FC236}">
@@ -5518,6 +5675,149 @@
           </a:prstGeom>
         </p:spPr>
       </p:pic>
+      <p:sp>
+        <p:nvSpPr>
+          <p:cNvPr id="8" name="Shape 54">
+            <a:extLst>
+              <a:ext uri="{FF2B5EF4-FFF2-40B4-BE49-F238E27FC236}">
+                <a16:creationId xmlns:a16="http://schemas.microsoft.com/office/drawing/2014/main" id="{55D4AF07-6744-AF07-4C40-5F09BC75DD40}"/>
+              </a:ext>
+            </a:extLst>
+          </p:cNvPr>
+          <p:cNvSpPr/>
+          <p:nvPr/>
+        </p:nvSpPr>
+        <p:spPr>
+          <a:xfrm>
+            <a:off x="520128" y="4786495"/>
+            <a:ext cx="6648450" cy="1846659"/>
+          </a:xfrm>
+          <a:prstGeom prst="rect">
+            <a:avLst/>
+          </a:prstGeom>
+          <a:solidFill>
+            <a:srgbClr val="9BBB59"/>
+          </a:solidFill>
+          <a:ln w="25400" cap="rnd">
+            <a:solidFill>
+              <a:srgbClr val="718841"/>
+            </a:solidFill>
+          </a:ln>
+          <a:extLst>
+            <a:ext uri="{C572A759-6A51-4108-AA02-DFA0A04FC94B}">
+              <ma14:wrappingTextBoxFlag xmlns="" xmlns:ma14="http://schemas.microsoft.com/office/mac/drawingml/2011/main" val="1"/>
+            </a:ext>
+          </a:extLst>
+        </p:spPr>
+        <p:txBody>
+          <a:bodyPr lIns="0" tIns="0" rIns="0" bIns="0">
+            <a:spAutoFit/>
+          </a:bodyPr>
+          <a:lstStyle/>
+          <a:p>
+            <a:pPr lvl="0"/>
+            <a:r>
+              <a:rPr lang="en-US" sz="2400" dirty="0">
+                <a:solidFill>
+                  <a:srgbClr val="FFFFFF"/>
+                </a:solidFill>
+              </a:rPr>
+              <a:t>The </a:t>
+            </a:r>
+            <a:r>
+              <a:rPr lang="en-US" sz="2400" i="1" dirty="0">
+                <a:solidFill>
+                  <a:srgbClr val="FFFFFF"/>
+                </a:solidFill>
+              </a:rPr>
+              <a:t>git</a:t>
+            </a:r>
+            <a:r>
+              <a:rPr lang="en-US" sz="2400" dirty="0">
+                <a:solidFill>
+                  <a:srgbClr val="FFFFFF"/>
+                </a:solidFill>
+              </a:rPr>
+              <a:t> projects for today are:</a:t>
+            </a:r>
+          </a:p>
+          <a:p>
+            <a:pPr marL="746125" lvl="0" indent="-447675">
+              <a:buFont typeface="Arial" panose="020B0604020202020204" pitchFamily="34" charset="0"/>
+              <a:buChar char="•"/>
+            </a:pPr>
+            <a:r>
+              <a:rPr lang="en-US" sz="2400" i="1" dirty="0">
+                <a:solidFill>
+                  <a:schemeClr val="bg1"/>
+                </a:solidFill>
+              </a:rPr>
+              <a:t>Practice2DArraysAndMaps</a:t>
+            </a:r>
+          </a:p>
+          <a:p>
+            <a:pPr marL="746125" lvl="0" indent="-447675">
+              <a:buFont typeface="Arial" panose="020B0604020202020204" pitchFamily="34" charset="0"/>
+              <a:buChar char="•"/>
+            </a:pPr>
+            <a:r>
+              <a:rPr lang="en-US" sz="2400" i="1" dirty="0">
+                <a:solidFill>
+                  <a:schemeClr val="bg1"/>
+                </a:solidFill>
+              </a:rPr>
+              <a:t>PracticeSolution2DArraysAndMaps</a:t>
+            </a:r>
+            <a:endParaRPr lang="en-US" sz="2400" dirty="0">
+              <a:solidFill>
+                <a:schemeClr val="bg1"/>
+              </a:solidFill>
+            </a:endParaRPr>
+          </a:p>
+          <a:p>
+            <a:r>
+              <a:rPr lang="en-US" sz="2400" dirty="0">
+                <a:solidFill>
+                  <a:srgbClr val="FFFFFF"/>
+                </a:solidFill>
+              </a:rPr>
+              <a:t>The </a:t>
+            </a:r>
+            <a:r>
+              <a:rPr lang="en-US" sz="2400" i="1" dirty="0">
+                <a:solidFill>
+                  <a:srgbClr val="FFFFFF"/>
+                </a:solidFill>
+              </a:rPr>
+              <a:t>Quiz</a:t>
+            </a:r>
+            <a:r>
+              <a:rPr lang="en-US" sz="2400" dirty="0">
+                <a:solidFill>
+                  <a:srgbClr val="FFFFFF"/>
+                </a:solidFill>
+              </a:rPr>
+              <a:t> for today is</a:t>
+            </a:r>
+            <a:endParaRPr lang="en-US" sz="2400" i="1" dirty="0">
+              <a:solidFill>
+                <a:srgbClr val="FFFFFF"/>
+              </a:solidFill>
+            </a:endParaRPr>
+          </a:p>
+          <a:p>
+            <a:pPr marL="298450" lvl="0"/>
+            <a:r>
+              <a:rPr lang="en-US" sz="2400" i="1" dirty="0">
+                <a:solidFill>
+                  <a:srgbClr val="FFFFFF"/>
+                </a:solidFill>
+              </a:rPr>
+              <a:t>2DArraysAndMapsQuiz</a:t>
+            </a:r>
+          </a:p>
+        </p:txBody>
+      </p:sp>
     </p:spTree>
     <p:extLst>
       <p:ext uri="{BB962C8B-B14F-4D97-AF65-F5344CB8AC3E}">
@@ -6442,82 +6742,219 @@
             <p:ph type="title"/>
           </p:nvPr>
         </p:nvSpPr>
-        <p:spPr/>
-        <p:txBody>
-          <a:bodyPr/>
-          <a:lstStyle/>
-          <a:p>
-            <a:r>
-              <a:rPr lang="en-US"/>
-              <a:t>Today’s Agenda</a:t>
-            </a:r>
-          </a:p>
-        </p:txBody>
-      </p:sp>
-      <p:sp>
-        <p:nvSpPr>
-          <p:cNvPr id="3" name="Content Placeholder 2"/>
-          <p:cNvSpPr>
-            <a:spLocks noGrp="1"/>
-          </p:cNvSpPr>
-          <p:nvPr>
-            <p:ph idx="1"/>
-          </p:nvPr>
-        </p:nvSpPr>
-        <p:spPr/>
+        <p:spPr>
+          <a:xfrm>
+            <a:off x="445103" y="0"/>
+            <a:ext cx="8229600" cy="640700"/>
+          </a:xfrm>
+        </p:spPr>
         <p:txBody>
           <a:bodyPr>
-            <a:normAutofit lnSpcReduction="10000"/>
+            <a:normAutofit fontScale="90000"/>
           </a:bodyPr>
           <a:lstStyle/>
           <a:p>
             <a:r>
-              <a:rPr lang="en-US" strike="sngStrike" dirty="0"/>
-              <a:t>Help: Piazza, TA Help Hours, Panopto Videos</a:t>
-            </a:r>
-          </a:p>
-          <a:p>
-            <a:r>
-              <a:rPr lang="en-US" strike="sngStrike" dirty="0"/>
-              <a:t>Quizzes</a:t>
-            </a:r>
-          </a:p>
-          <a:p>
-            <a:r>
-              <a:rPr lang="en-US" strike="sngStrike" dirty="0"/>
-              <a:t>Academic Integrity</a:t>
-            </a:r>
-          </a:p>
+              <a:rPr lang="en-US" dirty="0" err="1"/>
+              <a:t>HWMaps</a:t>
+            </a:r>
+            <a:endParaRPr lang="en-US" dirty="0"/>
+          </a:p>
+        </p:txBody>
+      </p:sp>
+      <p:sp>
+        <p:nvSpPr>
+          <p:cNvPr id="3" name="Content Placeholder 2"/>
+          <p:cNvSpPr>
+            <a:spLocks noGrp="1"/>
+          </p:cNvSpPr>
+          <p:nvPr>
+            <p:ph idx="1"/>
+          </p:nvPr>
+        </p:nvSpPr>
+        <p:spPr>
+          <a:xfrm>
+            <a:off x="457379" y="2185359"/>
+            <a:ext cx="8425363" cy="1951212"/>
+          </a:xfrm>
+        </p:spPr>
+        <p:txBody>
+          <a:bodyPr>
+            <a:normAutofit/>
+          </a:bodyPr>
+          <a:lstStyle/>
+          <a:p>
+            <a:r>
+              <a:rPr lang="en-US" sz="2000"/>
+              <a:t>Can collaborate </a:t>
+            </a:r>
+            <a:r>
+              <a:rPr lang="en-US" sz="2000" dirty="0"/>
+              <a:t>with a partner on </a:t>
+            </a:r>
+            <a:r>
+              <a:rPr lang="en-US" sz="2000" u="sng" dirty="0"/>
+              <a:t>exactly 1 of the operations</a:t>
+            </a:r>
+          </a:p>
+          <a:p>
+            <a:r>
+              <a:rPr lang="en-US" sz="2000" dirty="0"/>
+              <a:t>Consider draw a few map diagrams for test data for </a:t>
+            </a:r>
+            <a:r>
+              <a:rPr lang="en-US" sz="2000" i="1" dirty="0" err="1"/>
+              <a:t>getNumberOfCoursesToTake</a:t>
+            </a:r>
+            <a:endParaRPr lang="en-US" sz="2000" i="1" dirty="0"/>
+          </a:p>
+          <a:p>
+            <a:r>
+              <a:rPr lang="en-US" sz="2000" dirty="0"/>
+              <a:t>Each list the other’s name in </a:t>
+            </a:r>
+            <a:r>
+              <a:rPr lang="en-US" sz="2000" i="1" dirty="0"/>
+              <a:t>Help Citation</a:t>
+            </a:r>
+            <a:r>
+              <a:rPr lang="en-US" sz="2000" dirty="0"/>
+              <a:t> at top of file</a:t>
+            </a:r>
+          </a:p>
+          <a:p>
+            <a:r>
+              <a:rPr lang="en-US" sz="2000" dirty="0"/>
+              <a:t>Both responsible for submitting own code</a:t>
+            </a:r>
+          </a:p>
+          <a:p>
+            <a:endParaRPr lang="en-US" sz="2000" i="1" dirty="0"/>
+          </a:p>
+        </p:txBody>
+      </p:sp>
+      <p:pic>
+        <p:nvPicPr>
+          <p:cNvPr id="4" name="Picture 3">
+            <a:extLst>
+              <a:ext uri="{FF2B5EF4-FFF2-40B4-BE49-F238E27FC236}">
+                <a16:creationId xmlns:a16="http://schemas.microsoft.com/office/drawing/2014/main" id="{8EAB44CF-A3F6-4B4C-BC3A-0AA56C34627F}"/>
+              </a:ext>
+            </a:extLst>
+          </p:cNvPr>
+          <p:cNvPicPr>
+            <a:picLocks noChangeAspect="1"/>
+          </p:cNvPicPr>
+          <p:nvPr/>
+        </p:nvPicPr>
+        <p:blipFill>
+          <a:blip r:embed="rId3"/>
+          <a:stretch>
+            <a:fillRect/>
+          </a:stretch>
+        </p:blipFill>
+        <p:spPr>
+          <a:xfrm>
+            <a:off x="901547" y="640700"/>
+            <a:ext cx="6195939" cy="1526536"/>
+          </a:xfrm>
+          <a:prstGeom prst="rect">
+            <a:avLst/>
+          </a:prstGeom>
+        </p:spPr>
+      </p:pic>
+      <p:sp>
+        <p:nvSpPr>
+          <p:cNvPr id="5" name="TextBox 4">
+            <a:extLst>
+              <a:ext uri="{FF2B5EF4-FFF2-40B4-BE49-F238E27FC236}">
+                <a16:creationId xmlns:a16="http://schemas.microsoft.com/office/drawing/2014/main" id="{B38A22DE-EAA2-2A6E-6B36-6CB57326C225}"/>
+              </a:ext>
+            </a:extLst>
+          </p:cNvPr>
+          <p:cNvSpPr txBox="1"/>
+          <p:nvPr/>
+        </p:nvSpPr>
+        <p:spPr>
+          <a:xfrm>
+            <a:off x="152400" y="4380637"/>
+            <a:ext cx="8839200" cy="2031325"/>
+          </a:xfrm>
+          <a:prstGeom prst="rect">
+            <a:avLst/>
+          </a:prstGeom>
+          <a:solidFill>
+            <a:srgbClr val="92D050"/>
+          </a:solidFill>
+          <a:ln>
+            <a:solidFill>
+              <a:schemeClr val="tx1"/>
+            </a:solidFill>
+          </a:ln>
+        </p:spPr>
+        <p:txBody>
+          <a:bodyPr wrap="square" rtlCol="0">
+            <a:spAutoFit/>
+          </a:bodyPr>
+          <a:lstStyle/>
           <a:p>
             <a:r>
               <a:rPr lang="en-US" dirty="0"/>
-              <a:t>Review:</a:t>
-            </a:r>
-          </a:p>
-          <a:p>
-            <a:pPr lvl="1"/>
+              <a:t>Right Now: Take out a sheet of paper now and tear off a small piece.</a:t>
+            </a:r>
+          </a:p>
+          <a:p>
+            <a:pPr marL="342900" indent="-342900">
+              <a:buAutoNum type="arabicPeriod"/>
+            </a:pPr>
             <a:r>
               <a:rPr lang="en-US" dirty="0"/>
-              <a:t>Coding Gotchas</a:t>
-            </a:r>
-          </a:p>
-          <a:p>
-            <a:pPr lvl="1"/>
+              <a:t>Put your name on it</a:t>
+            </a:r>
+          </a:p>
+          <a:p>
+            <a:pPr marL="342900" indent="-342900">
+              <a:buAutoNum type="arabicPeriod"/>
+            </a:pPr>
             <a:r>
               <a:rPr lang="en-US" dirty="0"/>
-              <a:t>Enhanced for loops</a:t>
-            </a:r>
-          </a:p>
-          <a:p>
+              <a:t>Put the name of 1 or more people you would LIKE to work with</a:t>
+            </a:r>
+          </a:p>
+          <a:p>
+            <a:pPr marL="800100" lvl="1" indent="-342900">
+              <a:buFont typeface="+mj-lt"/>
+              <a:buAutoNum type="alphaUcPeriod"/>
+            </a:pPr>
             <a:r>
               <a:rPr lang="en-US" dirty="0"/>
-              <a:t>2D Arrays</a:t>
-            </a:r>
-          </a:p>
-          <a:p>
+              <a:t>You can say you don’t know anyone, but would like to work with someone</a:t>
+            </a:r>
+          </a:p>
+          <a:p>
+            <a:pPr marL="800100" lvl="1" indent="-342900">
+              <a:buFont typeface="+mj-lt"/>
+              <a:buAutoNum type="alphaUcPeriod"/>
+            </a:pPr>
             <a:r>
               <a:rPr lang="en-US" dirty="0"/>
-              <a:t>Maps</a:t>
+              <a:t>You can say you want to work alone</a:t>
+            </a:r>
+          </a:p>
+          <a:p>
+            <a:pPr marL="342900" indent="-342900">
+              <a:buFont typeface="+mj-lt"/>
+              <a:buAutoNum type="arabicPeriod"/>
+            </a:pPr>
+            <a:r>
+              <a:rPr lang="en-US" dirty="0"/>
+              <a:t>Put the name of anyone you would prefer NOT to work with</a:t>
+            </a:r>
+          </a:p>
+          <a:p>
+            <a:r>
+              <a:rPr lang="en-US" dirty="0"/>
+              <a:t>Hand this to our TA and they will make pairs for you to use</a:t>
             </a:r>
           </a:p>
         </p:txBody>
@@ -6525,7 +6962,7 @@
     </p:spTree>
     <p:extLst>
       <p:ext uri="{BB962C8B-B14F-4D97-AF65-F5344CB8AC3E}">
-        <p14:creationId xmlns:p14="http://schemas.microsoft.com/office/powerpoint/2010/main" val="3075912542"/>
+        <p14:creationId xmlns:p14="http://schemas.microsoft.com/office/powerpoint/2010/main" val="3490648585"/>
       </p:ext>
     </p:extLst>
   </p:cSld>
@@ -6674,15 +7111,7 @@
           <a:p>
             <a:r>
               <a:rPr lang="en-US"/>
-              <a:t>Coding Gotchas – the </a:t>
-            </a:r>
-            <a:r>
-              <a:rPr lang="en-US" i="1"/>
-              <a:t>size</a:t>
-            </a:r>
-            <a:r>
-              <a:rPr lang="en-US"/>
-              <a:t> of things</a:t>
+              <a:t>Today’s Agenda</a:t>
             </a:r>
           </a:p>
         </p:txBody>
@@ -6697,307 +7126,68 @@
             <p:ph idx="1"/>
           </p:nvPr>
         </p:nvSpPr>
-        <p:spPr>
-          <a:xfrm>
-            <a:off x="457200" y="1417638"/>
-            <a:ext cx="8382000" cy="4525963"/>
-          </a:xfrm>
-        </p:spPr>
+        <p:spPr/>
         <p:txBody>
           <a:bodyPr>
-            <a:normAutofit/>
+            <a:normAutofit lnSpcReduction="10000"/>
           </a:bodyPr>
           <a:lstStyle/>
           <a:p>
-            <a:pPr marL="0" indent="0">
-              <a:buNone/>
-            </a:pPr>
-            <a:r>
-              <a:rPr lang="en-US" sz="2000" dirty="0">
-                <a:latin typeface="Courier New" panose="02070309020205020404" pitchFamily="49" charset="0"/>
-                <a:cs typeface="Courier New" panose="02070309020205020404" pitchFamily="49" charset="0"/>
-              </a:rPr>
-              <a:t>int[] numbers = { 2, 4, 8, 16};</a:t>
-            </a:r>
-          </a:p>
-          <a:p>
-            <a:pPr marL="0" indent="0">
-              <a:buNone/>
-            </a:pPr>
-            <a:r>
-              <a:rPr lang="en-US" sz="2000" dirty="0">
-                <a:latin typeface="Courier New" panose="02070309020205020404" pitchFamily="49" charset="0"/>
-                <a:cs typeface="Courier New" panose="02070309020205020404" pitchFamily="49" charset="0"/>
-              </a:rPr>
-              <a:t>int </a:t>
-            </a:r>
-            <a:r>
-              <a:rPr lang="en-US" sz="2000" dirty="0" err="1">
-                <a:latin typeface="Courier New" panose="02070309020205020404" pitchFamily="49" charset="0"/>
-                <a:cs typeface="Courier New" panose="02070309020205020404" pitchFamily="49" charset="0"/>
-              </a:rPr>
-              <a:t>numbersCount</a:t>
-            </a:r>
-            <a:r>
-              <a:rPr lang="en-US" sz="2000" dirty="0">
-                <a:latin typeface="Courier New" panose="02070309020205020404" pitchFamily="49" charset="0"/>
-                <a:cs typeface="Courier New" panose="02070309020205020404" pitchFamily="49" charset="0"/>
-              </a:rPr>
-              <a:t> = </a:t>
-            </a:r>
-            <a:r>
-              <a:rPr lang="en-US" sz="2000" dirty="0" err="1">
-                <a:latin typeface="Courier New" panose="02070309020205020404" pitchFamily="49" charset="0"/>
-                <a:cs typeface="Courier New" panose="02070309020205020404" pitchFamily="49" charset="0"/>
-              </a:rPr>
-              <a:t>numbers.length</a:t>
-            </a:r>
-            <a:r>
-              <a:rPr lang="en-US" sz="2000" dirty="0">
-                <a:latin typeface="Courier New" panose="02070309020205020404" pitchFamily="49" charset="0"/>
-                <a:cs typeface="Courier New" panose="02070309020205020404" pitchFamily="49" charset="0"/>
-              </a:rPr>
-              <a:t>;</a:t>
-            </a:r>
-          </a:p>
-          <a:p>
-            <a:pPr marL="0" indent="0">
-              <a:buNone/>
-            </a:pPr>
-            <a:r>
-              <a:rPr lang="en-US" sz="2000" dirty="0">
-                <a:latin typeface="Courier New" panose="02070309020205020404" pitchFamily="49" charset="0"/>
-                <a:cs typeface="Courier New" panose="02070309020205020404" pitchFamily="49" charset="0"/>
-              </a:rPr>
-              <a:t>// Java array uses 'length'</a:t>
-            </a:r>
-          </a:p>
-          <a:p>
-            <a:pPr marL="0" indent="0">
-              <a:buNone/>
-            </a:pPr>
-            <a:endParaRPr lang="en-US" sz="2000" dirty="0">
-              <a:latin typeface="Courier New" panose="02070309020205020404" pitchFamily="49" charset="0"/>
-              <a:cs typeface="Courier New" panose="02070309020205020404" pitchFamily="49" charset="0"/>
-            </a:endParaRPr>
-          </a:p>
-          <a:p>
-            <a:pPr marL="0" indent="0">
-              <a:buNone/>
-            </a:pPr>
-            <a:r>
-              <a:rPr lang="en-US" sz="2000" dirty="0" err="1">
-                <a:latin typeface="Courier New" panose="02070309020205020404" pitchFamily="49" charset="0"/>
-                <a:cs typeface="Courier New" panose="02070309020205020404" pitchFamily="49" charset="0"/>
-              </a:rPr>
-              <a:t>ArrayList</a:t>
-            </a:r>
-            <a:r>
-              <a:rPr lang="en-US" sz="2000" dirty="0">
-                <a:latin typeface="Courier New" panose="02070309020205020404" pitchFamily="49" charset="0"/>
-                <a:cs typeface="Courier New" panose="02070309020205020404" pitchFamily="49" charset="0"/>
-              </a:rPr>
-              <a:t>&lt;String&gt; words = </a:t>
-            </a:r>
-            <a:r>
-              <a:rPr lang="en-US" sz="2000" b="1" dirty="0">
-                <a:latin typeface="Courier New" panose="02070309020205020404" pitchFamily="49" charset="0"/>
-                <a:cs typeface="Courier New" panose="02070309020205020404" pitchFamily="49" charset="0"/>
-              </a:rPr>
-              <a:t>new</a:t>
-            </a:r>
-            <a:r>
-              <a:rPr lang="en-US" sz="2000" dirty="0">
-                <a:latin typeface="Courier New" panose="02070309020205020404" pitchFamily="49" charset="0"/>
-                <a:cs typeface="Courier New" panose="02070309020205020404" pitchFamily="49" charset="0"/>
-              </a:rPr>
-              <a:t> </a:t>
-            </a:r>
-            <a:r>
-              <a:rPr lang="en-US" sz="2000" dirty="0" err="1">
-                <a:latin typeface="Courier New" panose="02070309020205020404" pitchFamily="49" charset="0"/>
-                <a:cs typeface="Courier New" panose="02070309020205020404" pitchFamily="49" charset="0"/>
-              </a:rPr>
-              <a:t>ArrayList</a:t>
-            </a:r>
-            <a:r>
-              <a:rPr lang="en-US" sz="2000" dirty="0">
-                <a:latin typeface="Courier New" panose="02070309020205020404" pitchFamily="49" charset="0"/>
-                <a:cs typeface="Courier New" panose="02070309020205020404" pitchFamily="49" charset="0"/>
-              </a:rPr>
-              <a:t>&lt;String&gt;();</a:t>
-            </a:r>
-          </a:p>
-          <a:p>
-            <a:pPr marL="0" indent="0">
-              <a:buNone/>
-            </a:pPr>
-            <a:r>
-              <a:rPr lang="en-US" sz="2000" dirty="0" err="1">
-                <a:latin typeface="Courier New" panose="02070309020205020404" pitchFamily="49" charset="0"/>
-                <a:cs typeface="Courier New" panose="02070309020205020404" pitchFamily="49" charset="0"/>
-              </a:rPr>
-              <a:t>words.add</a:t>
-            </a:r>
-            <a:r>
-              <a:rPr lang="en-US" sz="2000" dirty="0">
-                <a:latin typeface="Courier New" panose="02070309020205020404" pitchFamily="49" charset="0"/>
-                <a:cs typeface="Courier New" panose="02070309020205020404" pitchFamily="49" charset="0"/>
-              </a:rPr>
-              <a:t>("Hello!");</a:t>
-            </a:r>
-          </a:p>
-          <a:p>
-            <a:pPr marL="0" indent="0">
-              <a:buNone/>
-            </a:pPr>
-            <a:r>
-              <a:rPr lang="en-US" sz="2000" dirty="0">
-                <a:latin typeface="Courier New" panose="02070309020205020404" pitchFamily="49" charset="0"/>
-                <a:cs typeface="Courier New" panose="02070309020205020404" pitchFamily="49" charset="0"/>
-              </a:rPr>
-              <a:t>int </a:t>
-            </a:r>
-            <a:r>
-              <a:rPr lang="en-US" sz="2000" dirty="0" err="1">
-                <a:latin typeface="Courier New" panose="02070309020205020404" pitchFamily="49" charset="0"/>
-                <a:cs typeface="Courier New" panose="02070309020205020404" pitchFamily="49" charset="0"/>
-              </a:rPr>
-              <a:t>wordsCount</a:t>
-            </a:r>
-            <a:r>
-              <a:rPr lang="en-US" sz="2000" dirty="0">
-                <a:latin typeface="Courier New" panose="02070309020205020404" pitchFamily="49" charset="0"/>
-                <a:cs typeface="Courier New" panose="02070309020205020404" pitchFamily="49" charset="0"/>
-              </a:rPr>
-              <a:t> = </a:t>
-            </a:r>
-            <a:r>
-              <a:rPr lang="en-US" sz="2000" dirty="0" err="1">
-                <a:latin typeface="Courier New" panose="02070309020205020404" pitchFamily="49" charset="0"/>
-                <a:cs typeface="Courier New" panose="02070309020205020404" pitchFamily="49" charset="0"/>
-              </a:rPr>
-              <a:t>words.size</a:t>
-            </a:r>
-            <a:r>
-              <a:rPr lang="en-US" sz="2000" dirty="0">
-                <a:latin typeface="Courier New" panose="02070309020205020404" pitchFamily="49" charset="0"/>
-                <a:cs typeface="Courier New" panose="02070309020205020404" pitchFamily="49" charset="0"/>
-              </a:rPr>
-              <a:t>();</a:t>
-            </a:r>
-          </a:p>
-          <a:p>
-            <a:pPr marL="0" indent="0">
-              <a:buNone/>
-            </a:pPr>
-            <a:r>
-              <a:rPr lang="en-US" sz="2000" dirty="0">
-                <a:latin typeface="Courier New" panose="02070309020205020404" pitchFamily="49" charset="0"/>
-                <a:cs typeface="Courier New" panose="02070309020205020404" pitchFamily="49" charset="0"/>
-              </a:rPr>
-              <a:t>// </a:t>
-            </a:r>
-            <a:r>
-              <a:rPr lang="en-US" sz="2000" dirty="0" err="1">
-                <a:latin typeface="Courier New" panose="02070309020205020404" pitchFamily="49" charset="0"/>
-                <a:cs typeface="Courier New" panose="02070309020205020404" pitchFamily="49" charset="0"/>
-              </a:rPr>
-              <a:t>ArrayList</a:t>
-            </a:r>
-            <a:r>
-              <a:rPr lang="en-US" sz="2000" dirty="0">
-                <a:latin typeface="Courier New" panose="02070309020205020404" pitchFamily="49" charset="0"/>
-                <a:cs typeface="Courier New" panose="02070309020205020404" pitchFamily="49" charset="0"/>
-              </a:rPr>
-              <a:t> uses 'size()'</a:t>
-            </a:r>
-          </a:p>
-          <a:p>
-            <a:pPr marL="0" indent="0">
-              <a:buNone/>
-            </a:pPr>
-            <a:endParaRPr lang="en-US" sz="2000" dirty="0">
-              <a:latin typeface="Courier New" panose="02070309020205020404" pitchFamily="49" charset="0"/>
-              <a:cs typeface="Courier New" panose="02070309020205020404" pitchFamily="49" charset="0"/>
-            </a:endParaRPr>
-          </a:p>
-          <a:p>
-            <a:pPr marL="0" indent="0">
-              <a:buNone/>
-            </a:pPr>
-            <a:r>
-              <a:rPr lang="en-US" sz="2000" dirty="0">
-                <a:latin typeface="Courier New" panose="02070309020205020404" pitchFamily="49" charset="0"/>
-                <a:cs typeface="Courier New" panose="02070309020205020404" pitchFamily="49" charset="0"/>
-              </a:rPr>
-              <a:t>String word = "Hello";</a:t>
-            </a:r>
-          </a:p>
-          <a:p>
-            <a:pPr marL="0" indent="0">
-              <a:buNone/>
-            </a:pPr>
-            <a:r>
-              <a:rPr lang="en-US" sz="2000" dirty="0">
-                <a:latin typeface="Courier New" panose="02070309020205020404" pitchFamily="49" charset="0"/>
-                <a:cs typeface="Courier New" panose="02070309020205020404" pitchFamily="49" charset="0"/>
-              </a:rPr>
-              <a:t>int </a:t>
-            </a:r>
-            <a:r>
-              <a:rPr lang="en-US" sz="2000" dirty="0" err="1">
-                <a:latin typeface="Courier New" panose="02070309020205020404" pitchFamily="49" charset="0"/>
-                <a:cs typeface="Courier New" panose="02070309020205020404" pitchFamily="49" charset="0"/>
-              </a:rPr>
-              <a:t>characterCount</a:t>
-            </a:r>
-            <a:r>
-              <a:rPr lang="en-US" sz="2000" dirty="0">
-                <a:latin typeface="Courier New" panose="02070309020205020404" pitchFamily="49" charset="0"/>
-                <a:cs typeface="Courier New" panose="02070309020205020404" pitchFamily="49" charset="0"/>
-              </a:rPr>
-              <a:t> = </a:t>
-            </a:r>
-            <a:r>
-              <a:rPr lang="en-US" sz="2000" dirty="0" err="1">
-                <a:latin typeface="Courier New" panose="02070309020205020404" pitchFamily="49" charset="0"/>
-                <a:cs typeface="Courier New" panose="02070309020205020404" pitchFamily="49" charset="0"/>
-              </a:rPr>
-              <a:t>word.length</a:t>
-            </a:r>
-            <a:r>
-              <a:rPr lang="en-US" sz="2000" dirty="0">
-                <a:latin typeface="Courier New" panose="02070309020205020404" pitchFamily="49" charset="0"/>
-                <a:cs typeface="Courier New" panose="02070309020205020404" pitchFamily="49" charset="0"/>
-              </a:rPr>
-              <a:t>();</a:t>
-            </a:r>
-          </a:p>
-          <a:p>
-            <a:pPr marL="0" indent="0">
-              <a:buNone/>
-            </a:pPr>
-            <a:r>
-              <a:rPr lang="en-US" sz="2000" dirty="0">
-                <a:latin typeface="Courier New" panose="02070309020205020404" pitchFamily="49" charset="0"/>
-                <a:cs typeface="Courier New" panose="02070309020205020404" pitchFamily="49" charset="0"/>
-              </a:rPr>
-              <a:t>// String uses length()</a:t>
-            </a:r>
-          </a:p>
-          <a:p>
-            <a:pPr marL="0" indent="0">
-              <a:buNone/>
-            </a:pPr>
-            <a:endParaRPr lang="en-US" sz="2000" dirty="0"/>
+            <a:r>
+              <a:rPr lang="en-US" strike="sngStrike" dirty="0"/>
+              <a:t>Help: Piazza, TA Help Hours, Panopto Videos</a:t>
+            </a:r>
+          </a:p>
+          <a:p>
+            <a:r>
+              <a:rPr lang="en-US" strike="sngStrike" dirty="0"/>
+              <a:t>Quizzes</a:t>
+            </a:r>
+          </a:p>
+          <a:p>
+            <a:r>
+              <a:rPr lang="en-US" strike="sngStrike" dirty="0"/>
+              <a:t>Academic Integrity</a:t>
+            </a:r>
+          </a:p>
+          <a:p>
+            <a:r>
+              <a:rPr lang="en-US" dirty="0"/>
+              <a:t>Review:</a:t>
+            </a:r>
+          </a:p>
+          <a:p>
+            <a:pPr lvl="1"/>
+            <a:r>
+              <a:rPr lang="en-US" dirty="0"/>
+              <a:t>Coding Gotchas</a:t>
+            </a:r>
+          </a:p>
+          <a:p>
+            <a:pPr lvl="1"/>
+            <a:r>
+              <a:rPr lang="en-US" dirty="0"/>
+              <a:t>Enhanced for loops</a:t>
+            </a:r>
+          </a:p>
+          <a:p>
+            <a:r>
+              <a:rPr lang="en-US" dirty="0"/>
+              <a:t>2D Arrays</a:t>
+            </a:r>
+          </a:p>
+          <a:p>
+            <a:r>
+              <a:rPr lang="en-US" dirty="0"/>
+              <a:t>Maps</a:t>
+            </a:r>
           </a:p>
         </p:txBody>
       </p:sp>
     </p:spTree>
     <p:extLst>
       <p:ext uri="{BB962C8B-B14F-4D97-AF65-F5344CB8AC3E}">
-        <p14:creationId xmlns:p14="http://schemas.microsoft.com/office/powerpoint/2010/main" val="1892145613"/>
+        <p14:creationId xmlns:p14="http://schemas.microsoft.com/office/powerpoint/2010/main" val="3075912542"/>
       </p:ext>
     </p:extLst>
   </p:cSld>
@@ -7041,6 +7231,373 @@
           <a:p>
             <a:r>
               <a:rPr lang="en-US"/>
+              <a:t>Coding Gotchas – the </a:t>
+            </a:r>
+            <a:r>
+              <a:rPr lang="en-US" i="1"/>
+              <a:t>size</a:t>
+            </a:r>
+            <a:r>
+              <a:rPr lang="en-US"/>
+              <a:t> of things</a:t>
+            </a:r>
+          </a:p>
+        </p:txBody>
+      </p:sp>
+      <p:sp>
+        <p:nvSpPr>
+          <p:cNvPr id="3" name="Content Placeholder 2"/>
+          <p:cNvSpPr>
+            <a:spLocks noGrp="1"/>
+          </p:cNvSpPr>
+          <p:nvPr>
+            <p:ph idx="1"/>
+          </p:nvPr>
+        </p:nvSpPr>
+        <p:spPr>
+          <a:xfrm>
+            <a:off x="457200" y="1417638"/>
+            <a:ext cx="8382000" cy="4525963"/>
+          </a:xfrm>
+        </p:spPr>
+        <p:txBody>
+          <a:bodyPr>
+            <a:normAutofit/>
+          </a:bodyPr>
+          <a:lstStyle/>
+          <a:p>
+            <a:pPr marL="0" indent="0">
+              <a:buNone/>
+            </a:pPr>
+            <a:r>
+              <a:rPr lang="en-US" sz="2000" dirty="0">
+                <a:latin typeface="Courier New" panose="02070309020205020404" pitchFamily="49" charset="0"/>
+                <a:cs typeface="Courier New" panose="02070309020205020404" pitchFamily="49" charset="0"/>
+              </a:rPr>
+              <a:t>int[] numbers = { 2, 4, 8, 16};</a:t>
+            </a:r>
+          </a:p>
+          <a:p>
+            <a:pPr marL="0" indent="0">
+              <a:buNone/>
+            </a:pPr>
+            <a:r>
+              <a:rPr lang="en-US" sz="2000" dirty="0">
+                <a:latin typeface="Courier New" panose="02070309020205020404" pitchFamily="49" charset="0"/>
+                <a:cs typeface="Courier New" panose="02070309020205020404" pitchFamily="49" charset="0"/>
+              </a:rPr>
+              <a:t>int </a:t>
+            </a:r>
+            <a:r>
+              <a:rPr lang="en-US" sz="2000" dirty="0" err="1">
+                <a:latin typeface="Courier New" panose="02070309020205020404" pitchFamily="49" charset="0"/>
+                <a:cs typeface="Courier New" panose="02070309020205020404" pitchFamily="49" charset="0"/>
+              </a:rPr>
+              <a:t>numbersCount</a:t>
+            </a:r>
+            <a:r>
+              <a:rPr lang="en-US" sz="2000" dirty="0">
+                <a:latin typeface="Courier New" panose="02070309020205020404" pitchFamily="49" charset="0"/>
+                <a:cs typeface="Courier New" panose="02070309020205020404" pitchFamily="49" charset="0"/>
+              </a:rPr>
+              <a:t> = </a:t>
+            </a:r>
+            <a:r>
+              <a:rPr lang="en-US" sz="2000" dirty="0" err="1">
+                <a:latin typeface="Courier New" panose="02070309020205020404" pitchFamily="49" charset="0"/>
+                <a:cs typeface="Courier New" panose="02070309020205020404" pitchFamily="49" charset="0"/>
+              </a:rPr>
+              <a:t>numbers.length</a:t>
+            </a:r>
+            <a:r>
+              <a:rPr lang="en-US" sz="2000" dirty="0">
+                <a:latin typeface="Courier New" panose="02070309020205020404" pitchFamily="49" charset="0"/>
+                <a:cs typeface="Courier New" panose="02070309020205020404" pitchFamily="49" charset="0"/>
+              </a:rPr>
+              <a:t>;</a:t>
+            </a:r>
+          </a:p>
+          <a:p>
+            <a:pPr marL="0" indent="0">
+              <a:buNone/>
+            </a:pPr>
+            <a:r>
+              <a:rPr lang="en-US" sz="2000" dirty="0">
+                <a:latin typeface="Courier New" panose="02070309020205020404" pitchFamily="49" charset="0"/>
+                <a:cs typeface="Courier New" panose="02070309020205020404" pitchFamily="49" charset="0"/>
+              </a:rPr>
+              <a:t>// Java array uses 'length'</a:t>
+            </a:r>
+          </a:p>
+          <a:p>
+            <a:pPr marL="0" indent="0">
+              <a:buNone/>
+            </a:pPr>
+            <a:endParaRPr lang="en-US" sz="2000" dirty="0">
+              <a:latin typeface="Courier New" panose="02070309020205020404" pitchFamily="49" charset="0"/>
+              <a:cs typeface="Courier New" panose="02070309020205020404" pitchFamily="49" charset="0"/>
+            </a:endParaRPr>
+          </a:p>
+          <a:p>
+            <a:pPr marL="0" indent="0">
+              <a:buNone/>
+            </a:pPr>
+            <a:r>
+              <a:rPr lang="en-US" sz="2000" dirty="0" err="1">
+                <a:latin typeface="Courier New" panose="02070309020205020404" pitchFamily="49" charset="0"/>
+                <a:cs typeface="Courier New" panose="02070309020205020404" pitchFamily="49" charset="0"/>
+              </a:rPr>
+              <a:t>ArrayList</a:t>
+            </a:r>
+            <a:r>
+              <a:rPr lang="en-US" sz="2000" dirty="0">
+                <a:latin typeface="Courier New" panose="02070309020205020404" pitchFamily="49" charset="0"/>
+                <a:cs typeface="Courier New" panose="02070309020205020404" pitchFamily="49" charset="0"/>
+              </a:rPr>
+              <a:t>&lt;String&gt; words = </a:t>
+            </a:r>
+            <a:r>
+              <a:rPr lang="en-US" sz="2000" b="1" dirty="0">
+                <a:latin typeface="Courier New" panose="02070309020205020404" pitchFamily="49" charset="0"/>
+                <a:cs typeface="Courier New" panose="02070309020205020404" pitchFamily="49" charset="0"/>
+              </a:rPr>
+              <a:t>new</a:t>
+            </a:r>
+            <a:r>
+              <a:rPr lang="en-US" sz="2000" dirty="0">
+                <a:latin typeface="Courier New" panose="02070309020205020404" pitchFamily="49" charset="0"/>
+                <a:cs typeface="Courier New" panose="02070309020205020404" pitchFamily="49" charset="0"/>
+              </a:rPr>
+              <a:t> </a:t>
+            </a:r>
+            <a:r>
+              <a:rPr lang="en-US" sz="2000" dirty="0" err="1">
+                <a:latin typeface="Courier New" panose="02070309020205020404" pitchFamily="49" charset="0"/>
+                <a:cs typeface="Courier New" panose="02070309020205020404" pitchFamily="49" charset="0"/>
+              </a:rPr>
+              <a:t>ArrayList</a:t>
+            </a:r>
+            <a:r>
+              <a:rPr lang="en-US" sz="2000" dirty="0">
+                <a:latin typeface="Courier New" panose="02070309020205020404" pitchFamily="49" charset="0"/>
+                <a:cs typeface="Courier New" panose="02070309020205020404" pitchFamily="49" charset="0"/>
+              </a:rPr>
+              <a:t>&lt;String&gt;();</a:t>
+            </a:r>
+          </a:p>
+          <a:p>
+            <a:pPr marL="0" indent="0">
+              <a:buNone/>
+            </a:pPr>
+            <a:r>
+              <a:rPr lang="en-US" sz="2000" dirty="0" err="1">
+                <a:latin typeface="Courier New" panose="02070309020205020404" pitchFamily="49" charset="0"/>
+                <a:cs typeface="Courier New" panose="02070309020205020404" pitchFamily="49" charset="0"/>
+              </a:rPr>
+              <a:t>words.add</a:t>
+            </a:r>
+            <a:r>
+              <a:rPr lang="en-US" sz="2000" dirty="0">
+                <a:latin typeface="Courier New" panose="02070309020205020404" pitchFamily="49" charset="0"/>
+                <a:cs typeface="Courier New" panose="02070309020205020404" pitchFamily="49" charset="0"/>
+              </a:rPr>
+              <a:t>("Hello!");</a:t>
+            </a:r>
+          </a:p>
+          <a:p>
+            <a:pPr marL="0" indent="0">
+              <a:buNone/>
+            </a:pPr>
+            <a:r>
+              <a:rPr lang="en-US" sz="2000" dirty="0">
+                <a:latin typeface="Courier New" panose="02070309020205020404" pitchFamily="49" charset="0"/>
+                <a:cs typeface="Courier New" panose="02070309020205020404" pitchFamily="49" charset="0"/>
+              </a:rPr>
+              <a:t>int </a:t>
+            </a:r>
+            <a:r>
+              <a:rPr lang="en-US" sz="2000" dirty="0" err="1">
+                <a:latin typeface="Courier New" panose="02070309020205020404" pitchFamily="49" charset="0"/>
+                <a:cs typeface="Courier New" panose="02070309020205020404" pitchFamily="49" charset="0"/>
+              </a:rPr>
+              <a:t>wordsCount</a:t>
+            </a:r>
+            <a:r>
+              <a:rPr lang="en-US" sz="2000" dirty="0">
+                <a:latin typeface="Courier New" panose="02070309020205020404" pitchFamily="49" charset="0"/>
+                <a:cs typeface="Courier New" panose="02070309020205020404" pitchFamily="49" charset="0"/>
+              </a:rPr>
+              <a:t> = </a:t>
+            </a:r>
+            <a:r>
+              <a:rPr lang="en-US" sz="2000" dirty="0" err="1">
+                <a:latin typeface="Courier New" panose="02070309020205020404" pitchFamily="49" charset="0"/>
+                <a:cs typeface="Courier New" panose="02070309020205020404" pitchFamily="49" charset="0"/>
+              </a:rPr>
+              <a:t>words.size</a:t>
+            </a:r>
+            <a:r>
+              <a:rPr lang="en-US" sz="2000" dirty="0">
+                <a:latin typeface="Courier New" panose="02070309020205020404" pitchFamily="49" charset="0"/>
+                <a:cs typeface="Courier New" panose="02070309020205020404" pitchFamily="49" charset="0"/>
+              </a:rPr>
+              <a:t>();</a:t>
+            </a:r>
+          </a:p>
+          <a:p>
+            <a:pPr marL="0" indent="0">
+              <a:buNone/>
+            </a:pPr>
+            <a:r>
+              <a:rPr lang="en-US" sz="2000" dirty="0">
+                <a:latin typeface="Courier New" panose="02070309020205020404" pitchFamily="49" charset="0"/>
+                <a:cs typeface="Courier New" panose="02070309020205020404" pitchFamily="49" charset="0"/>
+              </a:rPr>
+              <a:t>// </a:t>
+            </a:r>
+            <a:r>
+              <a:rPr lang="en-US" sz="2000" dirty="0" err="1">
+                <a:latin typeface="Courier New" panose="02070309020205020404" pitchFamily="49" charset="0"/>
+                <a:cs typeface="Courier New" panose="02070309020205020404" pitchFamily="49" charset="0"/>
+              </a:rPr>
+              <a:t>ArrayList</a:t>
+            </a:r>
+            <a:r>
+              <a:rPr lang="en-US" sz="2000" dirty="0">
+                <a:latin typeface="Courier New" panose="02070309020205020404" pitchFamily="49" charset="0"/>
+                <a:cs typeface="Courier New" panose="02070309020205020404" pitchFamily="49" charset="0"/>
+              </a:rPr>
+              <a:t> uses 'size()'</a:t>
+            </a:r>
+          </a:p>
+          <a:p>
+            <a:pPr marL="0" indent="0">
+              <a:buNone/>
+            </a:pPr>
+            <a:endParaRPr lang="en-US" sz="2000" dirty="0">
+              <a:latin typeface="Courier New" panose="02070309020205020404" pitchFamily="49" charset="0"/>
+              <a:cs typeface="Courier New" panose="02070309020205020404" pitchFamily="49" charset="0"/>
+            </a:endParaRPr>
+          </a:p>
+          <a:p>
+            <a:pPr marL="0" indent="0">
+              <a:buNone/>
+            </a:pPr>
+            <a:r>
+              <a:rPr lang="en-US" sz="2000" dirty="0">
+                <a:latin typeface="Courier New" panose="02070309020205020404" pitchFamily="49" charset="0"/>
+                <a:cs typeface="Courier New" panose="02070309020205020404" pitchFamily="49" charset="0"/>
+              </a:rPr>
+              <a:t>String word = "Hello";</a:t>
+            </a:r>
+          </a:p>
+          <a:p>
+            <a:pPr marL="0" indent="0">
+              <a:buNone/>
+            </a:pPr>
+            <a:r>
+              <a:rPr lang="en-US" sz="2000" dirty="0">
+                <a:latin typeface="Courier New" panose="02070309020205020404" pitchFamily="49" charset="0"/>
+                <a:cs typeface="Courier New" panose="02070309020205020404" pitchFamily="49" charset="0"/>
+              </a:rPr>
+              <a:t>int </a:t>
+            </a:r>
+            <a:r>
+              <a:rPr lang="en-US" sz="2000" dirty="0" err="1">
+                <a:latin typeface="Courier New" panose="02070309020205020404" pitchFamily="49" charset="0"/>
+                <a:cs typeface="Courier New" panose="02070309020205020404" pitchFamily="49" charset="0"/>
+              </a:rPr>
+              <a:t>characterCount</a:t>
+            </a:r>
+            <a:r>
+              <a:rPr lang="en-US" sz="2000" dirty="0">
+                <a:latin typeface="Courier New" panose="02070309020205020404" pitchFamily="49" charset="0"/>
+                <a:cs typeface="Courier New" panose="02070309020205020404" pitchFamily="49" charset="0"/>
+              </a:rPr>
+              <a:t> = </a:t>
+            </a:r>
+            <a:r>
+              <a:rPr lang="en-US" sz="2000" dirty="0" err="1">
+                <a:latin typeface="Courier New" panose="02070309020205020404" pitchFamily="49" charset="0"/>
+                <a:cs typeface="Courier New" panose="02070309020205020404" pitchFamily="49" charset="0"/>
+              </a:rPr>
+              <a:t>word.length</a:t>
+            </a:r>
+            <a:r>
+              <a:rPr lang="en-US" sz="2000" dirty="0">
+                <a:latin typeface="Courier New" panose="02070309020205020404" pitchFamily="49" charset="0"/>
+                <a:cs typeface="Courier New" panose="02070309020205020404" pitchFamily="49" charset="0"/>
+              </a:rPr>
+              <a:t>();</a:t>
+            </a:r>
+          </a:p>
+          <a:p>
+            <a:pPr marL="0" indent="0">
+              <a:buNone/>
+            </a:pPr>
+            <a:r>
+              <a:rPr lang="en-US" sz="2000" dirty="0">
+                <a:latin typeface="Courier New" panose="02070309020205020404" pitchFamily="49" charset="0"/>
+                <a:cs typeface="Courier New" panose="02070309020205020404" pitchFamily="49" charset="0"/>
+              </a:rPr>
+              <a:t>// String uses length()</a:t>
+            </a:r>
+          </a:p>
+          <a:p>
+            <a:pPr marL="0" indent="0">
+              <a:buNone/>
+            </a:pPr>
+            <a:endParaRPr lang="en-US" sz="2000" dirty="0"/>
+          </a:p>
+        </p:txBody>
+      </p:sp>
+    </p:spTree>
+    <p:extLst>
+      <p:ext uri="{BB962C8B-B14F-4D97-AF65-F5344CB8AC3E}">
+        <p14:creationId xmlns:p14="http://schemas.microsoft.com/office/powerpoint/2010/main" val="1892145613"/>
+      </p:ext>
+    </p:extLst>
+  </p:cSld>
+  <p:clrMapOvr>
+    <a:masterClrMapping/>
+  </p:clrMapOvr>
+</p:sld>
+</file>
+
+<file path=ppt/slides/slide22.xml><?xml version="1.0" encoding="utf-8"?>
+<p:sld xmlns:a="http://schemas.openxmlformats.org/drawingml/2006/main" xmlns:r="http://schemas.openxmlformats.org/officeDocument/2006/relationships" xmlns:p="http://schemas.openxmlformats.org/presentationml/2006/main">
+  <p:cSld>
+    <p:spTree>
+      <p:nvGrpSpPr>
+        <p:cNvPr id="1" name=""/>
+        <p:cNvGrpSpPr/>
+        <p:nvPr/>
+      </p:nvGrpSpPr>
+      <p:grpSpPr>
+        <a:xfrm>
+          <a:off x="0" y="0"/>
+          <a:ext cx="0" cy="0"/>
+          <a:chOff x="0" y="0"/>
+          <a:chExt cx="0" cy="0"/>
+        </a:xfrm>
+      </p:grpSpPr>
+      <p:sp>
+        <p:nvSpPr>
+          <p:cNvPr id="2" name="Title 1"/>
+          <p:cNvSpPr>
+            <a:spLocks noGrp="1"/>
+          </p:cNvSpPr>
+          <p:nvPr>
+            <p:ph type="title"/>
+          </p:nvPr>
+        </p:nvSpPr>
+        <p:spPr/>
+        <p:txBody>
+          <a:bodyPr/>
+          <a:lstStyle/>
+          <a:p>
+            <a:r>
+              <a:rPr lang="en-US"/>
               <a:t>Enhanced For Loops</a:t>
             </a:r>
           </a:p>
@@ -7192,7 +7749,7 @@
 </p:sld>
 </file>
 
-<file path=ppt/slides/slide22.xml><?xml version="1.0" encoding="utf-8"?>
+<file path=ppt/slides/slide23.xml><?xml version="1.0" encoding="utf-8"?>
 <p:sld xmlns:a="http://schemas.openxmlformats.org/drawingml/2006/main" xmlns:r="http://schemas.openxmlformats.org/officeDocument/2006/relationships" xmlns:p="http://schemas.openxmlformats.org/presentationml/2006/main">
   <p:cSld>
     <p:spTree>
@@ -8347,7 +8904,7 @@
 </p:sld>
 </file>
 
-<file path=ppt/slides/slide23.xml><?xml version="1.0" encoding="utf-8"?>
+<file path=ppt/slides/slide24.xml><?xml version="1.0" encoding="utf-8"?>
 <p:sld xmlns:a="http://schemas.openxmlformats.org/drawingml/2006/main" xmlns:r="http://schemas.openxmlformats.org/officeDocument/2006/relationships" xmlns:p="http://schemas.openxmlformats.org/presentationml/2006/main">
   <p:cSld>
     <p:spTree>
@@ -9358,6 +9915,36 @@
           </a:prstGeom>
         </p:spPr>
       </p:pic>
+      <p:pic>
+        <p:nvPicPr>
+          <p:cNvPr id="4" name="Picture 3">
+            <a:extLst>
+              <a:ext uri="{FF2B5EF4-FFF2-40B4-BE49-F238E27FC236}">
+                <a16:creationId xmlns:a16="http://schemas.microsoft.com/office/drawing/2014/main" id="{44633198-4935-3084-822F-ABFCAB84F476}"/>
+              </a:ext>
+            </a:extLst>
+          </p:cNvPr>
+          <p:cNvPicPr>
+            <a:picLocks noChangeAspect="1"/>
+          </p:cNvPicPr>
+          <p:nvPr/>
+        </p:nvPicPr>
+        <p:blipFill>
+          <a:blip r:embed="rId7"/>
+          <a:stretch>
+            <a:fillRect/>
+          </a:stretch>
+        </p:blipFill>
+        <p:spPr>
+          <a:xfrm>
+            <a:off x="487680" y="535384"/>
+            <a:ext cx="5153025" cy="428625"/>
+          </a:xfrm>
+          <a:prstGeom prst="rect">
+            <a:avLst/>
+          </a:prstGeom>
+        </p:spPr>
+      </p:pic>
     </p:spTree>
     <p:extLst>
       <p:ext uri="{BB962C8B-B14F-4D97-AF65-F5344CB8AC3E}">
@@ -9406,8 +9993,8 @@
         </p:nvSpPr>
         <p:spPr>
           <a:xfrm>
-            <a:off x="0" y="577327"/>
-            <a:ext cx="5261020" cy="1143000"/>
+            <a:off x="0" y="28211"/>
+            <a:ext cx="5261020" cy="828274"/>
           </a:xfrm>
         </p:spPr>
         <p:txBody>
@@ -9551,6 +10138,66 @@
           </a:p>
         </p:txBody>
       </p:sp>
+      <p:pic>
+        <p:nvPicPr>
+          <p:cNvPr id="4" name="Picture 3">
+            <a:extLst>
+              <a:ext uri="{FF2B5EF4-FFF2-40B4-BE49-F238E27FC236}">
+                <a16:creationId xmlns:a16="http://schemas.microsoft.com/office/drawing/2014/main" id="{6959979C-3053-5644-2E76-565B470D1D89}"/>
+              </a:ext>
+            </a:extLst>
+          </p:cNvPr>
+          <p:cNvPicPr>
+            <a:picLocks noChangeAspect="1"/>
+          </p:cNvPicPr>
+          <p:nvPr/>
+        </p:nvPicPr>
+        <p:blipFill>
+          <a:blip r:embed="rId5"/>
+          <a:stretch>
+            <a:fillRect/>
+          </a:stretch>
+        </p:blipFill>
+        <p:spPr>
+          <a:xfrm>
+            <a:off x="210355" y="843122"/>
+            <a:ext cx="5172075" cy="514350"/>
+          </a:xfrm>
+          <a:prstGeom prst="rect">
+            <a:avLst/>
+          </a:prstGeom>
+        </p:spPr>
+      </p:pic>
+      <p:pic>
+        <p:nvPicPr>
+          <p:cNvPr id="8" name="Picture 7">
+            <a:extLst>
+              <a:ext uri="{FF2B5EF4-FFF2-40B4-BE49-F238E27FC236}">
+                <a16:creationId xmlns:a16="http://schemas.microsoft.com/office/drawing/2014/main" id="{1424ACDD-4614-947A-6E98-32CB2A29D0C9}"/>
+              </a:ext>
+            </a:extLst>
+          </p:cNvPr>
+          <p:cNvPicPr>
+            <a:picLocks noChangeAspect="1"/>
+          </p:cNvPicPr>
+          <p:nvPr/>
+        </p:nvPicPr>
+        <p:blipFill>
+          <a:blip r:embed="rId6"/>
+          <a:stretch>
+            <a:fillRect/>
+          </a:stretch>
+        </p:blipFill>
+        <p:spPr>
+          <a:xfrm>
+            <a:off x="3032167" y="1501851"/>
+            <a:ext cx="2350263" cy="1270207"/>
+          </a:xfrm>
+          <a:prstGeom prst="rect">
+            <a:avLst/>
+          </a:prstGeom>
+        </p:spPr>
+      </p:pic>
     </p:spTree>
     <p:extLst>
       <p:ext uri="{BB962C8B-B14F-4D97-AF65-F5344CB8AC3E}">
@@ -11373,21 +12020,6 @@
 </file>
 
 <file path=customXml/item1.xml><?xml version="1.0" encoding="utf-8"?>
-<?mso-contentType ?>
-<FormTemplates xmlns="http://schemas.microsoft.com/sharepoint/v3/contenttype/forms">
-  <Display>DocumentLibraryForm</Display>
-  <Edit>DocumentLibraryForm</Edit>
-  <New>DocumentLibraryForm</New>
-</FormTemplates>
-</file>
-
-<file path=customXml/item2.xml><?xml version="1.0" encoding="utf-8"?>
-<p:properties xmlns:p="http://schemas.microsoft.com/office/2006/metadata/properties" xmlns:xsi="http://www.w3.org/2001/XMLSchema-instance" xmlns:pc="http://schemas.microsoft.com/office/infopath/2007/PartnerControls">
-  <documentManagement/>
-</p:properties>
-</file>
-
-<file path=customXml/item3.xml><?xml version="1.0" encoding="utf-8"?>
 <ct:contentTypeSchema xmlns:ct="http://schemas.microsoft.com/office/2006/metadata/contentType" xmlns:ma="http://schemas.microsoft.com/office/2006/metadata/properties/metaAttributes" ct:_="" ma:_="" ma:contentTypeName="Document" ma:contentTypeID="0x0101004285D81DBE5F5A448E892B34D6B8CF20" ma:contentTypeVersion="2" ma:contentTypeDescription="Create a new document." ma:contentTypeScope="" ma:versionID="026ccaf10de5d9915dfa48c6db16b59b">
   <xsd:schema xmlns:xsd="http://www.w3.org/2001/XMLSchema" xmlns:xs="http://www.w3.org/2001/XMLSchema" xmlns:p="http://schemas.microsoft.com/office/2006/metadata/properties" xmlns:ns2="08600313-7276-4ca7-b5d3-7d86193ee0ac" targetNamespace="http://schemas.microsoft.com/office/2006/metadata/properties" ma:root="true" ma:fieldsID="c887e4ee215f388544e22a2030d7ea35" ns2:_="">
     <xsd:import namespace="08600313-7276-4ca7-b5d3-7d86193ee0ac"/>
@@ -11519,31 +12151,22 @@
 </ct:contentTypeSchema>
 </file>
 
-<file path=customXml/itemProps1.xml><?xml version="1.0" encoding="utf-8"?>
-<ds:datastoreItem xmlns:ds="http://schemas.openxmlformats.org/officeDocument/2006/customXml" ds:itemID="{17FAF4A3-64B4-43E8-BB8B-B01EB9ECAC06}">
-  <ds:schemaRefs>
-    <ds:schemaRef ds:uri="http://schemas.microsoft.com/sharepoint/v3/contenttype/forms"/>
-  </ds:schemaRefs>
-</ds:datastoreItem>
+<file path=customXml/item2.xml><?xml version="1.0" encoding="utf-8"?>
+<?mso-contentType ?>
+<FormTemplates xmlns="http://schemas.microsoft.com/sharepoint/v3/contenttype/forms">
+  <Display>DocumentLibraryForm</Display>
+  <Edit>DocumentLibraryForm</Edit>
+  <New>DocumentLibraryForm</New>
+</FormTemplates>
 </file>
 
-<file path=customXml/itemProps2.xml><?xml version="1.0" encoding="utf-8"?>
-<ds:datastoreItem xmlns:ds="http://schemas.openxmlformats.org/officeDocument/2006/customXml" ds:itemID="{F4E211C1-CD9D-46C8-BE98-ADF55AECFF6A}">
-  <ds:schemaRefs>
-    <ds:schemaRef ds:uri="79ddb764-415a-4c38-83b7-908be6382bea"/>
-    <ds:schemaRef ds:uri="http://purl.org/dc/dcmitype/"/>
-    <ds:schemaRef ds:uri="http://purl.org/dc/elements/1.1/"/>
-    <ds:schemaRef ds:uri="http://purl.org/dc/terms/"/>
-    <ds:schemaRef ds:uri="http://schemas.microsoft.com/office/2006/documentManagement/types"/>
-    <ds:schemaRef ds:uri="http://schemas.microsoft.com/office/2006/metadata/properties"/>
-    <ds:schemaRef ds:uri="http://schemas.microsoft.com/office/infopath/2007/PartnerControls"/>
-    <ds:schemaRef ds:uri="http://schemas.openxmlformats.org/package/2006/metadata/core-properties"/>
-    <ds:schemaRef ds:uri="http://www.w3.org/XML/1998/namespace"/>
-  </ds:schemaRefs>
-</ds:datastoreItem>
+<file path=customXml/item3.xml><?xml version="1.0" encoding="utf-8"?>
+<p:properties xmlns:p="http://schemas.microsoft.com/office/2006/metadata/properties" xmlns:xsi="http://www.w3.org/2001/XMLSchema-instance" xmlns:pc="http://schemas.microsoft.com/office/infopath/2007/PartnerControls">
+  <documentManagement/>
+</p:properties>
 </file>
 
-<file path=customXml/itemProps3.xml><?xml version="1.0" encoding="utf-8"?>
+<file path=customXml/itemProps1.xml><?xml version="1.0" encoding="utf-8"?>
 <ds:datastoreItem xmlns:ds="http://schemas.openxmlformats.org/officeDocument/2006/customXml" ds:itemID="{FB830662-5179-45C5-B8BB-41FD5024BBF4}">
   <ds:schemaRefs>
     <ds:schemaRef ds:uri="http://schemas.microsoft.com/office/2006/metadata/contentType"/>
@@ -11559,4 +12182,28 @@
     <ds:schemaRef ds:uri="http://schemas.microsoft.com/internal/obd"/>
   </ds:schemaRefs>
 </ds:datastoreItem>
+</file>
+
+<file path=customXml/itemProps2.xml><?xml version="1.0" encoding="utf-8"?>
+<ds:datastoreItem xmlns:ds="http://schemas.openxmlformats.org/officeDocument/2006/customXml" ds:itemID="{17FAF4A3-64B4-43E8-BB8B-B01EB9ECAC06}">
+  <ds:schemaRefs>
+    <ds:schemaRef ds:uri="http://schemas.microsoft.com/sharepoint/v3/contenttype/forms"/>
+  </ds:schemaRefs>
+</ds:datastoreItem>
+</file>
+
+<file path=customXml/itemProps3.xml><?xml version="1.0" encoding="utf-8"?>
+<ds:datastoreItem xmlns:ds="http://schemas.openxmlformats.org/officeDocument/2006/customXml" ds:itemID="{F4E211C1-CD9D-46C8-BE98-ADF55AECFF6A}">
+  <ds:schemaRefs>
+    <ds:schemaRef ds:uri="79ddb764-415a-4c38-83b7-908be6382bea"/>
+    <ds:schemaRef ds:uri="http://purl.org/dc/dcmitype/"/>
+    <ds:schemaRef ds:uri="http://purl.org/dc/elements/1.1/"/>
+    <ds:schemaRef ds:uri="http://purl.org/dc/terms/"/>
+    <ds:schemaRef ds:uri="http://schemas.microsoft.com/office/2006/documentManagement/types"/>
+    <ds:schemaRef ds:uri="http://schemas.microsoft.com/office/2006/metadata/properties"/>
+    <ds:schemaRef ds:uri="http://schemas.microsoft.com/office/infopath/2007/PartnerControls"/>
+    <ds:schemaRef ds:uri="http://schemas.openxmlformats.org/package/2006/metadata/core-properties"/>
+    <ds:schemaRef ds:uri="http://www.w3.org/XML/1998/namespace"/>
+  </ds:schemaRefs>
+</ds:datastoreItem>
 </file>
</xml_diff>

<commit_message>
fixing slides for day 3
</commit_message>
<xml_diff>
--- a/ClassMaterials/2DArraysAndMaps/Slides/Part1-Help-and-Academic-Integrity.pptx
+++ b/ClassMaterials/2DArraysAndMaps/Slides/Part1-Help-and-Academic-Integrity.pptx
@@ -444,7 +444,7 @@
               <a:pPr>
                 <a:defRPr/>
               </a:pPr>
-              <a:t>11/21/2023</a:t>
+              <a:t>11/30/2023</a:t>
             </a:fld>
             <a:endParaRPr lang="en-US"/>
           </a:p>
@@ -679,7 +679,7 @@
               <a:pPr>
                 <a:defRPr/>
               </a:pPr>
-              <a:t>11/21/2023</a:t>
+              <a:t>11/30/2023</a:t>
             </a:fld>
             <a:endParaRPr lang="en-US"/>
           </a:p>
@@ -1080,19 +1080,34 @@
           <a:bodyPr/>
           <a:lstStyle/>
           <a:p>
+            <a:pPr marL="0" marR="0" lvl="0" indent="0" algn="l" defTabSz="914400" rtl="0" eaLnBrk="1" fontAlgn="base" latinLnBrk="0" hangingPunct="1">
+              <a:lnSpc>
+                <a:spcPct val="100000"/>
+              </a:lnSpc>
+              <a:spcBef>
+                <a:spcPct val="0"/>
+              </a:spcBef>
+              <a:spcAft>
+                <a:spcPct val="0"/>
+              </a:spcAft>
+              <a:buClrTx/>
+              <a:buSzTx/>
+              <a:buFontTx/>
+              <a:buNone/>
+              <a:tabLst/>
+              <a:defRPr/>
+            </a:pPr>
+            <a:r>
+              <a:rPr lang="en-US" dirty="0"/>
+              <a:t>JAY: Introduce SECOND row today (Identity Pie)</a:t>
+            </a:r>
+          </a:p>
+          <a:p>
             <a:pPr eaLnBrk="1" hangingPunct="1">
               <a:spcBef>
                 <a:spcPct val="0"/>
               </a:spcBef>
             </a:pPr>
-            <a:r>
-              <a:rPr lang="en-US" dirty="0"/>
-              <a:t>Note: You will want to use clicker for slides</a:t>
-            </a:r>
-            <a:r>
-              <a:rPr lang="en-US" baseline="0" dirty="0"/>
-              <a:t> today!</a:t>
-            </a:r>
             <a:endParaRPr lang="en-US" dirty="0"/>
           </a:p>
           <a:p>
@@ -1101,6 +1116,14 @@
                 <a:spcPct val="0"/>
               </a:spcBef>
             </a:pPr>
+            <a:r>
+              <a:rPr lang="en-US" dirty="0"/>
+              <a:t>Note: You will want to use clicker for slides</a:t>
+            </a:r>
+            <a:r>
+              <a:rPr lang="en-US" baseline="0" dirty="0"/>
+              <a:t> today!</a:t>
+            </a:r>
             <a:endParaRPr lang="en-US" dirty="0"/>
           </a:p>
           <a:p>
@@ -2508,7 +2531,7 @@
               <a:pPr>
                 <a:defRPr/>
               </a:pPr>
-              <a:t>Tuesday, November 21, 2023</a:t>
+              <a:t>Thursday, November 30, 2023</a:t>
             </a:fld>
             <a:endParaRPr lang="en-US"/>
           </a:p>
@@ -2691,7 +2714,7 @@
               <a:pPr>
                 <a:defRPr/>
               </a:pPr>
-              <a:t>Tuesday, November 21, 2023</a:t>
+              <a:t>Thursday, November 30, 2023</a:t>
             </a:fld>
             <a:endParaRPr lang="en-US"/>
           </a:p>
@@ -2884,7 +2907,7 @@
               <a:pPr>
                 <a:defRPr/>
               </a:pPr>
-              <a:t>Tuesday, November 21, 2023</a:t>
+              <a:t>Thursday, November 30, 2023</a:t>
             </a:fld>
             <a:endParaRPr lang="en-US"/>
           </a:p>
@@ -3067,7 +3090,7 @@
               <a:pPr>
                 <a:defRPr/>
               </a:pPr>
-              <a:t>Tuesday, November 21, 2023</a:t>
+              <a:t>Thursday, November 30, 2023</a:t>
             </a:fld>
             <a:endParaRPr lang="en-US"/>
           </a:p>
@@ -3327,7 +3350,7 @@
               <a:pPr>
                 <a:defRPr/>
               </a:pPr>
-              <a:t>Tuesday, November 21, 2023</a:t>
+              <a:t>Thursday, November 30, 2023</a:t>
             </a:fld>
             <a:endParaRPr lang="en-US"/>
           </a:p>
@@ -3627,7 +3650,7 @@
               <a:pPr>
                 <a:defRPr/>
               </a:pPr>
-              <a:t>Tuesday, November 21, 2023</a:t>
+              <a:t>Thursday, November 30, 2023</a:t>
             </a:fld>
             <a:endParaRPr lang="en-US"/>
           </a:p>
@@ -4061,7 +4084,7 @@
               <a:pPr>
                 <a:defRPr/>
               </a:pPr>
-              <a:t>Tuesday, November 21, 2023</a:t>
+              <a:t>Thursday, November 30, 2023</a:t>
             </a:fld>
             <a:endParaRPr lang="en-US"/>
           </a:p>
@@ -4193,7 +4216,7 @@
               <a:pPr>
                 <a:defRPr/>
               </a:pPr>
-              <a:t>Tuesday, November 21, 2023</a:t>
+              <a:t>Thursday, November 30, 2023</a:t>
             </a:fld>
             <a:endParaRPr lang="en-US"/>
           </a:p>
@@ -4303,7 +4326,7 @@
               <a:pPr>
                 <a:defRPr/>
               </a:pPr>
-              <a:t>Tuesday, November 21, 2023</a:t>
+              <a:t>Thursday, November 30, 2023</a:t>
             </a:fld>
             <a:endParaRPr lang="en-US"/>
           </a:p>
@@ -4593,7 +4616,7 @@
               <a:pPr>
                 <a:defRPr/>
               </a:pPr>
-              <a:t>Tuesday, November 21, 2023</a:t>
+              <a:t>Thursday, November 30, 2023</a:t>
             </a:fld>
             <a:endParaRPr lang="en-US"/>
           </a:p>
@@ -4860,7 +4883,7 @@
               <a:pPr>
                 <a:defRPr/>
               </a:pPr>
-              <a:t>Tuesday, November 21, 2023</a:t>
+              <a:t>Thursday, November 30, 2023</a:t>
             </a:fld>
             <a:endParaRPr lang="en-US"/>
           </a:p>
@@ -5086,7 +5109,7 @@
               <a:pPr>
                 <a:defRPr/>
               </a:pPr>
-              <a:t>Tuesday, November 21, 2023</a:t>
+              <a:t>Thursday, November 30, 2023</a:t>
             </a:fld>
             <a:endParaRPr lang="en-US"/>
           </a:p>
@@ -5705,7 +5728,7 @@
           </a:ln>
           <a:extLst>
             <a:ext uri="{C572A759-6A51-4108-AA02-DFA0A04FC94B}">
-              <ma14:wrappingTextBoxFlag xmlns="" xmlns:ma14="http://schemas.microsoft.com/office/mac/drawingml/2011/main" val="1"/>
+              <ma14:wrappingTextBoxFlag xmlns:ma14="http://schemas.microsoft.com/office/mac/drawingml/2011/main" xmlns="" val="1"/>
             </a:ext>
           </a:extLst>
         </p:spPr>
@@ -6147,10 +6170,10 @@
       </p:grpSpPr>
       <p:pic>
         <p:nvPicPr>
-          <p:cNvPr id="3" name="Picture 2">
+          <p:cNvPr id="11" name="Picture 10">
             <a:extLst>
               <a:ext uri="{FF2B5EF4-FFF2-40B4-BE49-F238E27FC236}">
-                <a16:creationId xmlns:a16="http://schemas.microsoft.com/office/drawing/2014/main" id="{32224F68-241A-2161-C629-18B2E415FA41}"/>
+                <a16:creationId xmlns:a16="http://schemas.microsoft.com/office/drawing/2014/main" id="{D79D31A9-C36C-1060-809A-40AD419C8738}"/>
               </a:ext>
             </a:extLst>
           </p:cNvPr>
@@ -6159,16 +6182,15 @@
           </p:cNvPicPr>
           <p:nvPr/>
         </p:nvPicPr>
-        <p:blipFill>
+        <p:blipFill rotWithShape="1">
           <a:blip r:embed="rId2"/>
-          <a:stretch>
-            <a:fillRect/>
-          </a:stretch>
+          <a:srcRect b="56419"/>
+          <a:stretch/>
         </p:blipFill>
         <p:spPr>
           <a:xfrm>
-            <a:off x="233039" y="658426"/>
-            <a:ext cx="8156175" cy="3121629"/>
+            <a:off x="156505" y="1357782"/>
+            <a:ext cx="8830990" cy="1505161"/>
           </a:xfrm>
           <a:prstGeom prst="rect">
             <a:avLst/>
@@ -6177,10 +6199,10 @@
       </p:pic>
       <p:pic>
         <p:nvPicPr>
-          <p:cNvPr id="6" name="Picture 5">
+          <p:cNvPr id="12" name="Picture 11">
             <a:extLst>
               <a:ext uri="{FF2B5EF4-FFF2-40B4-BE49-F238E27FC236}">
-                <a16:creationId xmlns:a16="http://schemas.microsoft.com/office/drawing/2014/main" id="{05F64E37-0886-12F1-7241-1B3FD2A9C119}"/>
+                <a16:creationId xmlns:a16="http://schemas.microsoft.com/office/drawing/2014/main" id="{1FF4024F-370B-6207-A2C3-7F480F631D7D}"/>
               </a:ext>
             </a:extLst>
           </p:cNvPr>
@@ -6189,16 +6211,15 @@
           </p:cNvPicPr>
           <p:nvPr/>
         </p:nvPicPr>
-        <p:blipFill>
-          <a:blip r:embed="rId3"/>
-          <a:stretch>
-            <a:fillRect/>
-          </a:stretch>
+        <p:blipFill rotWithShape="1">
+          <a:blip r:embed="rId2"/>
+          <a:srcRect t="43811"/>
+          <a:stretch/>
         </p:blipFill>
         <p:spPr>
           <a:xfrm>
-            <a:off x="225163" y="3780055"/>
-            <a:ext cx="8156176" cy="2659165"/>
+            <a:off x="156505" y="3429000"/>
+            <a:ext cx="8830990" cy="1940590"/>
           </a:xfrm>
           <a:prstGeom prst="rect">
             <a:avLst/>
@@ -8512,7 +8533,7 @@
             <a:effectLst/>
             <a:extLst>
               <a:ext uri="{C572A759-6A51-4108-AA02-DFA0A04FC94B}">
-                <ma14:wrappingTextBoxFlag xmlns:ma14="http://schemas.microsoft.com/office/mac/drawingml/2011/main" xmlns="" val="1"/>
+                <ma14:wrappingTextBoxFlag xmlns="" xmlns:ma14="http://schemas.microsoft.com/office/mac/drawingml/2011/main" val="1"/>
               </a:ext>
             </a:extLst>
           </p:spPr>
@@ -8732,7 +8753,7 @@
             <a:effectLst/>
             <a:extLst>
               <a:ext uri="{C572A759-6A51-4108-AA02-DFA0A04FC94B}">
-                <ma14:wrappingTextBoxFlag xmlns:ma14="http://schemas.microsoft.com/office/mac/drawingml/2011/main" xmlns="" val="1"/>
+                <ma14:wrappingTextBoxFlag xmlns="" xmlns:ma14="http://schemas.microsoft.com/office/mac/drawingml/2011/main" val="1"/>
               </a:ext>
             </a:extLst>
           </p:spPr>
@@ -10754,7 +10775,7 @@
           </a:ln>
           <a:extLst>
             <a:ext uri="{C572A759-6A51-4108-AA02-DFA0A04FC94B}">
-              <ma14:wrappingTextBoxFlag xmlns:ma14="http://schemas.microsoft.com/office/mac/drawingml/2011/main" xmlns="" val="1"/>
+              <ma14:wrappingTextBoxFlag xmlns="" xmlns:ma14="http://schemas.microsoft.com/office/mac/drawingml/2011/main" val="1"/>
             </a:ext>
           </a:extLst>
         </p:spPr>
@@ -12152,18 +12173,18 @@
 </file>
 
 <file path=customXml/item2.xml><?xml version="1.0" encoding="utf-8"?>
+<p:properties xmlns:p="http://schemas.microsoft.com/office/2006/metadata/properties" xmlns:xsi="http://www.w3.org/2001/XMLSchema-instance" xmlns:pc="http://schemas.microsoft.com/office/infopath/2007/PartnerControls">
+  <documentManagement/>
+</p:properties>
+</file>
+
+<file path=customXml/item3.xml><?xml version="1.0" encoding="utf-8"?>
 <?mso-contentType ?>
 <FormTemplates xmlns="http://schemas.microsoft.com/sharepoint/v3/contenttype/forms">
   <Display>DocumentLibraryForm</Display>
   <Edit>DocumentLibraryForm</Edit>
   <New>DocumentLibraryForm</New>
 </FormTemplates>
-</file>
-
-<file path=customXml/item3.xml><?xml version="1.0" encoding="utf-8"?>
-<p:properties xmlns:p="http://schemas.microsoft.com/office/2006/metadata/properties" xmlns:xsi="http://www.w3.org/2001/XMLSchema-instance" xmlns:pc="http://schemas.microsoft.com/office/infopath/2007/PartnerControls">
-  <documentManagement/>
-</p:properties>
 </file>
 
 <file path=customXml/itemProps1.xml><?xml version="1.0" encoding="utf-8"?>
@@ -12185,14 +12206,6 @@
 </file>
 
 <file path=customXml/itemProps2.xml><?xml version="1.0" encoding="utf-8"?>
-<ds:datastoreItem xmlns:ds="http://schemas.openxmlformats.org/officeDocument/2006/customXml" ds:itemID="{17FAF4A3-64B4-43E8-BB8B-B01EB9ECAC06}">
-  <ds:schemaRefs>
-    <ds:schemaRef ds:uri="http://schemas.microsoft.com/sharepoint/v3/contenttype/forms"/>
-  </ds:schemaRefs>
-</ds:datastoreItem>
-</file>
-
-<file path=customXml/itemProps3.xml><?xml version="1.0" encoding="utf-8"?>
 <ds:datastoreItem xmlns:ds="http://schemas.openxmlformats.org/officeDocument/2006/customXml" ds:itemID="{F4E211C1-CD9D-46C8-BE98-ADF55AECFF6A}">
   <ds:schemaRefs>
     <ds:schemaRef ds:uri="79ddb764-415a-4c38-83b7-908be6382bea"/>
@@ -12206,4 +12219,12 @@
     <ds:schemaRef ds:uri="http://www.w3.org/XML/1998/namespace"/>
   </ds:schemaRefs>
 </ds:datastoreItem>
+</file>
+
+<file path=customXml/itemProps3.xml><?xml version="1.0" encoding="utf-8"?>
+<ds:datastoreItem xmlns:ds="http://schemas.openxmlformats.org/officeDocument/2006/customXml" ds:itemID="{17FAF4A3-64B4-43E8-BB8B-B01EB9ECAC06}">
+  <ds:schemaRefs>
+    <ds:schemaRef ds:uri="http://schemas.microsoft.com/sharepoint/v3/contenttype/forms"/>
+  </ds:schemaRefs>
+</ds:datastoreItem>
 </file>
</xml_diff>

<commit_message>
updating integrity screenshots and adding warning about delay for plugin
</commit_message>
<xml_diff>
--- a/ClassMaterials/2DArraysAndMaps/Slides/Part1-Help-and-Academic-Integrity.pptx
+++ b/ClassMaterials/2DArraysAndMaps/Slides/Part1-Help-and-Academic-Integrity.pptx
@@ -444,7 +444,7 @@
               <a:pPr>
                 <a:defRPr/>
               </a:pPr>
-              <a:t>11/30/2023</a:t>
+              <a:t>2/26/2024</a:t>
             </a:fld>
             <a:endParaRPr lang="en-US"/>
           </a:p>
@@ -679,7 +679,7 @@
               <a:pPr>
                 <a:defRPr/>
               </a:pPr>
-              <a:t>11/30/2023</a:t>
+              <a:t>2/26/2024</a:t>
             </a:fld>
             <a:endParaRPr lang="en-US"/>
           </a:p>
@@ -2531,7 +2531,7 @@
               <a:pPr>
                 <a:defRPr/>
               </a:pPr>
-              <a:t>Thursday, November 30, 2023</a:t>
+              <a:t>Monday, February 26, 2024</a:t>
             </a:fld>
             <a:endParaRPr lang="en-US"/>
           </a:p>
@@ -2714,7 +2714,7 @@
               <a:pPr>
                 <a:defRPr/>
               </a:pPr>
-              <a:t>Thursday, November 30, 2023</a:t>
+              <a:t>Monday, February 26, 2024</a:t>
             </a:fld>
             <a:endParaRPr lang="en-US"/>
           </a:p>
@@ -2907,7 +2907,7 @@
               <a:pPr>
                 <a:defRPr/>
               </a:pPr>
-              <a:t>Thursday, November 30, 2023</a:t>
+              <a:t>Monday, February 26, 2024</a:t>
             </a:fld>
             <a:endParaRPr lang="en-US"/>
           </a:p>
@@ -3090,7 +3090,7 @@
               <a:pPr>
                 <a:defRPr/>
               </a:pPr>
-              <a:t>Thursday, November 30, 2023</a:t>
+              <a:t>Monday, February 26, 2024</a:t>
             </a:fld>
             <a:endParaRPr lang="en-US"/>
           </a:p>
@@ -3350,7 +3350,7 @@
               <a:pPr>
                 <a:defRPr/>
               </a:pPr>
-              <a:t>Thursday, November 30, 2023</a:t>
+              <a:t>Monday, February 26, 2024</a:t>
             </a:fld>
             <a:endParaRPr lang="en-US"/>
           </a:p>
@@ -3650,7 +3650,7 @@
               <a:pPr>
                 <a:defRPr/>
               </a:pPr>
-              <a:t>Thursday, November 30, 2023</a:t>
+              <a:t>Monday, February 26, 2024</a:t>
             </a:fld>
             <a:endParaRPr lang="en-US"/>
           </a:p>
@@ -4084,7 +4084,7 @@
               <a:pPr>
                 <a:defRPr/>
               </a:pPr>
-              <a:t>Thursday, November 30, 2023</a:t>
+              <a:t>Monday, February 26, 2024</a:t>
             </a:fld>
             <a:endParaRPr lang="en-US"/>
           </a:p>
@@ -4216,7 +4216,7 @@
               <a:pPr>
                 <a:defRPr/>
               </a:pPr>
-              <a:t>Thursday, November 30, 2023</a:t>
+              <a:t>Monday, February 26, 2024</a:t>
             </a:fld>
             <a:endParaRPr lang="en-US"/>
           </a:p>
@@ -4326,7 +4326,7 @@
               <a:pPr>
                 <a:defRPr/>
               </a:pPr>
-              <a:t>Thursday, November 30, 2023</a:t>
+              <a:t>Monday, February 26, 2024</a:t>
             </a:fld>
             <a:endParaRPr lang="en-US"/>
           </a:p>
@@ -4616,7 +4616,7 @@
               <a:pPr>
                 <a:defRPr/>
               </a:pPr>
-              <a:t>Thursday, November 30, 2023</a:t>
+              <a:t>Monday, February 26, 2024</a:t>
             </a:fld>
             <a:endParaRPr lang="en-US"/>
           </a:p>
@@ -4883,7 +4883,7 @@
               <a:pPr>
                 <a:defRPr/>
               </a:pPr>
-              <a:t>Thursday, November 30, 2023</a:t>
+              <a:t>Monday, February 26, 2024</a:t>
             </a:fld>
             <a:endParaRPr lang="en-US"/>
           </a:p>
@@ -5109,7 +5109,7 @@
               <a:pPr>
                 <a:defRPr/>
               </a:pPr>
-              <a:t>Thursday, November 30, 2023</a:t>
+              <a:t>Monday, February 26, 2024</a:t>
             </a:fld>
             <a:endParaRPr lang="en-US"/>
           </a:p>
@@ -5728,7 +5728,7 @@
           </a:ln>
           <a:extLst>
             <a:ext uri="{C572A759-6A51-4108-AA02-DFA0A04FC94B}">
-              <ma14:wrappingTextBoxFlag xmlns:ma14="http://schemas.microsoft.com/office/mac/drawingml/2011/main" xmlns="" val="1"/>
+              <ma14:wrappingTextBoxFlag xmlns="" xmlns:ma14="http://schemas.microsoft.com/office/mac/drawingml/2011/main" val="1"/>
             </a:ext>
           </a:extLst>
         </p:spPr>
@@ -6110,10 +6110,10 @@
       </p:grpSpPr>
       <p:pic>
         <p:nvPicPr>
-          <p:cNvPr id="4" name="Picture 3">
+          <p:cNvPr id="3" name="Picture 2">
             <a:extLst>
               <a:ext uri="{FF2B5EF4-FFF2-40B4-BE49-F238E27FC236}">
-                <a16:creationId xmlns:a16="http://schemas.microsoft.com/office/drawing/2014/main" id="{7C4091CE-ADBB-8E8A-37FD-F2ECC3A30D4E}"/>
+                <a16:creationId xmlns:a16="http://schemas.microsoft.com/office/drawing/2014/main" id="{9282234E-794F-CE4F-5458-F95F7367118A}"/>
               </a:ext>
             </a:extLst>
           </p:cNvPr>
@@ -6130,8 +6130,8 @@
         </p:blipFill>
         <p:spPr>
           <a:xfrm>
-            <a:off x="985337" y="437732"/>
-            <a:ext cx="7173326" cy="5982535"/>
+            <a:off x="185125" y="800800"/>
+            <a:ext cx="8773749" cy="4944165"/>
           </a:xfrm>
           <a:prstGeom prst="rect">
             <a:avLst/>
@@ -6170,10 +6170,10 @@
       </p:grpSpPr>
       <p:pic>
         <p:nvPicPr>
-          <p:cNvPr id="11" name="Picture 10">
+          <p:cNvPr id="3" name="Picture 2">
             <a:extLst>
               <a:ext uri="{FF2B5EF4-FFF2-40B4-BE49-F238E27FC236}">
-                <a16:creationId xmlns:a16="http://schemas.microsoft.com/office/drawing/2014/main" id="{D79D31A9-C36C-1060-809A-40AD419C8738}"/>
+                <a16:creationId xmlns:a16="http://schemas.microsoft.com/office/drawing/2014/main" id="{B4709720-1B68-7472-B15D-C81FE11AB193}"/>
               </a:ext>
             </a:extLst>
           </p:cNvPr>
@@ -6182,44 +6182,16 @@
           </p:cNvPicPr>
           <p:nvPr/>
         </p:nvPicPr>
-        <p:blipFill rotWithShape="1">
+        <p:blipFill>
           <a:blip r:embed="rId2"/>
-          <a:srcRect b="56419"/>
-          <a:stretch/>
+          <a:stretch>
+            <a:fillRect/>
+          </a:stretch>
         </p:blipFill>
         <p:spPr>
           <a:xfrm>
-            <a:off x="156505" y="1357782"/>
-            <a:ext cx="8830990" cy="1505161"/>
-          </a:xfrm>
-          <a:prstGeom prst="rect">
-            <a:avLst/>
-          </a:prstGeom>
-        </p:spPr>
-      </p:pic>
-      <p:pic>
-        <p:nvPicPr>
-          <p:cNvPr id="12" name="Picture 11">
-            <a:extLst>
-              <a:ext uri="{FF2B5EF4-FFF2-40B4-BE49-F238E27FC236}">
-                <a16:creationId xmlns:a16="http://schemas.microsoft.com/office/drawing/2014/main" id="{1FF4024F-370B-6207-A2C3-7F480F631D7D}"/>
-              </a:ext>
-            </a:extLst>
-          </p:cNvPr>
-          <p:cNvPicPr>
-            <a:picLocks noChangeAspect="1"/>
-          </p:cNvPicPr>
-          <p:nvPr/>
-        </p:nvPicPr>
-        <p:blipFill rotWithShape="1">
-          <a:blip r:embed="rId2"/>
-          <a:srcRect t="43811"/>
-          <a:stretch/>
-        </p:blipFill>
-        <p:spPr>
-          <a:xfrm>
-            <a:off x="156505" y="3429000"/>
-            <a:ext cx="8830990" cy="1940590"/>
+            <a:off x="256573" y="1595181"/>
+            <a:ext cx="8630854" cy="3667637"/>
           </a:xfrm>
           <a:prstGeom prst="rect">
             <a:avLst/>
@@ -6258,10 +6230,10 @@
       </p:grpSpPr>
       <p:pic>
         <p:nvPicPr>
-          <p:cNvPr id="5" name="Picture 4">
+          <p:cNvPr id="3" name="Picture 2">
             <a:extLst>
               <a:ext uri="{FF2B5EF4-FFF2-40B4-BE49-F238E27FC236}">
-                <a16:creationId xmlns:a16="http://schemas.microsoft.com/office/drawing/2014/main" id="{B41EE708-66D0-E271-8641-841406A0CAD1}"/>
+                <a16:creationId xmlns:a16="http://schemas.microsoft.com/office/drawing/2014/main" id="{7FF8D511-E813-3C19-A023-044034334ACB}"/>
               </a:ext>
             </a:extLst>
           </p:cNvPr>
@@ -6270,16 +6242,44 @@
           </p:cNvPicPr>
           <p:nvPr/>
         </p:nvPicPr>
-        <p:blipFill>
+        <p:blipFill rotWithShape="1">
           <a:blip r:embed="rId2"/>
-          <a:stretch>
-            <a:fillRect/>
-          </a:stretch>
+          <a:srcRect t="85475"/>
+          <a:stretch/>
         </p:blipFill>
         <p:spPr>
           <a:xfrm>
-            <a:off x="397980" y="520677"/>
-            <a:ext cx="8574110" cy="4673730"/>
+            <a:off x="223230" y="3908502"/>
+            <a:ext cx="8697539" cy="723667"/>
+          </a:xfrm>
+          <a:prstGeom prst="rect">
+            <a:avLst/>
+          </a:prstGeom>
+        </p:spPr>
+      </p:pic>
+      <p:pic>
+        <p:nvPicPr>
+          <p:cNvPr id="4" name="Picture 3">
+            <a:extLst>
+              <a:ext uri="{FF2B5EF4-FFF2-40B4-BE49-F238E27FC236}">
+                <a16:creationId xmlns:a16="http://schemas.microsoft.com/office/drawing/2014/main" id="{C4FB9471-384E-AC8D-4E08-8DC42BF416B7}"/>
+              </a:ext>
+            </a:extLst>
+          </p:cNvPr>
+          <p:cNvPicPr>
+            <a:picLocks noChangeAspect="1"/>
+          </p:cNvPicPr>
+          <p:nvPr/>
+        </p:nvPicPr>
+        <p:blipFill rotWithShape="1">
+          <a:blip r:embed="rId2"/>
+          <a:srcRect b="53059"/>
+          <a:stretch/>
+        </p:blipFill>
+        <p:spPr>
+          <a:xfrm>
+            <a:off x="223230" y="1569767"/>
+            <a:ext cx="8697539" cy="2338735"/>
           </a:xfrm>
           <a:prstGeom prst="rect">
             <a:avLst/>
@@ -6318,10 +6318,10 @@
       </p:grpSpPr>
       <p:pic>
         <p:nvPicPr>
-          <p:cNvPr id="5" name="Picture 4">
+          <p:cNvPr id="3" name="Picture 2">
             <a:extLst>
               <a:ext uri="{FF2B5EF4-FFF2-40B4-BE49-F238E27FC236}">
-                <a16:creationId xmlns:a16="http://schemas.microsoft.com/office/drawing/2014/main" id="{74DA0F87-17D8-3018-463D-DFE17E043C10}"/>
+                <a16:creationId xmlns:a16="http://schemas.microsoft.com/office/drawing/2014/main" id="{F1FB0428-8661-E811-CACE-332618DA0B94}"/>
               </a:ext>
             </a:extLst>
           </p:cNvPr>
@@ -6338,8 +6338,8 @@
         </p:blipFill>
         <p:spPr>
           <a:xfrm>
-            <a:off x="947231" y="309127"/>
-            <a:ext cx="7249537" cy="6239746"/>
+            <a:off x="247046" y="842601"/>
+            <a:ext cx="8649907" cy="5172797"/>
           </a:xfrm>
           <a:prstGeom prst="rect">
             <a:avLst/>
@@ -6417,10 +6417,10 @@
       </p:sp>
       <p:pic>
         <p:nvPicPr>
-          <p:cNvPr id="3" name="Picture 2">
+          <p:cNvPr id="5" name="Picture 4">
             <a:extLst>
               <a:ext uri="{FF2B5EF4-FFF2-40B4-BE49-F238E27FC236}">
-                <a16:creationId xmlns:a16="http://schemas.microsoft.com/office/drawing/2014/main" id="{A88C2D9B-6D44-42D8-A7D1-714D97575A12}"/>
+                <a16:creationId xmlns:a16="http://schemas.microsoft.com/office/drawing/2014/main" id="{36640AB3-49C5-9214-C66B-C81D91250A6D}"/>
               </a:ext>
             </a:extLst>
           </p:cNvPr>
@@ -6437,38 +6437,8 @@
         </p:blipFill>
         <p:spPr>
           <a:xfrm>
-            <a:off x="346957" y="314641"/>
-            <a:ext cx="8450086" cy="3404431"/>
-          </a:xfrm>
-          <a:prstGeom prst="rect">
-            <a:avLst/>
-          </a:prstGeom>
-        </p:spPr>
-      </p:pic>
-      <p:pic>
-        <p:nvPicPr>
-          <p:cNvPr id="4" name="Picture 3">
-            <a:extLst>
-              <a:ext uri="{FF2B5EF4-FFF2-40B4-BE49-F238E27FC236}">
-                <a16:creationId xmlns:a16="http://schemas.microsoft.com/office/drawing/2014/main" id="{E2CE9531-AEA4-A4F9-D07A-88FEE0054988}"/>
-              </a:ext>
-            </a:extLst>
-          </p:cNvPr>
-          <p:cNvPicPr>
-            <a:picLocks noChangeAspect="1"/>
-          </p:cNvPicPr>
-          <p:nvPr/>
-        </p:nvPicPr>
-        <p:blipFill>
-          <a:blip r:embed="rId3"/>
-          <a:stretch>
-            <a:fillRect/>
-          </a:stretch>
-        </p:blipFill>
-        <p:spPr>
-          <a:xfrm>
-            <a:off x="173478" y="3719072"/>
-            <a:ext cx="8797043" cy="1404638"/>
+            <a:off x="213704" y="796324"/>
+            <a:ext cx="8716591" cy="4172532"/>
           </a:xfrm>
           <a:prstGeom prst="rect">
             <a:avLst/>
@@ -8533,7 +8503,7 @@
             <a:effectLst/>
             <a:extLst>
               <a:ext uri="{C572A759-6A51-4108-AA02-DFA0A04FC94B}">
-                <ma14:wrappingTextBoxFlag xmlns="" xmlns:ma14="http://schemas.microsoft.com/office/mac/drawingml/2011/main" val="1"/>
+                <ma14:wrappingTextBoxFlag xmlns:ma14="http://schemas.microsoft.com/office/mac/drawingml/2011/main" xmlns="" val="1"/>
               </a:ext>
             </a:extLst>
           </p:spPr>
@@ -8753,7 +8723,7 @@
             <a:effectLst/>
             <a:extLst>
               <a:ext uri="{C572A759-6A51-4108-AA02-DFA0A04FC94B}">
-                <ma14:wrappingTextBoxFlag xmlns="" xmlns:ma14="http://schemas.microsoft.com/office/mac/drawingml/2011/main" val="1"/>
+                <ma14:wrappingTextBoxFlag xmlns:ma14="http://schemas.microsoft.com/office/mac/drawingml/2011/main" xmlns="" val="1"/>
               </a:ext>
             </a:extLst>
           </p:spPr>
@@ -10775,7 +10745,7 @@
           </a:ln>
           <a:extLst>
             <a:ext uri="{C572A759-6A51-4108-AA02-DFA0A04FC94B}">
-              <ma14:wrappingTextBoxFlag xmlns="" xmlns:ma14="http://schemas.microsoft.com/office/mac/drawingml/2011/main" val="1"/>
+              <ma14:wrappingTextBoxFlag xmlns:ma14="http://schemas.microsoft.com/office/mac/drawingml/2011/main" xmlns="" val="1"/>
             </a:ext>
           </a:extLst>
         </p:spPr>
@@ -12173,18 +12143,18 @@
 </file>
 
 <file path=customXml/item2.xml><?xml version="1.0" encoding="utf-8"?>
-<p:properties xmlns:p="http://schemas.microsoft.com/office/2006/metadata/properties" xmlns:xsi="http://www.w3.org/2001/XMLSchema-instance" xmlns:pc="http://schemas.microsoft.com/office/infopath/2007/PartnerControls">
-  <documentManagement/>
-</p:properties>
-</file>
-
-<file path=customXml/item3.xml><?xml version="1.0" encoding="utf-8"?>
 <?mso-contentType ?>
 <FormTemplates xmlns="http://schemas.microsoft.com/sharepoint/v3/contenttype/forms">
   <Display>DocumentLibraryForm</Display>
   <Edit>DocumentLibraryForm</Edit>
   <New>DocumentLibraryForm</New>
 </FormTemplates>
+</file>
+
+<file path=customXml/item3.xml><?xml version="1.0" encoding="utf-8"?>
+<p:properties xmlns:p="http://schemas.microsoft.com/office/2006/metadata/properties" xmlns:xsi="http://www.w3.org/2001/XMLSchema-instance" xmlns:pc="http://schemas.microsoft.com/office/infopath/2007/PartnerControls">
+  <documentManagement/>
+</p:properties>
 </file>
 
 <file path=customXml/itemProps1.xml><?xml version="1.0" encoding="utf-8"?>
@@ -12206,6 +12176,14 @@
 </file>
 
 <file path=customXml/itemProps2.xml><?xml version="1.0" encoding="utf-8"?>
+<ds:datastoreItem xmlns:ds="http://schemas.openxmlformats.org/officeDocument/2006/customXml" ds:itemID="{17FAF4A3-64B4-43E8-BB8B-B01EB9ECAC06}">
+  <ds:schemaRefs>
+    <ds:schemaRef ds:uri="http://schemas.microsoft.com/sharepoint/v3/contenttype/forms"/>
+  </ds:schemaRefs>
+</ds:datastoreItem>
+</file>
+
+<file path=customXml/itemProps3.xml><?xml version="1.0" encoding="utf-8"?>
 <ds:datastoreItem xmlns:ds="http://schemas.openxmlformats.org/officeDocument/2006/customXml" ds:itemID="{F4E211C1-CD9D-46C8-BE98-ADF55AECFF6A}">
   <ds:schemaRefs>
     <ds:schemaRef ds:uri="79ddb764-415a-4c38-83b7-908be6382bea"/>
@@ -12219,12 +12197,4 @@
     <ds:schemaRef ds:uri="http://www.w3.org/XML/1998/namespace"/>
   </ds:schemaRefs>
 </ds:datastoreItem>
-</file>
-
-<file path=customXml/itemProps3.xml><?xml version="1.0" encoding="utf-8"?>
-<ds:datastoreItem xmlns:ds="http://schemas.openxmlformats.org/officeDocument/2006/customXml" ds:itemID="{17FAF4A3-64B4-43E8-BB8B-B01EB9ECAC06}">
-  <ds:schemaRefs>
-    <ds:schemaRef ds:uri="http://schemas.microsoft.com/sharepoint/v3/contenttype/forms"/>
-  </ds:schemaRefs>
-</ds:datastoreItem>
 </file>
</xml_diff>